<commit_message>
add more texts on mulitple section - need to fill out the overview of multithreaded linking framework / then the initial draft will be done
</commit_message>
<xml_diff>
--- a/figs/conlink/concurrent_linking.pptx
+++ b/figs/conlink/concurrent_linking.pptx
@@ -231,7 +231,7 @@
           <a:p>
             <a:fld id="{98CD50F9-C04E-0643-A81F-E269F6C4EDC0}" type="datetimeFigureOut">
               <a:rPr lang="en-US" smtClean="0"/>
-              <a:t>1/26/19</a:t>
+              <a:t>1/27/19</a:t>
             </a:fld>
             <a:endParaRPr lang="en-US"/>
           </a:p>
@@ -410,7 +410,7 @@
             <a:fld id="{17A7BBF0-95DB-485B-8F44-219DC193D725}" type="datetimeFigureOut">
               <a:rPr lang="en-US" smtClean="0"/>
               <a:pPr/>
-              <a:t>1/26/19</a:t>
+              <a:t>1/27/19</a:t>
             </a:fld>
             <a:endParaRPr lang="en-US"/>
           </a:p>
@@ -1313,17 +1313,17 @@
           <a:effectLst/>
           <a:extLst>
             <a:ext uri="{FAA26D3D-D897-4be2-8F04-BA451C77F1D7}">
-              <ma14:placeholderFlag xmlns="" xmlns:ma14="http://schemas.microsoft.com/office/mac/drawingml/2011/main" val="1"/>
+              <ma14:placeholderFlag xmlns:ma14="http://schemas.microsoft.com/office/mac/drawingml/2011/main" xmlns="" val="1"/>
             </a:ext>
             <a:ext uri="{909E8E84-426E-40dd-AFC4-6F175D3DCCD1}">
-              <a14:hiddenFill xmlns="" xmlns:a14="http://schemas.microsoft.com/office/drawing/2010/main">
+              <a14:hiddenFill xmlns:a14="http://schemas.microsoft.com/office/drawing/2010/main" xmlns="">
                 <a:solidFill>
                   <a:schemeClr val="accent1"/>
                 </a:solidFill>
               </a14:hiddenFill>
             </a:ext>
             <a:ext uri="{91240B29-F687-4f45-9708-019B960494DF}">
-              <a14:hiddenLine xmlns="" xmlns:a14="http://schemas.microsoft.com/office/drawing/2010/main" w="9525">
+              <a14:hiddenLine xmlns:a14="http://schemas.microsoft.com/office/drawing/2010/main" xmlns="" w="9525">
                 <a:solidFill>
                   <a:schemeClr val="tx1"/>
                 </a:solidFill>
@@ -1333,7 +1333,7 @@
               </a14:hiddenLine>
             </a:ext>
             <a:ext uri="{AF507438-7753-43e0-B8FC-AC1667EBCBE1}">
-              <a14:hiddenEffects xmlns="" xmlns:a14="http://schemas.microsoft.com/office/drawing/2010/main">
+              <a14:hiddenEffects xmlns:a14="http://schemas.microsoft.com/office/drawing/2010/main" xmlns="">
                 <a:effectLst>
                   <a:outerShdw blurRad="63500" dist="38099" dir="2700000" algn="ctr" rotWithShape="0">
                     <a:schemeClr val="bg2">
@@ -1597,17 +1597,17 @@
           <a:effectLst/>
           <a:extLst>
             <a:ext uri="{FAA26D3D-D897-4be2-8F04-BA451C77F1D7}">
-              <ma14:placeholderFlag xmlns="" xmlns:ma14="http://schemas.microsoft.com/office/mac/drawingml/2011/main" val="1"/>
+              <ma14:placeholderFlag xmlns:ma14="http://schemas.microsoft.com/office/mac/drawingml/2011/main" xmlns="" val="1"/>
             </a:ext>
             <a:ext uri="{909E8E84-426E-40dd-AFC4-6F175D3DCCD1}">
-              <a14:hiddenFill xmlns="" xmlns:a14="http://schemas.microsoft.com/office/drawing/2010/main">
+              <a14:hiddenFill xmlns:a14="http://schemas.microsoft.com/office/drawing/2010/main" xmlns="">
                 <a:solidFill>
                   <a:schemeClr val="accent1"/>
                 </a:solidFill>
               </a14:hiddenFill>
             </a:ext>
             <a:ext uri="{91240B29-F687-4f45-9708-019B960494DF}">
-              <a14:hiddenLine xmlns="" xmlns:a14="http://schemas.microsoft.com/office/drawing/2010/main" w="9525">
+              <a14:hiddenLine xmlns:a14="http://schemas.microsoft.com/office/drawing/2010/main" xmlns="" w="9525">
                 <a:solidFill>
                   <a:schemeClr val="tx1"/>
                 </a:solidFill>
@@ -1617,7 +1617,7 @@
               </a14:hiddenLine>
             </a:ext>
             <a:ext uri="{AF507438-7753-43e0-B8FC-AC1667EBCBE1}">
-              <a14:hiddenEffects xmlns="" xmlns:a14="http://schemas.microsoft.com/office/drawing/2010/main">
+              <a14:hiddenEffects xmlns:a14="http://schemas.microsoft.com/office/drawing/2010/main" xmlns="">
                 <a:effectLst>
                   <a:outerShdw blurRad="63500" dist="38099" dir="2700000" algn="ctr" rotWithShape="0">
                     <a:schemeClr val="bg2">
@@ -1891,17 +1891,17 @@
           <a:effectLst/>
           <a:extLst>
             <a:ext uri="{FAA26D3D-D897-4be2-8F04-BA451C77F1D7}">
-              <ma14:placeholderFlag xmlns="" xmlns:ma14="http://schemas.microsoft.com/office/mac/drawingml/2011/main" val="1"/>
+              <ma14:placeholderFlag xmlns:ma14="http://schemas.microsoft.com/office/mac/drawingml/2011/main" xmlns="" val="1"/>
             </a:ext>
             <a:ext uri="{909E8E84-426E-40dd-AFC4-6F175D3DCCD1}">
-              <a14:hiddenFill xmlns="" xmlns:a14="http://schemas.microsoft.com/office/drawing/2010/main">
+              <a14:hiddenFill xmlns:a14="http://schemas.microsoft.com/office/drawing/2010/main" xmlns="">
                 <a:solidFill>
                   <a:schemeClr val="accent1"/>
                 </a:solidFill>
               </a14:hiddenFill>
             </a:ext>
             <a:ext uri="{91240B29-F687-4f45-9708-019B960494DF}">
-              <a14:hiddenLine xmlns="" xmlns:a14="http://schemas.microsoft.com/office/drawing/2010/main" w="9525">
+              <a14:hiddenLine xmlns:a14="http://schemas.microsoft.com/office/drawing/2010/main" xmlns="" w="9525">
                 <a:solidFill>
                   <a:schemeClr val="tx1"/>
                 </a:solidFill>
@@ -1911,7 +1911,7 @@
               </a14:hiddenLine>
             </a:ext>
             <a:ext uri="{AF507438-7753-43e0-B8FC-AC1667EBCBE1}">
-              <a14:hiddenEffects xmlns="" xmlns:a14="http://schemas.microsoft.com/office/drawing/2010/main">
+              <a14:hiddenEffects xmlns:a14="http://schemas.microsoft.com/office/drawing/2010/main" xmlns="">
                 <a:effectLst>
                   <a:outerShdw blurRad="63500" dist="38099" dir="2700000" algn="ctr" rotWithShape="0">
                     <a:schemeClr val="bg2">
@@ -2175,17 +2175,17 @@
           <a:effectLst/>
           <a:extLst>
             <a:ext uri="{FAA26D3D-D897-4be2-8F04-BA451C77F1D7}">
-              <ma14:placeholderFlag xmlns="" xmlns:ma14="http://schemas.microsoft.com/office/mac/drawingml/2011/main" val="1"/>
+              <ma14:placeholderFlag xmlns:ma14="http://schemas.microsoft.com/office/mac/drawingml/2011/main" xmlns="" val="1"/>
             </a:ext>
             <a:ext uri="{909E8E84-426E-40dd-AFC4-6F175D3DCCD1}">
-              <a14:hiddenFill xmlns="" xmlns:a14="http://schemas.microsoft.com/office/drawing/2010/main">
+              <a14:hiddenFill xmlns:a14="http://schemas.microsoft.com/office/drawing/2010/main" xmlns="">
                 <a:solidFill>
                   <a:schemeClr val="accent1"/>
                 </a:solidFill>
               </a14:hiddenFill>
             </a:ext>
             <a:ext uri="{91240B29-F687-4f45-9708-019B960494DF}">
-              <a14:hiddenLine xmlns="" xmlns:a14="http://schemas.microsoft.com/office/drawing/2010/main" w="9525">
+              <a14:hiddenLine xmlns:a14="http://schemas.microsoft.com/office/drawing/2010/main" xmlns="" w="9525">
                 <a:solidFill>
                   <a:schemeClr val="tx1"/>
                 </a:solidFill>
@@ -2195,7 +2195,7 @@
               </a14:hiddenLine>
             </a:ext>
             <a:ext uri="{AF507438-7753-43e0-B8FC-AC1667EBCBE1}">
-              <a14:hiddenEffects xmlns="" xmlns:a14="http://schemas.microsoft.com/office/drawing/2010/main">
+              <a14:hiddenEffects xmlns:a14="http://schemas.microsoft.com/office/drawing/2010/main" xmlns="">
                 <a:effectLst>
                   <a:outerShdw blurRad="63500" dist="38099" dir="2700000" algn="ctr" rotWithShape="0">
                     <a:schemeClr val="bg2">
@@ -2481,17 +2481,17 @@
           <a:effectLst/>
           <a:extLst>
             <a:ext uri="{FAA26D3D-D897-4be2-8F04-BA451C77F1D7}">
-              <ma14:placeholderFlag xmlns="" xmlns:ma14="http://schemas.microsoft.com/office/mac/drawingml/2011/main" val="1"/>
+              <ma14:placeholderFlag xmlns:ma14="http://schemas.microsoft.com/office/mac/drawingml/2011/main" xmlns="" val="1"/>
             </a:ext>
             <a:ext uri="{909E8E84-426E-40dd-AFC4-6F175D3DCCD1}">
-              <a14:hiddenFill xmlns="" xmlns:a14="http://schemas.microsoft.com/office/drawing/2010/main">
+              <a14:hiddenFill xmlns:a14="http://schemas.microsoft.com/office/drawing/2010/main" xmlns="">
                 <a:solidFill>
                   <a:schemeClr val="accent1"/>
                 </a:solidFill>
               </a14:hiddenFill>
             </a:ext>
             <a:ext uri="{91240B29-F687-4f45-9708-019B960494DF}">
-              <a14:hiddenLine xmlns="" xmlns:a14="http://schemas.microsoft.com/office/drawing/2010/main" w="9525">
+              <a14:hiddenLine xmlns:a14="http://schemas.microsoft.com/office/drawing/2010/main" xmlns="" w="9525">
                 <a:solidFill>
                   <a:schemeClr val="tx1"/>
                 </a:solidFill>
@@ -2501,7 +2501,7 @@
               </a14:hiddenLine>
             </a:ext>
             <a:ext uri="{AF507438-7753-43e0-B8FC-AC1667EBCBE1}">
-              <a14:hiddenEffects xmlns="" xmlns:a14="http://schemas.microsoft.com/office/drawing/2010/main">
+              <a14:hiddenEffects xmlns:a14="http://schemas.microsoft.com/office/drawing/2010/main" xmlns="">
                 <a:effectLst>
                   <a:outerShdw blurRad="63500" dist="38099" dir="2700000" algn="ctr" rotWithShape="0">
                     <a:schemeClr val="bg2">
@@ -2883,17 +2883,17 @@
           <a:effectLst/>
           <a:extLst>
             <a:ext uri="{FAA26D3D-D897-4be2-8F04-BA451C77F1D7}">
-              <ma14:placeholderFlag xmlns="" xmlns:ma14="http://schemas.microsoft.com/office/mac/drawingml/2011/main" val="1"/>
+              <ma14:placeholderFlag xmlns:ma14="http://schemas.microsoft.com/office/mac/drawingml/2011/main" xmlns="" val="1"/>
             </a:ext>
             <a:ext uri="{909E8E84-426E-40dd-AFC4-6F175D3DCCD1}">
-              <a14:hiddenFill xmlns="" xmlns:a14="http://schemas.microsoft.com/office/drawing/2010/main">
+              <a14:hiddenFill xmlns:a14="http://schemas.microsoft.com/office/drawing/2010/main" xmlns="">
                 <a:solidFill>
                   <a:schemeClr val="accent1"/>
                 </a:solidFill>
               </a14:hiddenFill>
             </a:ext>
             <a:ext uri="{91240B29-F687-4f45-9708-019B960494DF}">
-              <a14:hiddenLine xmlns="" xmlns:a14="http://schemas.microsoft.com/office/drawing/2010/main" w="9525">
+              <a14:hiddenLine xmlns:a14="http://schemas.microsoft.com/office/drawing/2010/main" xmlns="" w="9525">
                 <a:solidFill>
                   <a:schemeClr val="tx1"/>
                 </a:solidFill>
@@ -2903,7 +2903,7 @@
               </a14:hiddenLine>
             </a:ext>
             <a:ext uri="{AF507438-7753-43e0-B8FC-AC1667EBCBE1}">
-              <a14:hiddenEffects xmlns="" xmlns:a14="http://schemas.microsoft.com/office/drawing/2010/main">
+              <a14:hiddenEffects xmlns:a14="http://schemas.microsoft.com/office/drawing/2010/main" xmlns="">
                 <a:effectLst>
                   <a:outerShdw blurRad="63500" dist="38099" dir="2700000" algn="ctr" rotWithShape="0">
                     <a:schemeClr val="bg2">
@@ -3419,17 +3419,17 @@
           <a:effectLst/>
           <a:extLst>
             <a:ext uri="{FAA26D3D-D897-4be2-8F04-BA451C77F1D7}">
-              <ma14:placeholderFlag xmlns="" xmlns:ma14="http://schemas.microsoft.com/office/mac/drawingml/2011/main" val="1"/>
+              <ma14:placeholderFlag xmlns:ma14="http://schemas.microsoft.com/office/mac/drawingml/2011/main" xmlns="" val="1"/>
             </a:ext>
             <a:ext uri="{909E8E84-426E-40dd-AFC4-6F175D3DCCD1}">
-              <a14:hiddenFill xmlns="" xmlns:a14="http://schemas.microsoft.com/office/drawing/2010/main">
+              <a14:hiddenFill xmlns:a14="http://schemas.microsoft.com/office/drawing/2010/main" xmlns="">
                 <a:solidFill>
                   <a:schemeClr val="accent1"/>
                 </a:solidFill>
               </a14:hiddenFill>
             </a:ext>
             <a:ext uri="{91240B29-F687-4f45-9708-019B960494DF}">
-              <a14:hiddenLine xmlns="" xmlns:a14="http://schemas.microsoft.com/office/drawing/2010/main" w="9525">
+              <a14:hiddenLine xmlns:a14="http://schemas.microsoft.com/office/drawing/2010/main" xmlns="" w="9525">
                 <a:solidFill>
                   <a:schemeClr val="tx1"/>
                 </a:solidFill>
@@ -3439,7 +3439,7 @@
               </a14:hiddenLine>
             </a:ext>
             <a:ext uri="{AF507438-7753-43e0-B8FC-AC1667EBCBE1}">
-              <a14:hiddenEffects xmlns="" xmlns:a14="http://schemas.microsoft.com/office/drawing/2010/main">
+              <a14:hiddenEffects xmlns:a14="http://schemas.microsoft.com/office/drawing/2010/main" xmlns="">
                 <a:effectLst>
                   <a:outerShdw blurRad="63500" dist="38099" dir="2700000" algn="ctr" rotWithShape="0">
                     <a:schemeClr val="bg2">
@@ -3651,17 +3651,17 @@
           <a:effectLst/>
           <a:extLst>
             <a:ext uri="{FAA26D3D-D897-4be2-8F04-BA451C77F1D7}">
-              <ma14:placeholderFlag xmlns="" xmlns:ma14="http://schemas.microsoft.com/office/mac/drawingml/2011/main" val="1"/>
+              <ma14:placeholderFlag xmlns:ma14="http://schemas.microsoft.com/office/mac/drawingml/2011/main" xmlns="" val="1"/>
             </a:ext>
             <a:ext uri="{909E8E84-426E-40dd-AFC4-6F175D3DCCD1}">
-              <a14:hiddenFill xmlns="" xmlns:a14="http://schemas.microsoft.com/office/drawing/2010/main">
+              <a14:hiddenFill xmlns:a14="http://schemas.microsoft.com/office/drawing/2010/main" xmlns="">
                 <a:solidFill>
                   <a:schemeClr val="accent1"/>
                 </a:solidFill>
               </a14:hiddenFill>
             </a:ext>
             <a:ext uri="{91240B29-F687-4f45-9708-019B960494DF}">
-              <a14:hiddenLine xmlns="" xmlns:a14="http://schemas.microsoft.com/office/drawing/2010/main" w="9525">
+              <a14:hiddenLine xmlns:a14="http://schemas.microsoft.com/office/drawing/2010/main" xmlns="" w="9525">
                 <a:solidFill>
                   <a:schemeClr val="tx1"/>
                 </a:solidFill>
@@ -3671,7 +3671,7 @@
               </a14:hiddenLine>
             </a:ext>
             <a:ext uri="{AF507438-7753-43e0-B8FC-AC1667EBCBE1}">
-              <a14:hiddenEffects xmlns="" xmlns:a14="http://schemas.microsoft.com/office/drawing/2010/main">
+              <a14:hiddenEffects xmlns:a14="http://schemas.microsoft.com/office/drawing/2010/main" xmlns="">
                 <a:effectLst>
                   <a:outerShdw blurRad="63500" dist="38099" dir="2700000" algn="ctr" rotWithShape="0">
                     <a:schemeClr val="bg2">
@@ -3860,17 +3860,17 @@
           <a:effectLst/>
           <a:extLst>
             <a:ext uri="{FAA26D3D-D897-4be2-8F04-BA451C77F1D7}">
-              <ma14:placeholderFlag xmlns="" xmlns:ma14="http://schemas.microsoft.com/office/mac/drawingml/2011/main" val="1"/>
+              <ma14:placeholderFlag xmlns:ma14="http://schemas.microsoft.com/office/mac/drawingml/2011/main" xmlns="" val="1"/>
             </a:ext>
             <a:ext uri="{909E8E84-426E-40dd-AFC4-6F175D3DCCD1}">
-              <a14:hiddenFill xmlns="" xmlns:a14="http://schemas.microsoft.com/office/drawing/2010/main">
+              <a14:hiddenFill xmlns:a14="http://schemas.microsoft.com/office/drawing/2010/main" xmlns="">
                 <a:solidFill>
                   <a:schemeClr val="accent1"/>
                 </a:solidFill>
               </a14:hiddenFill>
             </a:ext>
             <a:ext uri="{91240B29-F687-4f45-9708-019B960494DF}">
-              <a14:hiddenLine xmlns="" xmlns:a14="http://schemas.microsoft.com/office/drawing/2010/main" w="9525">
+              <a14:hiddenLine xmlns:a14="http://schemas.microsoft.com/office/drawing/2010/main" xmlns="" w="9525">
                 <a:solidFill>
                   <a:schemeClr val="tx1"/>
                 </a:solidFill>
@@ -3880,7 +3880,7 @@
               </a14:hiddenLine>
             </a:ext>
             <a:ext uri="{AF507438-7753-43e0-B8FC-AC1667EBCBE1}">
-              <a14:hiddenEffects xmlns="" xmlns:a14="http://schemas.microsoft.com/office/drawing/2010/main">
+              <a14:hiddenEffects xmlns:a14="http://schemas.microsoft.com/office/drawing/2010/main" xmlns="">
                 <a:effectLst>
                   <a:outerShdw blurRad="63500" dist="38099" dir="2700000" algn="ctr" rotWithShape="0">
                     <a:schemeClr val="bg2">
@@ -4251,17 +4251,17 @@
           <a:effectLst/>
           <a:extLst>
             <a:ext uri="{FAA26D3D-D897-4be2-8F04-BA451C77F1D7}">
-              <ma14:placeholderFlag xmlns="" xmlns:ma14="http://schemas.microsoft.com/office/mac/drawingml/2011/main" val="1"/>
+              <ma14:placeholderFlag xmlns:ma14="http://schemas.microsoft.com/office/mac/drawingml/2011/main" xmlns="" val="1"/>
             </a:ext>
             <a:ext uri="{909E8E84-426E-40dd-AFC4-6F175D3DCCD1}">
-              <a14:hiddenFill xmlns="" xmlns:a14="http://schemas.microsoft.com/office/drawing/2010/main">
+              <a14:hiddenFill xmlns:a14="http://schemas.microsoft.com/office/drawing/2010/main" xmlns="">
                 <a:solidFill>
                   <a:schemeClr val="accent1"/>
                 </a:solidFill>
               </a14:hiddenFill>
             </a:ext>
             <a:ext uri="{91240B29-F687-4f45-9708-019B960494DF}">
-              <a14:hiddenLine xmlns="" xmlns:a14="http://schemas.microsoft.com/office/drawing/2010/main" w="9525">
+              <a14:hiddenLine xmlns:a14="http://schemas.microsoft.com/office/drawing/2010/main" xmlns="" w="9525">
                 <a:solidFill>
                   <a:schemeClr val="tx1"/>
                 </a:solidFill>
@@ -4271,7 +4271,7 @@
               </a14:hiddenLine>
             </a:ext>
             <a:ext uri="{AF507438-7753-43e0-B8FC-AC1667EBCBE1}">
-              <a14:hiddenEffects xmlns="" xmlns:a14="http://schemas.microsoft.com/office/drawing/2010/main">
+              <a14:hiddenEffects xmlns:a14="http://schemas.microsoft.com/office/drawing/2010/main" xmlns="">
                 <a:effectLst>
                   <a:outerShdw blurRad="63500" dist="38099" dir="2700000" algn="ctr" rotWithShape="0">
                     <a:schemeClr val="bg2">
@@ -4619,17 +4619,17 @@
           <a:effectLst/>
           <a:extLst>
             <a:ext uri="{FAA26D3D-D897-4be2-8F04-BA451C77F1D7}">
-              <ma14:placeholderFlag xmlns="" xmlns:ma14="http://schemas.microsoft.com/office/mac/drawingml/2011/main" val="1"/>
+              <ma14:placeholderFlag xmlns:ma14="http://schemas.microsoft.com/office/mac/drawingml/2011/main" xmlns="" val="1"/>
             </a:ext>
             <a:ext uri="{909E8E84-426E-40dd-AFC4-6F175D3DCCD1}">
-              <a14:hiddenFill xmlns="" xmlns:a14="http://schemas.microsoft.com/office/drawing/2010/main">
+              <a14:hiddenFill xmlns:a14="http://schemas.microsoft.com/office/drawing/2010/main" xmlns="">
                 <a:solidFill>
                   <a:schemeClr val="accent1"/>
                 </a:solidFill>
               </a14:hiddenFill>
             </a:ext>
             <a:ext uri="{91240B29-F687-4f45-9708-019B960494DF}">
-              <a14:hiddenLine xmlns="" xmlns:a14="http://schemas.microsoft.com/office/drawing/2010/main" w="9525">
+              <a14:hiddenLine xmlns:a14="http://schemas.microsoft.com/office/drawing/2010/main" xmlns="" w="9525">
                 <a:solidFill>
                   <a:schemeClr val="tx1"/>
                 </a:solidFill>
@@ -4639,7 +4639,7 @@
               </a14:hiddenLine>
             </a:ext>
             <a:ext uri="{AF507438-7753-43e0-B8FC-AC1667EBCBE1}">
-              <a14:hiddenEffects xmlns="" xmlns:a14="http://schemas.microsoft.com/office/drawing/2010/main">
+              <a14:hiddenEffects xmlns:a14="http://schemas.microsoft.com/office/drawing/2010/main" xmlns="">
                 <a:effectLst>
                   <a:outerShdw blurRad="63500" dist="38099" dir="2700000" algn="ctr" rotWithShape="0">
                     <a:schemeClr val="bg2">
@@ -4766,17 +4766,17 @@
           <a:effectLst/>
           <a:extLst>
             <a:ext uri="{FAA26D3D-D897-4be2-8F04-BA451C77F1D7}">
-              <ma14:placeholderFlag xmlns="" xmlns:ma14="http://schemas.microsoft.com/office/mac/drawingml/2011/main" val="1"/>
+              <ma14:placeholderFlag xmlns:ma14="http://schemas.microsoft.com/office/mac/drawingml/2011/main" xmlns="" val="1"/>
             </a:ext>
             <a:ext uri="{909E8E84-426E-40dd-AFC4-6F175D3DCCD1}">
-              <a14:hiddenFill xmlns="" xmlns:a14="http://schemas.microsoft.com/office/drawing/2010/main">
+              <a14:hiddenFill xmlns:a14="http://schemas.microsoft.com/office/drawing/2010/main" xmlns="">
                 <a:solidFill>
                   <a:schemeClr val="accent1"/>
                 </a:solidFill>
               </a14:hiddenFill>
             </a:ext>
             <a:ext uri="{91240B29-F687-4f45-9708-019B960494DF}">
-              <a14:hiddenLine xmlns="" xmlns:a14="http://schemas.microsoft.com/office/drawing/2010/main" w="9525">
+              <a14:hiddenLine xmlns:a14="http://schemas.microsoft.com/office/drawing/2010/main" xmlns="" w="9525">
                 <a:solidFill>
                   <a:schemeClr val="tx1"/>
                 </a:solidFill>
@@ -4786,7 +4786,7 @@
               </a14:hiddenLine>
             </a:ext>
             <a:ext uri="{AF507438-7753-43e0-B8FC-AC1667EBCBE1}">
-              <a14:hiddenEffects xmlns="" xmlns:a14="http://schemas.microsoft.com/office/drawing/2010/main">
+              <a14:hiddenEffects xmlns:a14="http://schemas.microsoft.com/office/drawing/2010/main" xmlns="">
                 <a:effectLst>
                   <a:outerShdw blurRad="63500" dist="38099" dir="2700000" algn="ctr" rotWithShape="0">
                     <a:schemeClr val="bg2">
@@ -4839,17 +4839,17 @@
           <a:effectLst/>
           <a:extLst>
             <a:ext uri="{FAA26D3D-D897-4be2-8F04-BA451C77F1D7}">
-              <ma14:placeholderFlag xmlns="" xmlns:ma14="http://schemas.microsoft.com/office/mac/drawingml/2011/main" val="1"/>
+              <ma14:placeholderFlag xmlns:ma14="http://schemas.microsoft.com/office/mac/drawingml/2011/main" xmlns="" val="1"/>
             </a:ext>
             <a:ext uri="{909E8E84-426E-40dd-AFC4-6F175D3DCCD1}">
-              <a14:hiddenFill xmlns="" xmlns:a14="http://schemas.microsoft.com/office/drawing/2010/main">
+              <a14:hiddenFill xmlns:a14="http://schemas.microsoft.com/office/drawing/2010/main" xmlns="">
                 <a:solidFill>
                   <a:schemeClr val="accent1"/>
                 </a:solidFill>
               </a14:hiddenFill>
             </a:ext>
             <a:ext uri="{91240B29-F687-4f45-9708-019B960494DF}">
-              <a14:hiddenLine xmlns="" xmlns:a14="http://schemas.microsoft.com/office/drawing/2010/main" w="9525">
+              <a14:hiddenLine xmlns:a14="http://schemas.microsoft.com/office/drawing/2010/main" xmlns="" w="9525">
                 <a:solidFill>
                   <a:schemeClr val="tx1"/>
                 </a:solidFill>
@@ -4859,7 +4859,7 @@
               </a14:hiddenLine>
             </a:ext>
             <a:ext uri="{AF507438-7753-43e0-B8FC-AC1667EBCBE1}">
-              <a14:hiddenEffects xmlns="" xmlns:a14="http://schemas.microsoft.com/office/drawing/2010/main">
+              <a14:hiddenEffects xmlns:a14="http://schemas.microsoft.com/office/drawing/2010/main" xmlns="">
                 <a:effectLst>
                   <a:outerShdw blurRad="63500" dist="38099" dir="2700000" algn="ctr" rotWithShape="0">
                     <a:schemeClr val="bg2">
@@ -4940,17 +4940,17 @@
           <a:effectLst/>
           <a:extLst>
             <a:ext uri="{FAA26D3D-D897-4be2-8F04-BA451C77F1D7}">
-              <ma14:placeholderFlag xmlns="" xmlns:ma14="http://schemas.microsoft.com/office/mac/drawingml/2011/main" val="1"/>
+              <ma14:placeholderFlag xmlns:ma14="http://schemas.microsoft.com/office/mac/drawingml/2011/main" xmlns="" val="1"/>
             </a:ext>
             <a:ext uri="{909E8E84-426E-40dd-AFC4-6F175D3DCCD1}">
-              <a14:hiddenFill xmlns="" xmlns:a14="http://schemas.microsoft.com/office/drawing/2010/main">
+              <a14:hiddenFill xmlns:a14="http://schemas.microsoft.com/office/drawing/2010/main" xmlns="">
                 <a:solidFill>
                   <a:schemeClr val="accent1"/>
                 </a:solidFill>
               </a14:hiddenFill>
             </a:ext>
             <a:ext uri="{91240B29-F687-4f45-9708-019B960494DF}">
-              <a14:hiddenLine xmlns="" xmlns:a14="http://schemas.microsoft.com/office/drawing/2010/main" w="9525">
+              <a14:hiddenLine xmlns:a14="http://schemas.microsoft.com/office/drawing/2010/main" xmlns="" w="9525">
                 <a:solidFill>
                   <a:schemeClr val="tx1"/>
                 </a:solidFill>
@@ -4960,7 +4960,7 @@
               </a14:hiddenLine>
             </a:ext>
             <a:ext uri="{AF507438-7753-43e0-B8FC-AC1667EBCBE1}">
-              <a14:hiddenEffects xmlns="" xmlns:a14="http://schemas.microsoft.com/office/drawing/2010/main">
+              <a14:hiddenEffects xmlns:a14="http://schemas.microsoft.com/office/drawing/2010/main" xmlns="">
                 <a:effectLst>
                   <a:outerShdw blurRad="63500" dist="38099" dir="2700000" algn="ctr" rotWithShape="0">
                     <a:schemeClr val="bg2">
@@ -5030,17 +5030,17 @@
           <a:effectLst/>
           <a:extLst>
             <a:ext uri="{FAA26D3D-D897-4be2-8F04-BA451C77F1D7}">
-              <ma14:placeholderFlag xmlns="" xmlns:ma14="http://schemas.microsoft.com/office/mac/drawingml/2011/main" val="1"/>
+              <ma14:placeholderFlag xmlns:ma14="http://schemas.microsoft.com/office/mac/drawingml/2011/main" xmlns="" val="1"/>
             </a:ext>
             <a:ext uri="{909E8E84-426E-40dd-AFC4-6F175D3DCCD1}">
-              <a14:hiddenFill xmlns="" xmlns:a14="http://schemas.microsoft.com/office/drawing/2010/main">
+              <a14:hiddenFill xmlns:a14="http://schemas.microsoft.com/office/drawing/2010/main" xmlns="">
                 <a:solidFill>
                   <a:schemeClr val="accent1"/>
                 </a:solidFill>
               </a14:hiddenFill>
             </a:ext>
             <a:ext uri="{91240B29-F687-4f45-9708-019B960494DF}">
-              <a14:hiddenLine xmlns="" xmlns:a14="http://schemas.microsoft.com/office/drawing/2010/main" w="9525">
+              <a14:hiddenLine xmlns:a14="http://schemas.microsoft.com/office/drawing/2010/main" xmlns="" w="9525">
                 <a:solidFill>
                   <a:schemeClr val="tx1"/>
                 </a:solidFill>
@@ -5050,7 +5050,7 @@
               </a14:hiddenLine>
             </a:ext>
             <a:ext uri="{AF507438-7753-43e0-B8FC-AC1667EBCBE1}">
-              <a14:hiddenEffects xmlns="" xmlns:a14="http://schemas.microsoft.com/office/drawing/2010/main">
+              <a14:hiddenEffects xmlns:a14="http://schemas.microsoft.com/office/drawing/2010/main" xmlns="">
                 <a:effectLst>
                   <a:outerShdw blurRad="63500" dist="38099" dir="2700000" algn="ctr" rotWithShape="0">
                     <a:schemeClr val="bg2">
@@ -5126,17 +5126,17 @@
           <a:effectLst/>
           <a:extLst>
             <a:ext uri="{FAA26D3D-D897-4be2-8F04-BA451C77F1D7}">
-              <ma14:placeholderFlag xmlns="" xmlns:ma14="http://schemas.microsoft.com/office/mac/drawingml/2011/main" val="1"/>
+              <ma14:placeholderFlag xmlns:ma14="http://schemas.microsoft.com/office/mac/drawingml/2011/main" xmlns="" val="1"/>
             </a:ext>
             <a:ext uri="{909E8E84-426E-40dd-AFC4-6F175D3DCCD1}">
-              <a14:hiddenFill xmlns="" xmlns:a14="http://schemas.microsoft.com/office/drawing/2010/main">
+              <a14:hiddenFill xmlns:a14="http://schemas.microsoft.com/office/drawing/2010/main" xmlns="">
                 <a:solidFill>
                   <a:schemeClr val="accent1"/>
                 </a:solidFill>
               </a14:hiddenFill>
             </a:ext>
             <a:ext uri="{91240B29-F687-4f45-9708-019B960494DF}">
-              <a14:hiddenLine xmlns="" xmlns:a14="http://schemas.microsoft.com/office/drawing/2010/main" w="9525">
+              <a14:hiddenLine xmlns:a14="http://schemas.microsoft.com/office/drawing/2010/main" xmlns="" w="9525">
                 <a:solidFill>
                   <a:schemeClr val="tx1"/>
                 </a:solidFill>
@@ -5146,7 +5146,7 @@
               </a14:hiddenLine>
             </a:ext>
             <a:ext uri="{AF507438-7753-43e0-B8FC-AC1667EBCBE1}">
-              <a14:hiddenEffects xmlns="" xmlns:a14="http://schemas.microsoft.com/office/drawing/2010/main">
+              <a14:hiddenEffects xmlns:a14="http://schemas.microsoft.com/office/drawing/2010/main" xmlns="">
                 <a:effectLst>
                   <a:outerShdw blurRad="63500" dist="38099" dir="2700000" algn="ctr" rotWithShape="0">
                     <a:schemeClr val="bg2">
@@ -10831,7 +10831,44 @@
                 </a:effectLst>
                 <a:latin typeface="Helvetica" pitchFamily="2" charset="0"/>
               </a:rPr>
-              <a:t>Connect local layer interface (Manually proof required)</a:t>
+              <a:t>Connect local layer interface </a:t>
+            </a:r>
+          </a:p>
+          <a:p>
+            <a:pPr algn="ctr"/>
+            <a:r>
+              <a:rPr lang="en-US" sz="1600" cap="none" spc="0">
+                <a:ln w="0"/>
+                <a:solidFill>
+                  <a:schemeClr val="tx1"/>
+                </a:solidFill>
+                <a:effectLst>
+                  <a:outerShdw blurRad="38100" dist="19050" dir="2700000" algn="tl" rotWithShape="0">
+                    <a:schemeClr val="dk1">
+                      <a:alpha val="40000"/>
+                    </a:schemeClr>
+                  </a:outerShdw>
+                </a:effectLst>
+                <a:latin typeface="Helvetica" pitchFamily="2" charset="0"/>
+              </a:rPr>
+              <a:t>(manual </a:t>
+            </a:r>
+            <a:r>
+              <a:rPr lang="en-US" sz="1600" cap="none" spc="0" dirty="0">
+                <a:ln w="0"/>
+                <a:solidFill>
+                  <a:schemeClr val="tx1"/>
+                </a:solidFill>
+                <a:effectLst>
+                  <a:outerShdw blurRad="38100" dist="19050" dir="2700000" algn="tl" rotWithShape="0">
+                    <a:schemeClr val="dk1">
+                      <a:alpha val="40000"/>
+                    </a:schemeClr>
+                  </a:outerShdw>
+                </a:effectLst>
+                <a:latin typeface="Helvetica" pitchFamily="2" charset="0"/>
+              </a:rPr>
+              <a:t>proof required)</a:t>
             </a:r>
           </a:p>
         </p:txBody>
@@ -11002,7 +11039,7 @@
           <a:effectLst/>
           <a:extLst>
             <a:ext uri="{AF507438-7753-43e0-B8FC-AC1667EBCBE1}">
-              <a14:hiddenEffects xmlns="" xmlns:a14="http://schemas.microsoft.com/office/drawing/2010/main">
+              <a14:hiddenEffects xmlns:a14="http://schemas.microsoft.com/office/drawing/2010/main" xmlns="">
                 <a:effectLst>
                   <a:outerShdw blurRad="63500" dist="38099" dir="2700000" algn="ctr" rotWithShape="0">
                     <a:schemeClr val="bg2">
@@ -11121,7 +11158,7 @@
           <a:effectLst/>
           <a:extLst>
             <a:ext uri="{AF507438-7753-43e0-B8FC-AC1667EBCBE1}">
-              <a14:hiddenEffects xmlns="" xmlns:a14="http://schemas.microsoft.com/office/drawing/2010/main">
+              <a14:hiddenEffects xmlns:a14="http://schemas.microsoft.com/office/drawing/2010/main" xmlns="">
                 <a:effectLst>
                   <a:outerShdw blurRad="63500" dist="38099" dir="2700000" algn="ctr" rotWithShape="0">
                     <a:schemeClr val="bg2">
@@ -15002,7 +15039,7 @@
           <a:effectLst/>
           <a:extLst>
             <a:ext uri="{AF507438-7753-43e0-B8FC-AC1667EBCBE1}">
-              <a14:hiddenEffects xmlns="" xmlns:a14="http://schemas.microsoft.com/office/drawing/2010/main">
+              <a14:hiddenEffects xmlns:a14="http://schemas.microsoft.com/office/drawing/2010/main" xmlns="">
                 <a:effectLst>
                   <a:outerShdw blurRad="63500" dist="38099" dir="2700000" algn="ctr" rotWithShape="0">
                     <a:schemeClr val="bg2">
@@ -15086,7 +15123,7 @@
           <a:effectLst/>
           <a:extLst>
             <a:ext uri="{AF507438-7753-43e0-B8FC-AC1667EBCBE1}">
-              <a14:hiddenEffects xmlns="" xmlns:a14="http://schemas.microsoft.com/office/drawing/2010/main">
+              <a14:hiddenEffects xmlns:a14="http://schemas.microsoft.com/office/drawing/2010/main" xmlns="">
                 <a:effectLst>
                   <a:outerShdw blurRad="63500" dist="38099" dir="2700000" algn="ctr" rotWithShape="0">
                     <a:schemeClr val="bg2">
@@ -15420,7 +15457,7 @@
           <a:effectLst/>
           <a:extLst>
             <a:ext uri="{AF507438-7753-43e0-B8FC-AC1667EBCBE1}">
-              <a14:hiddenEffects xmlns="" xmlns:a14="http://schemas.microsoft.com/office/drawing/2010/main">
+              <a14:hiddenEffects xmlns:a14="http://schemas.microsoft.com/office/drawing/2010/main" xmlns="">
                 <a:effectLst>
                   <a:outerShdw blurRad="63500" dist="38099" dir="2700000" algn="ctr" rotWithShape="0">
                     <a:schemeClr val="bg2">
@@ -15471,7 +15508,7 @@
           <a:effectLst/>
           <a:extLst>
             <a:ext uri="{AF507438-7753-43e0-B8FC-AC1667EBCBE1}">
-              <a14:hiddenEffects xmlns="" xmlns:a14="http://schemas.microsoft.com/office/drawing/2010/main">
+              <a14:hiddenEffects xmlns:a14="http://schemas.microsoft.com/office/drawing/2010/main" xmlns="">
                 <a:effectLst>
                   <a:outerShdw blurRad="63500" dist="38099" dir="2700000" algn="ctr" rotWithShape="0">
                     <a:schemeClr val="bg2">
@@ -15517,7 +15554,7 @@
           <a:effectLst/>
           <a:extLst>
             <a:ext uri="{AF507438-7753-43e0-B8FC-AC1667EBCBE1}">
-              <a14:hiddenEffects xmlns="" xmlns:a14="http://schemas.microsoft.com/office/drawing/2010/main">
+              <a14:hiddenEffects xmlns:a14="http://schemas.microsoft.com/office/drawing/2010/main" xmlns="">
                 <a:effectLst>
                   <a:outerShdw blurRad="63500" dist="38099" dir="2700000" algn="ctr" rotWithShape="0">
                     <a:schemeClr val="bg2">
@@ -15795,7 +15832,7 @@
           <a:effectLst/>
           <a:extLst>
             <a:ext uri="{AF507438-7753-43e0-B8FC-AC1667EBCBE1}">
-              <a14:hiddenEffects xmlns="" xmlns:a14="http://schemas.microsoft.com/office/drawing/2010/main">
+              <a14:hiddenEffects xmlns:a14="http://schemas.microsoft.com/office/drawing/2010/main" xmlns="">
                 <a:effectLst>
                   <a:outerShdw blurRad="63500" dist="38099" dir="2700000" algn="ctr" rotWithShape="0">
                     <a:schemeClr val="bg2">
@@ -15880,7 +15917,7 @@
           <a:effectLst/>
           <a:extLst>
             <a:ext uri="{AF507438-7753-43e0-B8FC-AC1667EBCBE1}">
-              <a14:hiddenEffects xmlns="" xmlns:a14="http://schemas.microsoft.com/office/drawing/2010/main">
+              <a14:hiddenEffects xmlns:a14="http://schemas.microsoft.com/office/drawing/2010/main" xmlns="">
                 <a:effectLst>
                   <a:outerShdw blurRad="63500" dist="38099" dir="2700000" algn="ctr" rotWithShape="0">
                     <a:schemeClr val="bg2">
@@ -15961,7 +15998,7 @@
           <a:effectLst/>
           <a:extLst>
             <a:ext uri="{AF507438-7753-43e0-B8FC-AC1667EBCBE1}">
-              <a14:hiddenEffects xmlns="" xmlns:a14="http://schemas.microsoft.com/office/drawing/2010/main">
+              <a14:hiddenEffects xmlns:a14="http://schemas.microsoft.com/office/drawing/2010/main" xmlns="">
                 <a:effectLst>
                   <a:outerShdw blurRad="63500" dist="38099" dir="2700000" algn="ctr" rotWithShape="0">
                     <a:schemeClr val="bg2">
@@ -16058,7 +16095,7 @@
           <a:effectLst/>
           <a:extLst>
             <a:ext uri="{AF507438-7753-43e0-B8FC-AC1667EBCBE1}">
-              <a14:hiddenEffects xmlns="" xmlns:a14="http://schemas.microsoft.com/office/drawing/2010/main">
+              <a14:hiddenEffects xmlns:a14="http://schemas.microsoft.com/office/drawing/2010/main" xmlns="">
                 <a:effectLst>
                   <a:outerShdw blurRad="63500" dist="38099" dir="2700000" algn="ctr" rotWithShape="0">
                     <a:schemeClr val="bg2">
@@ -16155,7 +16192,7 @@
           <a:effectLst/>
           <a:extLst>
             <a:ext uri="{AF507438-7753-43e0-B8FC-AC1667EBCBE1}">
-              <a14:hiddenEffects xmlns="" xmlns:a14="http://schemas.microsoft.com/office/drawing/2010/main">
+              <a14:hiddenEffects xmlns:a14="http://schemas.microsoft.com/office/drawing/2010/main" xmlns="">
                 <a:effectLst>
                   <a:outerShdw blurRad="63500" dist="38099" dir="2700000" algn="ctr" rotWithShape="0">
                     <a:schemeClr val="bg2">
@@ -16250,7 +16287,7 @@
           <a:effectLst/>
           <a:extLst>
             <a:ext uri="{AF507438-7753-43e0-B8FC-AC1667EBCBE1}">
-              <a14:hiddenEffects xmlns="" xmlns:a14="http://schemas.microsoft.com/office/drawing/2010/main">
+              <a14:hiddenEffects xmlns:a14="http://schemas.microsoft.com/office/drawing/2010/main" xmlns="">
                 <a:effectLst>
                   <a:outerShdw blurRad="63500" dist="38099" dir="2700000" algn="ctr" rotWithShape="0">
                     <a:schemeClr val="bg2">
@@ -16349,7 +16386,7 @@
           <a:effectLst/>
           <a:extLst>
             <a:ext uri="{AF507438-7753-43e0-B8FC-AC1667EBCBE1}">
-              <a14:hiddenEffects xmlns="" xmlns:a14="http://schemas.microsoft.com/office/drawing/2010/main">
+              <a14:hiddenEffects xmlns:a14="http://schemas.microsoft.com/office/drawing/2010/main" xmlns="">
                 <a:effectLst>
                   <a:outerShdw blurRad="63500" dist="38099" dir="2700000" algn="ctr" rotWithShape="0">
                     <a:schemeClr val="bg2">
@@ -16399,7 +16436,7 @@
           <a:effectLst/>
           <a:extLst>
             <a:ext uri="{AF507438-7753-43e0-B8FC-AC1667EBCBE1}">
-              <a14:hiddenEffects xmlns="" xmlns:a14="http://schemas.microsoft.com/office/drawing/2010/main">
+              <a14:hiddenEffects xmlns:a14="http://schemas.microsoft.com/office/drawing/2010/main" xmlns="">
                 <a:effectLst>
                   <a:outerShdw blurRad="63500" dist="38099" dir="2700000" algn="ctr" rotWithShape="0">
                     <a:schemeClr val="bg2">
@@ -16483,7 +16520,7 @@
           <a:effectLst/>
           <a:extLst>
             <a:ext uri="{AF507438-7753-43e0-B8FC-AC1667EBCBE1}">
-              <a14:hiddenEffects xmlns="" xmlns:a14="http://schemas.microsoft.com/office/drawing/2010/main">
+              <a14:hiddenEffects xmlns:a14="http://schemas.microsoft.com/office/drawing/2010/main" xmlns="">
                 <a:effectLst>
                   <a:outerShdw blurRad="63500" dist="38099" dir="2700000" algn="ctr" rotWithShape="0">
                     <a:schemeClr val="bg2">
@@ -16533,7 +16570,7 @@
           <a:effectLst/>
           <a:extLst>
             <a:ext uri="{AF507438-7753-43e0-B8FC-AC1667EBCBE1}">
-              <a14:hiddenEffects xmlns="" xmlns:a14="http://schemas.microsoft.com/office/drawing/2010/main">
+              <a14:hiddenEffects xmlns:a14="http://schemas.microsoft.com/office/drawing/2010/main" xmlns="">
                 <a:effectLst>
                   <a:outerShdw blurRad="63500" dist="38099" dir="2700000" algn="ctr" rotWithShape="0">
                     <a:schemeClr val="bg2">
@@ -16581,7 +16618,7 @@
           <a:effectLst/>
           <a:extLst>
             <a:ext uri="{AF507438-7753-43e0-B8FC-AC1667EBCBE1}">
-              <a14:hiddenEffects xmlns="" xmlns:a14="http://schemas.microsoft.com/office/drawing/2010/main">
+              <a14:hiddenEffects xmlns:a14="http://schemas.microsoft.com/office/drawing/2010/main" xmlns="">
                 <a:effectLst>
                   <a:outerShdw blurRad="63500" dist="38099" dir="2700000" algn="ctr" rotWithShape="0">
                     <a:schemeClr val="bg2">
@@ -16676,7 +16713,7 @@
           <a:effectLst/>
           <a:extLst>
             <a:ext uri="{AF507438-7753-43e0-B8FC-AC1667EBCBE1}">
-              <a14:hiddenEffects xmlns="" xmlns:a14="http://schemas.microsoft.com/office/drawing/2010/main">
+              <a14:hiddenEffects xmlns:a14="http://schemas.microsoft.com/office/drawing/2010/main" xmlns="">
                 <a:effectLst>
                   <a:outerShdw blurRad="63500" dist="38099" dir="2700000" algn="ctr" rotWithShape="0">
                     <a:schemeClr val="bg2">
@@ -16771,7 +16808,7 @@
           <a:effectLst/>
           <a:extLst>
             <a:ext uri="{AF507438-7753-43e0-B8FC-AC1667EBCBE1}">
-              <a14:hiddenEffects xmlns="" xmlns:a14="http://schemas.microsoft.com/office/drawing/2010/main">
+              <a14:hiddenEffects xmlns:a14="http://schemas.microsoft.com/office/drawing/2010/main" xmlns="">
                 <a:effectLst>
                   <a:outerShdw blurRad="63500" dist="38099" dir="2700000" algn="ctr" rotWithShape="0">
                     <a:schemeClr val="bg2">
@@ -16868,7 +16905,7 @@
           <a:effectLst/>
           <a:extLst>
             <a:ext uri="{AF507438-7753-43e0-B8FC-AC1667EBCBE1}">
-              <a14:hiddenEffects xmlns="" xmlns:a14="http://schemas.microsoft.com/office/drawing/2010/main">
+              <a14:hiddenEffects xmlns:a14="http://schemas.microsoft.com/office/drawing/2010/main" xmlns="">
                 <a:effectLst>
                   <a:outerShdw blurRad="63500" dist="38099" dir="2700000" algn="ctr" rotWithShape="0">
                     <a:schemeClr val="bg2">
@@ -16963,7 +17000,7 @@
           <a:effectLst/>
           <a:extLst>
             <a:ext uri="{AF507438-7753-43e0-B8FC-AC1667EBCBE1}">
-              <a14:hiddenEffects xmlns="" xmlns:a14="http://schemas.microsoft.com/office/drawing/2010/main">
+              <a14:hiddenEffects xmlns:a14="http://schemas.microsoft.com/office/drawing/2010/main" xmlns="">
                 <a:effectLst>
                   <a:outerShdw blurRad="63500" dist="38099" dir="2700000" algn="ctr" rotWithShape="0">
                     <a:schemeClr val="bg2">
@@ -17345,8 +17382,8 @@
           </p:sp>
         </mc:Fallback>
       </mc:AlternateContent>
-      <mc:AlternateContent xmlns:mc="http://schemas.openxmlformats.org/markup-compatibility/2006">
-        <mc:Choice xmlns:a14="http://schemas.microsoft.com/office/drawing/2010/main" Requires="a14">
+      <mc:AlternateContent xmlns:mc="http://schemas.openxmlformats.org/markup-compatibility/2006" xmlns:a14="http://schemas.microsoft.com/office/drawing/2010/main">
+        <mc:Choice Requires="a14">
           <p:sp>
             <p:nvSpPr>
               <p:cNvPr id="33" name="Rectangle 32">
@@ -17768,7 +17805,7 @@
             </p:txBody>
           </p:sp>
         </mc:Choice>
-        <mc:Fallback>
+        <mc:Fallback xmlns="">
           <p:sp>
             <p:nvSpPr>
               <p:cNvPr id="33" name="Rectangle 32">
@@ -17848,7 +17885,7 @@
           <a:effectLst/>
           <a:extLst>
             <a:ext uri="{AF507438-7753-43e0-B8FC-AC1667EBCBE1}">
-              <a14:hiddenEffects xmlns="" xmlns:a14="http://schemas.microsoft.com/office/drawing/2010/main">
+              <a14:hiddenEffects xmlns:a14="http://schemas.microsoft.com/office/drawing/2010/main" xmlns="">
                 <a:effectLst>
                   <a:outerShdw blurRad="63500" dist="38099" dir="2700000" algn="ctr" rotWithShape="0">
                     <a:schemeClr val="bg2">
@@ -18123,7 +18160,7 @@
           <a:effectLst/>
           <a:extLst>
             <a:ext uri="{AF507438-7753-43e0-B8FC-AC1667EBCBE1}">
-              <a14:hiddenEffects xmlns="" xmlns:a14="http://schemas.microsoft.com/office/drawing/2010/main">
+              <a14:hiddenEffects xmlns:a14="http://schemas.microsoft.com/office/drawing/2010/main" xmlns="">
                 <a:effectLst>
                   <a:outerShdw blurRad="63500" dist="38099" dir="2700000" algn="ctr" rotWithShape="0">
                     <a:schemeClr val="bg2">
@@ -18208,7 +18245,7 @@
           <a:effectLst/>
           <a:extLst>
             <a:ext uri="{AF507438-7753-43e0-B8FC-AC1667EBCBE1}">
-              <a14:hiddenEffects xmlns="" xmlns:a14="http://schemas.microsoft.com/office/drawing/2010/main">
+              <a14:hiddenEffects xmlns:a14="http://schemas.microsoft.com/office/drawing/2010/main" xmlns="">
                 <a:effectLst>
                   <a:outerShdw blurRad="63500" dist="38099" dir="2700000" algn="ctr" rotWithShape="0">
                     <a:schemeClr val="bg2">
@@ -18289,7 +18326,7 @@
           <a:effectLst/>
           <a:extLst>
             <a:ext uri="{AF507438-7753-43e0-B8FC-AC1667EBCBE1}">
-              <a14:hiddenEffects xmlns="" xmlns:a14="http://schemas.microsoft.com/office/drawing/2010/main">
+              <a14:hiddenEffects xmlns:a14="http://schemas.microsoft.com/office/drawing/2010/main" xmlns="">
                 <a:effectLst>
                   <a:outerShdw blurRad="63500" dist="38099" dir="2700000" algn="ctr" rotWithShape="0">
                     <a:schemeClr val="bg2">
@@ -18386,7 +18423,7 @@
           <a:effectLst/>
           <a:extLst>
             <a:ext uri="{AF507438-7753-43e0-B8FC-AC1667EBCBE1}">
-              <a14:hiddenEffects xmlns="" xmlns:a14="http://schemas.microsoft.com/office/drawing/2010/main">
+              <a14:hiddenEffects xmlns:a14="http://schemas.microsoft.com/office/drawing/2010/main" xmlns="">
                 <a:effectLst>
                   <a:outerShdw blurRad="63500" dist="38099" dir="2700000" algn="ctr" rotWithShape="0">
                     <a:schemeClr val="bg2">
@@ -18483,7 +18520,7 @@
           <a:effectLst/>
           <a:extLst>
             <a:ext uri="{AF507438-7753-43e0-B8FC-AC1667EBCBE1}">
-              <a14:hiddenEffects xmlns="" xmlns:a14="http://schemas.microsoft.com/office/drawing/2010/main">
+              <a14:hiddenEffects xmlns:a14="http://schemas.microsoft.com/office/drawing/2010/main" xmlns="">
                 <a:effectLst>
                   <a:outerShdw blurRad="63500" dist="38099" dir="2700000" algn="ctr" rotWithShape="0">
                     <a:schemeClr val="bg2">
@@ -18578,7 +18615,7 @@
           <a:effectLst/>
           <a:extLst>
             <a:ext uri="{AF507438-7753-43e0-B8FC-AC1667EBCBE1}">
-              <a14:hiddenEffects xmlns="" xmlns:a14="http://schemas.microsoft.com/office/drawing/2010/main">
+              <a14:hiddenEffects xmlns:a14="http://schemas.microsoft.com/office/drawing/2010/main" xmlns="">
                 <a:effectLst>
                   <a:outerShdw blurRad="63500" dist="38099" dir="2700000" algn="ctr" rotWithShape="0">
                     <a:schemeClr val="bg2">
@@ -18677,7 +18714,7 @@
           <a:effectLst/>
           <a:extLst>
             <a:ext uri="{AF507438-7753-43e0-B8FC-AC1667EBCBE1}">
-              <a14:hiddenEffects xmlns="" xmlns:a14="http://schemas.microsoft.com/office/drawing/2010/main">
+              <a14:hiddenEffects xmlns:a14="http://schemas.microsoft.com/office/drawing/2010/main" xmlns="">
                 <a:effectLst>
                   <a:outerShdw blurRad="63500" dist="38099" dir="2700000" algn="ctr" rotWithShape="0">
                     <a:schemeClr val="bg2">
@@ -18727,7 +18764,7 @@
           <a:effectLst/>
           <a:extLst>
             <a:ext uri="{AF507438-7753-43e0-B8FC-AC1667EBCBE1}">
-              <a14:hiddenEffects xmlns="" xmlns:a14="http://schemas.microsoft.com/office/drawing/2010/main">
+              <a14:hiddenEffects xmlns:a14="http://schemas.microsoft.com/office/drawing/2010/main" xmlns="">
                 <a:effectLst>
                   <a:outerShdw blurRad="63500" dist="38099" dir="2700000" algn="ctr" rotWithShape="0">
                     <a:schemeClr val="bg2">
@@ -18811,7 +18848,7 @@
           <a:effectLst/>
           <a:extLst>
             <a:ext uri="{AF507438-7753-43e0-B8FC-AC1667EBCBE1}">
-              <a14:hiddenEffects xmlns="" xmlns:a14="http://schemas.microsoft.com/office/drawing/2010/main">
+              <a14:hiddenEffects xmlns:a14="http://schemas.microsoft.com/office/drawing/2010/main" xmlns="">
                 <a:effectLst>
                   <a:outerShdw blurRad="63500" dist="38099" dir="2700000" algn="ctr" rotWithShape="0">
                     <a:schemeClr val="bg2">
@@ -18861,7 +18898,7 @@
           <a:effectLst/>
           <a:extLst>
             <a:ext uri="{AF507438-7753-43e0-B8FC-AC1667EBCBE1}">
-              <a14:hiddenEffects xmlns="" xmlns:a14="http://schemas.microsoft.com/office/drawing/2010/main">
+              <a14:hiddenEffects xmlns:a14="http://schemas.microsoft.com/office/drawing/2010/main" xmlns="">
                 <a:effectLst>
                   <a:outerShdw blurRad="63500" dist="38099" dir="2700000" algn="ctr" rotWithShape="0">
                     <a:schemeClr val="bg2">
@@ -18909,7 +18946,7 @@
           <a:effectLst/>
           <a:extLst>
             <a:ext uri="{AF507438-7753-43e0-B8FC-AC1667EBCBE1}">
-              <a14:hiddenEffects xmlns="" xmlns:a14="http://schemas.microsoft.com/office/drawing/2010/main">
+              <a14:hiddenEffects xmlns:a14="http://schemas.microsoft.com/office/drawing/2010/main" xmlns="">
                 <a:effectLst>
                   <a:outerShdw blurRad="63500" dist="38099" dir="2700000" algn="ctr" rotWithShape="0">
                     <a:schemeClr val="bg2">
@@ -19004,7 +19041,7 @@
           <a:effectLst/>
           <a:extLst>
             <a:ext uri="{AF507438-7753-43e0-B8FC-AC1667EBCBE1}">
-              <a14:hiddenEffects xmlns="" xmlns:a14="http://schemas.microsoft.com/office/drawing/2010/main">
+              <a14:hiddenEffects xmlns:a14="http://schemas.microsoft.com/office/drawing/2010/main" xmlns="">
                 <a:effectLst>
                   <a:outerShdw blurRad="63500" dist="38099" dir="2700000" algn="ctr" rotWithShape="0">
                     <a:schemeClr val="bg2">
@@ -19099,7 +19136,7 @@
           <a:effectLst/>
           <a:extLst>
             <a:ext uri="{AF507438-7753-43e0-B8FC-AC1667EBCBE1}">
-              <a14:hiddenEffects xmlns="" xmlns:a14="http://schemas.microsoft.com/office/drawing/2010/main">
+              <a14:hiddenEffects xmlns:a14="http://schemas.microsoft.com/office/drawing/2010/main" xmlns="">
                 <a:effectLst>
                   <a:outerShdw blurRad="63500" dist="38099" dir="2700000" algn="ctr" rotWithShape="0">
                     <a:schemeClr val="bg2">
@@ -19196,7 +19233,7 @@
           <a:effectLst/>
           <a:extLst>
             <a:ext uri="{AF507438-7753-43e0-B8FC-AC1667EBCBE1}">
-              <a14:hiddenEffects xmlns="" xmlns:a14="http://schemas.microsoft.com/office/drawing/2010/main">
+              <a14:hiddenEffects xmlns:a14="http://schemas.microsoft.com/office/drawing/2010/main" xmlns="">
                 <a:effectLst>
                   <a:outerShdw blurRad="63500" dist="38099" dir="2700000" algn="ctr" rotWithShape="0">
                     <a:schemeClr val="bg2">
@@ -19291,7 +19328,7 @@
           <a:effectLst/>
           <a:extLst>
             <a:ext uri="{AF507438-7753-43e0-B8FC-AC1667EBCBE1}">
-              <a14:hiddenEffects xmlns="" xmlns:a14="http://schemas.microsoft.com/office/drawing/2010/main">
+              <a14:hiddenEffects xmlns:a14="http://schemas.microsoft.com/office/drawing/2010/main" xmlns="">
                 <a:effectLst>
                   <a:outerShdw blurRad="63500" dist="38099" dir="2700000" algn="ctr" rotWithShape="0">
                     <a:schemeClr val="bg2">
@@ -19446,7 +19483,7 @@
           <a:effectLst/>
           <a:extLst>
             <a:ext uri="{AF507438-7753-43e0-B8FC-AC1667EBCBE1}">
-              <a14:hiddenEffects xmlns="" xmlns:a14="http://schemas.microsoft.com/office/drawing/2010/main">
+              <a14:hiddenEffects xmlns:a14="http://schemas.microsoft.com/office/drawing/2010/main" xmlns="">
                 <a:effectLst>
                   <a:outerShdw blurRad="63500" dist="38099" dir="2700000" algn="ctr" rotWithShape="0">
                     <a:schemeClr val="bg2">
@@ -19966,7 +20003,7 @@
           <a:effectLst/>
           <a:extLst>
             <a:ext uri="{AF507438-7753-43e0-B8FC-AC1667EBCBE1}">
-              <a14:hiddenEffects xmlns="" xmlns:a14="http://schemas.microsoft.com/office/drawing/2010/main">
+              <a14:hiddenEffects xmlns:a14="http://schemas.microsoft.com/office/drawing/2010/main" xmlns="">
                 <a:effectLst>
                   <a:outerShdw blurRad="63500" dist="38099" dir="2700000" algn="ctr" rotWithShape="0">
                     <a:schemeClr val="bg2">
@@ -20016,7 +20053,7 @@
           <a:effectLst/>
           <a:extLst>
             <a:ext uri="{AF507438-7753-43e0-B8FC-AC1667EBCBE1}">
-              <a14:hiddenEffects xmlns="" xmlns:a14="http://schemas.microsoft.com/office/drawing/2010/main">
+              <a14:hiddenEffects xmlns:a14="http://schemas.microsoft.com/office/drawing/2010/main" xmlns="">
                 <a:effectLst>
                   <a:outerShdw blurRad="63500" dist="38099" dir="2700000" algn="ctr" rotWithShape="0">
                     <a:schemeClr val="bg2">
@@ -20141,7 +20178,7 @@
           <a:effectLst/>
           <a:extLst>
             <a:ext uri="{AF507438-7753-43e0-B8FC-AC1667EBCBE1}">
-              <a14:hiddenEffects xmlns="" xmlns:a14="http://schemas.microsoft.com/office/drawing/2010/main">
+              <a14:hiddenEffects xmlns:a14="http://schemas.microsoft.com/office/drawing/2010/main" xmlns="">
                 <a:effectLst>
                   <a:outerShdw blurRad="63500" dist="38099" dir="2700000" algn="ctr" rotWithShape="0">
                     <a:schemeClr val="bg2">
@@ -20187,7 +20224,7 @@
           <a:effectLst/>
           <a:extLst>
             <a:ext uri="{AF507438-7753-43e0-B8FC-AC1667EBCBE1}">
-              <a14:hiddenEffects xmlns="" xmlns:a14="http://schemas.microsoft.com/office/drawing/2010/main">
+              <a14:hiddenEffects xmlns:a14="http://schemas.microsoft.com/office/drawing/2010/main" xmlns="">
                 <a:effectLst>
                   <a:outerShdw blurRad="63500" dist="38099" dir="2700000" algn="ctr" rotWithShape="0">
                     <a:schemeClr val="bg2">
@@ -20284,7 +20321,7 @@
           <a:effectLst/>
           <a:extLst>
             <a:ext uri="{AF507438-7753-43e0-B8FC-AC1667EBCBE1}">
-              <a14:hiddenEffects xmlns="" xmlns:a14="http://schemas.microsoft.com/office/drawing/2010/main">
+              <a14:hiddenEffects xmlns:a14="http://schemas.microsoft.com/office/drawing/2010/main" xmlns="">
                 <a:effectLst>
                   <a:outerShdw blurRad="63500" dist="38099" dir="2700000" algn="ctr" rotWithShape="0">
                     <a:schemeClr val="bg2">
@@ -20381,7 +20418,7 @@
           <a:effectLst/>
           <a:extLst>
             <a:ext uri="{AF507438-7753-43e0-B8FC-AC1667EBCBE1}">
-              <a14:hiddenEffects xmlns="" xmlns:a14="http://schemas.microsoft.com/office/drawing/2010/main">
+              <a14:hiddenEffects xmlns:a14="http://schemas.microsoft.com/office/drawing/2010/main" xmlns="">
                 <a:effectLst>
                   <a:outerShdw blurRad="63500" dist="38099" dir="2700000" algn="ctr" rotWithShape="0">
                     <a:schemeClr val="bg2">
@@ -20476,7 +20513,7 @@
           <a:effectLst/>
           <a:extLst>
             <a:ext uri="{AF507438-7753-43e0-B8FC-AC1667EBCBE1}">
-              <a14:hiddenEffects xmlns="" xmlns:a14="http://schemas.microsoft.com/office/drawing/2010/main">
+              <a14:hiddenEffects xmlns:a14="http://schemas.microsoft.com/office/drawing/2010/main" xmlns="">
                 <a:effectLst>
                   <a:outerShdw blurRad="63500" dist="38099" dir="2700000" algn="ctr" rotWithShape="0">
                     <a:schemeClr val="bg2">
@@ -20573,7 +20610,7 @@
           <a:effectLst/>
           <a:extLst>
             <a:ext uri="{AF507438-7753-43e0-B8FC-AC1667EBCBE1}">
-              <a14:hiddenEffects xmlns="" xmlns:a14="http://schemas.microsoft.com/office/drawing/2010/main">
+              <a14:hiddenEffects xmlns:a14="http://schemas.microsoft.com/office/drawing/2010/main" xmlns="">
                 <a:effectLst>
                   <a:outerShdw blurRad="63500" dist="38099" dir="2700000" algn="ctr" rotWithShape="0">
                     <a:schemeClr val="bg2">
@@ -20696,7 +20733,7 @@
             <a:effectLst/>
             <a:extLst>
               <a:ext uri="{AF507438-7753-43e0-B8FC-AC1667EBCBE1}">
-                <a14:hiddenEffects xmlns="" xmlns:a14="http://schemas.microsoft.com/office/drawing/2010/main">
+                <a14:hiddenEffects xmlns:a14="http://schemas.microsoft.com/office/drawing/2010/main" xmlns="">
                   <a:effectLst>
                     <a:outerShdw blurRad="63500" dist="38099" dir="2700000" algn="ctr" rotWithShape="0">
                       <a:schemeClr val="bg2">
@@ -20901,7 +20938,7 @@
           <a:effectLst/>
           <a:extLst>
             <a:ext uri="{AF507438-7753-43e0-B8FC-AC1667EBCBE1}">
-              <a14:hiddenEffects xmlns="" xmlns:a14="http://schemas.microsoft.com/office/drawing/2010/main">
+              <a14:hiddenEffects xmlns:a14="http://schemas.microsoft.com/office/drawing/2010/main" xmlns="">
                 <a:effectLst>
                   <a:outerShdw blurRad="63500" dist="38099" dir="2700000" algn="ctr" rotWithShape="0">
                     <a:schemeClr val="bg2">
@@ -21007,7 +21044,7 @@
             <a:effectLst/>
             <a:extLst>
               <a:ext uri="{AF507438-7753-43e0-B8FC-AC1667EBCBE1}">
-                <a14:hiddenEffects xmlns="" xmlns:a14="http://schemas.microsoft.com/office/drawing/2010/main">
+                <a14:hiddenEffects xmlns:a14="http://schemas.microsoft.com/office/drawing/2010/main" xmlns="">
                   <a:effectLst>
                     <a:outerShdw blurRad="63500" dist="38099" dir="2700000" algn="ctr" rotWithShape="0">
                       <a:schemeClr val="bg2">
@@ -21148,7 +21185,7 @@
             <a:effectLst/>
             <a:extLst>
               <a:ext uri="{AF507438-7753-43e0-B8FC-AC1667EBCBE1}">
-                <a14:hiddenEffects xmlns="" xmlns:a14="http://schemas.microsoft.com/office/drawing/2010/main">
+                <a14:hiddenEffects xmlns:a14="http://schemas.microsoft.com/office/drawing/2010/main" xmlns="">
                   <a:effectLst>
                     <a:outerShdw blurRad="63500" dist="38099" dir="2700000" algn="ctr" rotWithShape="0">
                       <a:schemeClr val="bg2">
@@ -21254,7 +21291,7 @@
               <a:effectLst/>
               <a:extLst>
                 <a:ext uri="{AF507438-7753-43e0-B8FC-AC1667EBCBE1}">
-                  <a14:hiddenEffects xmlns="" xmlns:a14="http://schemas.microsoft.com/office/drawing/2010/main">
+                  <a14:hiddenEffects xmlns:a14="http://schemas.microsoft.com/office/drawing/2010/main" xmlns="">
                     <a:effectLst>
                       <a:outerShdw blurRad="63500" dist="38099" dir="2700000" algn="ctr" rotWithShape="0">
                         <a:schemeClr val="bg2">
@@ -21382,7 +21419,7 @@
           <a:effectLst/>
           <a:extLst>
             <a:ext uri="{AF507438-7753-43e0-B8FC-AC1667EBCBE1}">
-              <a14:hiddenEffects xmlns="" xmlns:a14="http://schemas.microsoft.com/office/drawing/2010/main">
+              <a14:hiddenEffects xmlns:a14="http://schemas.microsoft.com/office/drawing/2010/main" xmlns="">
                 <a:effectLst>
                   <a:outerShdw blurRad="63500" dist="38099" dir="2700000" algn="ctr" rotWithShape="0">
                     <a:schemeClr val="bg2">
@@ -22012,7 +22049,7 @@
           <a:effectLst/>
           <a:extLst>
             <a:ext uri="{AF507438-7753-43e0-B8FC-AC1667EBCBE1}">
-              <a14:hiddenEffects xmlns="" xmlns:a14="http://schemas.microsoft.com/office/drawing/2010/main">
+              <a14:hiddenEffects xmlns:a14="http://schemas.microsoft.com/office/drawing/2010/main" xmlns="">
                 <a:effectLst>
                   <a:outerShdw blurRad="63500" dist="38099" dir="2700000" algn="ctr" rotWithShape="0">
                     <a:schemeClr val="bg2">
@@ -22062,7 +22099,7 @@
           <a:effectLst/>
           <a:extLst>
             <a:ext uri="{AF507438-7753-43e0-B8FC-AC1667EBCBE1}">
-              <a14:hiddenEffects xmlns="" xmlns:a14="http://schemas.microsoft.com/office/drawing/2010/main">
+              <a14:hiddenEffects xmlns:a14="http://schemas.microsoft.com/office/drawing/2010/main" xmlns="">
                 <a:effectLst>
                   <a:outerShdw blurRad="63500" dist="38099" dir="2700000" algn="ctr" rotWithShape="0">
                     <a:schemeClr val="bg2">
@@ -22112,7 +22149,7 @@
           <a:effectLst/>
           <a:extLst>
             <a:ext uri="{AF507438-7753-43e0-B8FC-AC1667EBCBE1}">
-              <a14:hiddenEffects xmlns="" xmlns:a14="http://schemas.microsoft.com/office/drawing/2010/main">
+              <a14:hiddenEffects xmlns:a14="http://schemas.microsoft.com/office/drawing/2010/main" xmlns="">
                 <a:effectLst>
                   <a:outerShdw blurRad="63500" dist="38099" dir="2700000" algn="ctr" rotWithShape="0">
                     <a:schemeClr val="bg2">
@@ -22162,7 +22199,7 @@
           <a:effectLst/>
           <a:extLst>
             <a:ext uri="{AF507438-7753-43e0-B8FC-AC1667EBCBE1}">
-              <a14:hiddenEffects xmlns="" xmlns:a14="http://schemas.microsoft.com/office/drawing/2010/main">
+              <a14:hiddenEffects xmlns:a14="http://schemas.microsoft.com/office/drawing/2010/main" xmlns="">
                 <a:effectLst>
                   <a:outerShdw blurRad="63500" dist="38099" dir="2700000" algn="ctr" rotWithShape="0">
                     <a:schemeClr val="bg2">
@@ -22212,7 +22249,7 @@
           <a:effectLst/>
           <a:extLst>
             <a:ext uri="{AF507438-7753-43e0-B8FC-AC1667EBCBE1}">
-              <a14:hiddenEffects xmlns="" xmlns:a14="http://schemas.microsoft.com/office/drawing/2010/main">
+              <a14:hiddenEffects xmlns:a14="http://schemas.microsoft.com/office/drawing/2010/main" xmlns="">
                 <a:effectLst>
                   <a:outerShdw blurRad="63500" dist="38099" dir="2700000" algn="ctr" rotWithShape="0">
                     <a:schemeClr val="bg2">
@@ -22334,7 +22371,7 @@
           <a:effectLst/>
           <a:extLst>
             <a:ext uri="{AF507438-7753-43e0-B8FC-AC1667EBCBE1}">
-              <a14:hiddenEffects xmlns="" xmlns:a14="http://schemas.microsoft.com/office/drawing/2010/main">
+              <a14:hiddenEffects xmlns:a14="http://schemas.microsoft.com/office/drawing/2010/main" xmlns="">
                 <a:effectLst>
                   <a:outerShdw blurRad="63500" dist="38099" dir="2700000" algn="ctr" rotWithShape="0">
                     <a:schemeClr val="bg2">
@@ -22429,7 +22466,7 @@
           <a:effectLst/>
           <a:extLst>
             <a:ext uri="{AF507438-7753-43e0-B8FC-AC1667EBCBE1}">
-              <a14:hiddenEffects xmlns="" xmlns:a14="http://schemas.microsoft.com/office/drawing/2010/main">
+              <a14:hiddenEffects xmlns:a14="http://schemas.microsoft.com/office/drawing/2010/main" xmlns="">
                 <a:effectLst>
                   <a:outerShdw blurRad="63500" dist="38099" dir="2700000" algn="ctr" rotWithShape="0">
                     <a:schemeClr val="bg2">
@@ -22524,7 +22561,7 @@
           <a:effectLst/>
           <a:extLst>
             <a:ext uri="{AF507438-7753-43e0-B8FC-AC1667EBCBE1}">
-              <a14:hiddenEffects xmlns="" xmlns:a14="http://schemas.microsoft.com/office/drawing/2010/main">
+              <a14:hiddenEffects xmlns:a14="http://schemas.microsoft.com/office/drawing/2010/main" xmlns="">
                 <a:effectLst>
                   <a:outerShdw blurRad="63500" dist="38099" dir="2700000" algn="ctr" rotWithShape="0">
                     <a:schemeClr val="bg2">
@@ -22621,7 +22658,7 @@
           <a:effectLst/>
           <a:extLst>
             <a:ext uri="{AF507438-7753-43e0-B8FC-AC1667EBCBE1}">
-              <a14:hiddenEffects xmlns="" xmlns:a14="http://schemas.microsoft.com/office/drawing/2010/main">
+              <a14:hiddenEffects xmlns:a14="http://schemas.microsoft.com/office/drawing/2010/main" xmlns="">
                 <a:effectLst>
                   <a:outerShdw blurRad="63500" dist="38099" dir="2700000" algn="ctr" rotWithShape="0">
                     <a:schemeClr val="bg2">
@@ -22718,7 +22755,7 @@
           <a:effectLst/>
           <a:extLst>
             <a:ext uri="{AF507438-7753-43e0-B8FC-AC1667EBCBE1}">
-              <a14:hiddenEffects xmlns="" xmlns:a14="http://schemas.microsoft.com/office/drawing/2010/main">
+              <a14:hiddenEffects xmlns:a14="http://schemas.microsoft.com/office/drawing/2010/main" xmlns="">
                 <a:effectLst>
                   <a:outerShdw blurRad="63500" dist="38099" dir="2700000" algn="ctr" rotWithShape="0">
                     <a:schemeClr val="bg2">
@@ -22813,7 +22850,7 @@
           <a:effectLst/>
           <a:extLst>
             <a:ext uri="{AF507438-7753-43e0-B8FC-AC1667EBCBE1}">
-              <a14:hiddenEffects xmlns="" xmlns:a14="http://schemas.microsoft.com/office/drawing/2010/main">
+              <a14:hiddenEffects xmlns:a14="http://schemas.microsoft.com/office/drawing/2010/main" xmlns="">
                 <a:effectLst>
                   <a:outerShdw blurRad="63500" dist="38099" dir="2700000" algn="ctr" rotWithShape="0">
                     <a:schemeClr val="bg2">
@@ -23019,7 +23056,7 @@
           <a:effectLst/>
           <a:extLst>
             <a:ext uri="{AF507438-7753-43e0-B8FC-AC1667EBCBE1}">
-              <a14:hiddenEffects xmlns="" xmlns:a14="http://schemas.microsoft.com/office/drawing/2010/main">
+              <a14:hiddenEffects xmlns:a14="http://schemas.microsoft.com/office/drawing/2010/main" xmlns="">
                 <a:effectLst>
                   <a:outerShdw blurRad="63500" dist="38099" dir="2700000" algn="ctr" rotWithShape="0">
                     <a:schemeClr val="bg2">
@@ -23116,7 +23153,7 @@
           <a:effectLst/>
           <a:extLst>
             <a:ext uri="{AF507438-7753-43e0-B8FC-AC1667EBCBE1}">
-              <a14:hiddenEffects xmlns="" xmlns:a14="http://schemas.microsoft.com/office/drawing/2010/main">
+              <a14:hiddenEffects xmlns:a14="http://schemas.microsoft.com/office/drawing/2010/main" xmlns="">
                 <a:effectLst>
                   <a:outerShdw blurRad="63500" dist="38099" dir="2700000" algn="ctr" rotWithShape="0">
                     <a:schemeClr val="bg2">
@@ -23211,7 +23248,7 @@
           <a:effectLst/>
           <a:extLst>
             <a:ext uri="{AF507438-7753-43e0-B8FC-AC1667EBCBE1}">
-              <a14:hiddenEffects xmlns="" xmlns:a14="http://schemas.microsoft.com/office/drawing/2010/main">
+              <a14:hiddenEffects xmlns:a14="http://schemas.microsoft.com/office/drawing/2010/main" xmlns="">
                 <a:effectLst>
                   <a:outerShdw blurRad="63500" dist="38099" dir="2700000" algn="ctr" rotWithShape="0">
                     <a:schemeClr val="bg2">
@@ -23295,7 +23332,7 @@
           <a:effectLst/>
           <a:extLst>
             <a:ext uri="{AF507438-7753-43e0-B8FC-AC1667EBCBE1}">
-              <a14:hiddenEffects xmlns="" xmlns:a14="http://schemas.microsoft.com/office/drawing/2010/main">
+              <a14:hiddenEffects xmlns:a14="http://schemas.microsoft.com/office/drawing/2010/main" xmlns="">
                 <a:effectLst>
                   <a:outerShdw blurRad="63500" dist="38099" dir="2700000" algn="ctr" rotWithShape="0">
                     <a:schemeClr val="bg2">
@@ -23381,7 +23418,7 @@
           <a:effectLst/>
           <a:extLst>
             <a:ext uri="{AF507438-7753-43e0-B8FC-AC1667EBCBE1}">
-              <a14:hiddenEffects xmlns="" xmlns:a14="http://schemas.microsoft.com/office/drawing/2010/main">
+              <a14:hiddenEffects xmlns:a14="http://schemas.microsoft.com/office/drawing/2010/main" xmlns="">
                 <a:effectLst>
                   <a:outerShdw blurRad="63500" dist="38099" dir="2700000" algn="ctr" rotWithShape="0">
                     <a:schemeClr val="bg2">
@@ -23482,7 +23519,7 @@
           <a:effectLst/>
           <a:extLst>
             <a:ext uri="{AF507438-7753-43e0-B8FC-AC1667EBCBE1}">
-              <a14:hiddenEffects xmlns="" xmlns:a14="http://schemas.microsoft.com/office/drawing/2010/main">
+              <a14:hiddenEffects xmlns:a14="http://schemas.microsoft.com/office/drawing/2010/main" xmlns="">
                 <a:effectLst>
                   <a:outerShdw blurRad="63500" dist="38099" dir="2700000" algn="ctr" rotWithShape="0">
                     <a:schemeClr val="bg2">
@@ -23568,7 +23605,7 @@
           <a:effectLst/>
           <a:extLst>
             <a:ext uri="{AF507438-7753-43e0-B8FC-AC1667EBCBE1}">
-              <a14:hiddenEffects xmlns="" xmlns:a14="http://schemas.microsoft.com/office/drawing/2010/main">
+              <a14:hiddenEffects xmlns:a14="http://schemas.microsoft.com/office/drawing/2010/main" xmlns="">
                 <a:effectLst>
                   <a:outerShdw blurRad="63500" dist="38099" dir="2700000" algn="ctr" rotWithShape="0">
                     <a:schemeClr val="bg2">
@@ -23657,7 +23694,7 @@
           <a:effectLst/>
           <a:extLst>
             <a:ext uri="{AF507438-7753-43e0-B8FC-AC1667EBCBE1}">
-              <a14:hiddenEffects xmlns="" xmlns:a14="http://schemas.microsoft.com/office/drawing/2010/main">
+              <a14:hiddenEffects xmlns:a14="http://schemas.microsoft.com/office/drawing/2010/main" xmlns="">
                 <a:effectLst>
                   <a:outerShdw blurRad="63500" dist="38099" dir="2700000" algn="ctr" rotWithShape="0">
                     <a:schemeClr val="bg2">
@@ -23708,7 +23745,7 @@
           <a:effectLst/>
           <a:extLst>
             <a:ext uri="{AF507438-7753-43e0-B8FC-AC1667EBCBE1}">
-              <a14:hiddenEffects xmlns="" xmlns:a14="http://schemas.microsoft.com/office/drawing/2010/main">
+              <a14:hiddenEffects xmlns:a14="http://schemas.microsoft.com/office/drawing/2010/main" xmlns="">
                 <a:effectLst>
                   <a:outerShdw blurRad="63500" dist="38099" dir="2700000" algn="ctr" rotWithShape="0">
                     <a:schemeClr val="bg2">
@@ -25000,7 +25037,7 @@
           <a:effectLst/>
           <a:extLst>
             <a:ext uri="{AF507438-7753-43e0-B8FC-AC1667EBCBE1}">
-              <a14:hiddenEffects xmlns="" xmlns:a14="http://schemas.microsoft.com/office/drawing/2010/main">
+              <a14:hiddenEffects xmlns:a14="http://schemas.microsoft.com/office/drawing/2010/main" xmlns="">
                 <a:effectLst>
                   <a:outerShdw blurRad="63500" dist="38099" dir="2700000" algn="ctr" rotWithShape="0">
                     <a:schemeClr val="bg2">
@@ -25150,7 +25187,7 @@
           <a:effectLst/>
           <a:extLst>
             <a:ext uri="{AF507438-7753-43e0-B8FC-AC1667EBCBE1}">
-              <a14:hiddenEffects xmlns="" xmlns:a14="http://schemas.microsoft.com/office/drawing/2010/main">
+              <a14:hiddenEffects xmlns:a14="http://schemas.microsoft.com/office/drawing/2010/main" xmlns="">
                 <a:effectLst>
                   <a:outerShdw blurRad="63500" dist="38099" dir="2700000" algn="ctr" rotWithShape="0">
                     <a:schemeClr val="bg2">
@@ -25238,7 +25275,7 @@
           <a:effectLst/>
           <a:extLst>
             <a:ext uri="{AF507438-7753-43e0-B8FC-AC1667EBCBE1}">
-              <a14:hiddenEffects xmlns="" xmlns:a14="http://schemas.microsoft.com/office/drawing/2010/main">
+              <a14:hiddenEffects xmlns:a14="http://schemas.microsoft.com/office/drawing/2010/main" xmlns="">
                 <a:effectLst>
                   <a:outerShdw blurRad="63500" dist="38099" dir="2700000" algn="ctr" rotWithShape="0">
                     <a:schemeClr val="bg2">
@@ -25284,7 +25321,7 @@
           <a:effectLst/>
           <a:extLst>
             <a:ext uri="{AF507438-7753-43e0-B8FC-AC1667EBCBE1}">
-              <a14:hiddenEffects xmlns="" xmlns:a14="http://schemas.microsoft.com/office/drawing/2010/main">
+              <a14:hiddenEffects xmlns:a14="http://schemas.microsoft.com/office/drawing/2010/main" xmlns="">
                 <a:effectLst>
                   <a:outerShdw blurRad="63500" dist="38099" dir="2700000" algn="ctr" rotWithShape="0">
                     <a:schemeClr val="bg2">
@@ -25381,7 +25418,7 @@
           <a:effectLst/>
           <a:extLst>
             <a:ext uri="{AF507438-7753-43e0-B8FC-AC1667EBCBE1}">
-              <a14:hiddenEffects xmlns="" xmlns:a14="http://schemas.microsoft.com/office/drawing/2010/main">
+              <a14:hiddenEffects xmlns:a14="http://schemas.microsoft.com/office/drawing/2010/main" xmlns="">
                 <a:effectLst>
                   <a:outerShdw blurRad="63500" dist="38099" dir="2700000" algn="ctr" rotWithShape="0">
                     <a:schemeClr val="bg2">
@@ -25496,7 +25533,7 @@
             <a:effectLst/>
             <a:extLst>
               <a:ext uri="{AF507438-7753-43e0-B8FC-AC1667EBCBE1}">
-                <a14:hiddenEffects xmlns="" xmlns:a14="http://schemas.microsoft.com/office/drawing/2010/main">
+                <a14:hiddenEffects xmlns:a14="http://schemas.microsoft.com/office/drawing/2010/main" xmlns="">
                   <a:effectLst>
                     <a:outerShdw blurRad="63500" dist="38099" dir="2700000" algn="ctr" rotWithShape="0">
                       <a:schemeClr val="bg2">
@@ -25583,7 +25620,7 @@
             <a:effectLst/>
             <a:extLst>
               <a:ext uri="{AF507438-7753-43e0-B8FC-AC1667EBCBE1}">
-                <a14:hiddenEffects xmlns="" xmlns:a14="http://schemas.microsoft.com/office/drawing/2010/main">
+                <a14:hiddenEffects xmlns:a14="http://schemas.microsoft.com/office/drawing/2010/main" xmlns="">
                   <a:effectLst>
                     <a:outerShdw blurRad="63500" dist="38099" dir="2700000" algn="ctr" rotWithShape="0">
                       <a:schemeClr val="bg2">
@@ -25690,7 +25727,7 @@
               <a:effectLst/>
               <a:extLst>
                 <a:ext uri="{AF507438-7753-43e0-B8FC-AC1667EBCBE1}">
-                  <a14:hiddenEffects xmlns="" xmlns:a14="http://schemas.microsoft.com/office/drawing/2010/main">
+                  <a14:hiddenEffects xmlns:a14="http://schemas.microsoft.com/office/drawing/2010/main" xmlns="">
                     <a:effectLst>
                       <a:outerShdw blurRad="63500" dist="38099" dir="2700000" algn="ctr" rotWithShape="0">
                         <a:schemeClr val="bg2">
@@ -25811,7 +25848,7 @@
             <a:effectLst/>
             <a:extLst>
               <a:ext uri="{AF507438-7753-43e0-B8FC-AC1667EBCBE1}">
-                <a14:hiddenEffects xmlns="" xmlns:a14="http://schemas.microsoft.com/office/drawing/2010/main">
+                <a14:hiddenEffects xmlns:a14="http://schemas.microsoft.com/office/drawing/2010/main" xmlns="">
                   <a:effectLst>
                     <a:outerShdw blurRad="63500" dist="38099" dir="2700000" algn="ctr" rotWithShape="0">
                       <a:schemeClr val="bg2">
@@ -25918,7 +25955,7 @@
             <a:effectLst/>
             <a:extLst>
               <a:ext uri="{AF507438-7753-43e0-B8FC-AC1667EBCBE1}">
-                <a14:hiddenEffects xmlns="" xmlns:a14="http://schemas.microsoft.com/office/drawing/2010/main">
+                <a14:hiddenEffects xmlns:a14="http://schemas.microsoft.com/office/drawing/2010/main" xmlns="">
                   <a:effectLst>
                     <a:outerShdw blurRad="63500" dist="38099" dir="2700000" algn="ctr" rotWithShape="0">
                       <a:schemeClr val="bg2">
@@ -26064,7 +26101,7 @@
           <a:effectLst/>
           <a:extLst>
             <a:ext uri="{AF507438-7753-43e0-B8FC-AC1667EBCBE1}">
-              <a14:hiddenEffects xmlns="" xmlns:a14="http://schemas.microsoft.com/office/drawing/2010/main">
+              <a14:hiddenEffects xmlns:a14="http://schemas.microsoft.com/office/drawing/2010/main" xmlns="">
                 <a:effectLst>
                   <a:outerShdw blurRad="63500" dist="38099" dir="2700000" algn="ctr" rotWithShape="0">
                     <a:schemeClr val="bg2">
@@ -26147,7 +26184,7 @@
           <a:effectLst/>
           <a:extLst>
             <a:ext uri="{AF507438-7753-43e0-B8FC-AC1667EBCBE1}">
-              <a14:hiddenEffects xmlns="" xmlns:a14="http://schemas.microsoft.com/office/drawing/2010/main">
+              <a14:hiddenEffects xmlns:a14="http://schemas.microsoft.com/office/drawing/2010/main" xmlns="">
                 <a:effectLst>
                   <a:outerShdw blurRad="63500" dist="38099" dir="2700000" algn="ctr" rotWithShape="0">
                     <a:schemeClr val="bg2">
@@ -26244,7 +26281,7 @@
           <a:effectLst/>
           <a:extLst>
             <a:ext uri="{AF507438-7753-43e0-B8FC-AC1667EBCBE1}">
-              <a14:hiddenEffects xmlns="" xmlns:a14="http://schemas.microsoft.com/office/drawing/2010/main">
+              <a14:hiddenEffects xmlns:a14="http://schemas.microsoft.com/office/drawing/2010/main" xmlns="">
                 <a:effectLst>
                   <a:outerShdw blurRad="63500" dist="38099" dir="2700000" algn="ctr" rotWithShape="0">
                     <a:schemeClr val="bg2">
@@ -26347,7 +26384,7 @@
           <a:effectLst/>
           <a:extLst>
             <a:ext uri="{AF507438-7753-43e0-B8FC-AC1667EBCBE1}">
-              <a14:hiddenEffects xmlns="" xmlns:a14="http://schemas.microsoft.com/office/drawing/2010/main">
+              <a14:hiddenEffects xmlns:a14="http://schemas.microsoft.com/office/drawing/2010/main" xmlns="">
                 <a:effectLst>
                   <a:outerShdw blurRad="63500" dist="38099" dir="2700000" algn="ctr" rotWithShape="0">
                     <a:schemeClr val="bg2">
@@ -26435,7 +26472,7 @@
           <a:effectLst/>
           <a:extLst>
             <a:ext uri="{AF507438-7753-43e0-B8FC-AC1667EBCBE1}">
-              <a14:hiddenEffects xmlns="" xmlns:a14="http://schemas.microsoft.com/office/drawing/2010/main">
+              <a14:hiddenEffects xmlns:a14="http://schemas.microsoft.com/office/drawing/2010/main" xmlns="">
                 <a:effectLst>
                   <a:outerShdw blurRad="63500" dist="38099" dir="2700000" algn="ctr" rotWithShape="0">
                     <a:schemeClr val="bg2">
@@ -26481,7 +26518,7 @@
           <a:effectLst/>
           <a:extLst>
             <a:ext uri="{AF507438-7753-43e0-B8FC-AC1667EBCBE1}">
-              <a14:hiddenEffects xmlns="" xmlns:a14="http://schemas.microsoft.com/office/drawing/2010/main">
+              <a14:hiddenEffects xmlns:a14="http://schemas.microsoft.com/office/drawing/2010/main" xmlns="">
                 <a:effectLst>
                   <a:outerShdw blurRad="63500" dist="38099" dir="2700000" algn="ctr" rotWithShape="0">
                     <a:schemeClr val="bg2">
@@ -26578,7 +26615,7 @@
           <a:effectLst/>
           <a:extLst>
             <a:ext uri="{AF507438-7753-43e0-B8FC-AC1667EBCBE1}">
-              <a14:hiddenEffects xmlns="" xmlns:a14="http://schemas.microsoft.com/office/drawing/2010/main">
+              <a14:hiddenEffects xmlns:a14="http://schemas.microsoft.com/office/drawing/2010/main" xmlns="">
                 <a:effectLst>
                   <a:outerShdw blurRad="63500" dist="38099" dir="2700000" algn="ctr" rotWithShape="0">
                     <a:schemeClr val="bg2">
@@ -26677,7 +26714,7 @@
           <a:effectLst/>
           <a:extLst>
             <a:ext uri="{AF507438-7753-43e0-B8FC-AC1667EBCBE1}">
-              <a14:hiddenEffects xmlns="" xmlns:a14="http://schemas.microsoft.com/office/drawing/2010/main">
+              <a14:hiddenEffects xmlns:a14="http://schemas.microsoft.com/office/drawing/2010/main" xmlns="">
                 <a:effectLst>
                   <a:outerShdw blurRad="63500" dist="38099" dir="2700000" algn="ctr" rotWithShape="0">
                     <a:schemeClr val="bg2">
@@ -26760,7 +26797,7 @@
           <a:effectLst/>
           <a:extLst>
             <a:ext uri="{AF507438-7753-43e0-B8FC-AC1667EBCBE1}">
-              <a14:hiddenEffects xmlns="" xmlns:a14="http://schemas.microsoft.com/office/drawing/2010/main">
+              <a14:hiddenEffects xmlns:a14="http://schemas.microsoft.com/office/drawing/2010/main" xmlns="">
                 <a:effectLst>
                   <a:outerShdw blurRad="63500" dist="38099" dir="2700000" algn="ctr" rotWithShape="0">
                     <a:schemeClr val="bg2">
@@ -26857,7 +26894,7 @@
           <a:effectLst/>
           <a:extLst>
             <a:ext uri="{AF507438-7753-43e0-B8FC-AC1667EBCBE1}">
-              <a14:hiddenEffects xmlns="" xmlns:a14="http://schemas.microsoft.com/office/drawing/2010/main">
+              <a14:hiddenEffects xmlns:a14="http://schemas.microsoft.com/office/drawing/2010/main" xmlns="">
                 <a:effectLst>
                   <a:outerShdw blurRad="63500" dist="38099" dir="2700000" algn="ctr" rotWithShape="0">
                     <a:schemeClr val="bg2">
@@ -26958,7 +26995,7 @@
           <a:effectLst/>
           <a:extLst>
             <a:ext uri="{AF507438-7753-43e0-B8FC-AC1667EBCBE1}">
-              <a14:hiddenEffects xmlns="" xmlns:a14="http://schemas.microsoft.com/office/drawing/2010/main">
+              <a14:hiddenEffects xmlns:a14="http://schemas.microsoft.com/office/drawing/2010/main" xmlns="">
                 <a:effectLst>
                   <a:outerShdw blurRad="63500" dist="38099" dir="2700000" algn="ctr" rotWithShape="0">
                     <a:schemeClr val="bg2">
@@ -27044,7 +27081,7 @@
           <a:effectLst/>
           <a:extLst>
             <a:ext uri="{AF507438-7753-43e0-B8FC-AC1667EBCBE1}">
-              <a14:hiddenEffects xmlns="" xmlns:a14="http://schemas.microsoft.com/office/drawing/2010/main">
+              <a14:hiddenEffects xmlns:a14="http://schemas.microsoft.com/office/drawing/2010/main" xmlns="">
                 <a:effectLst>
                   <a:outerShdw blurRad="63500" dist="38099" dir="2700000" algn="ctr" rotWithShape="0">
                     <a:schemeClr val="bg2">
@@ -27143,7 +27180,7 @@
           <a:effectLst/>
           <a:extLst>
             <a:ext uri="{AF507438-7753-43e0-B8FC-AC1667EBCBE1}">
-              <a14:hiddenEffects xmlns="" xmlns:a14="http://schemas.microsoft.com/office/drawing/2010/main">
+              <a14:hiddenEffects xmlns:a14="http://schemas.microsoft.com/office/drawing/2010/main" xmlns="">
                 <a:effectLst>
                   <a:outerShdw blurRad="63500" dist="38099" dir="2700000" algn="ctr" rotWithShape="0">
                     <a:schemeClr val="bg2">
@@ -28096,7 +28133,7 @@
           <a:effectLst/>
           <a:extLst>
             <a:ext uri="{AF507438-7753-43e0-B8FC-AC1667EBCBE1}">
-              <a14:hiddenEffects xmlns="" xmlns:a14="http://schemas.microsoft.com/office/drawing/2010/main">
+              <a14:hiddenEffects xmlns:a14="http://schemas.microsoft.com/office/drawing/2010/main" xmlns="">
                 <a:effectLst>
                   <a:outerShdw blurRad="63500" dist="38099" dir="2700000" algn="ctr" rotWithShape="0">
                     <a:schemeClr val="bg2">
@@ -28184,7 +28221,7 @@
           <a:effectLst/>
           <a:extLst>
             <a:ext uri="{AF507438-7753-43e0-B8FC-AC1667EBCBE1}">
-              <a14:hiddenEffects xmlns="" xmlns:a14="http://schemas.microsoft.com/office/drawing/2010/main">
+              <a14:hiddenEffects xmlns:a14="http://schemas.microsoft.com/office/drawing/2010/main" xmlns="">
                 <a:effectLst>
                   <a:outerShdw blurRad="63500" dist="38099" dir="2700000" algn="ctr" rotWithShape="0">
                     <a:schemeClr val="bg2">
@@ -28230,7 +28267,7 @@
           <a:effectLst/>
           <a:extLst>
             <a:ext uri="{AF507438-7753-43e0-B8FC-AC1667EBCBE1}">
-              <a14:hiddenEffects xmlns="" xmlns:a14="http://schemas.microsoft.com/office/drawing/2010/main">
+              <a14:hiddenEffects xmlns:a14="http://schemas.microsoft.com/office/drawing/2010/main" xmlns="">
                 <a:effectLst>
                   <a:outerShdw blurRad="63500" dist="38099" dir="2700000" algn="ctr" rotWithShape="0">
                     <a:schemeClr val="bg2">
@@ -28327,7 +28364,7 @@
           <a:effectLst/>
           <a:extLst>
             <a:ext uri="{AF507438-7753-43e0-B8FC-AC1667EBCBE1}">
-              <a14:hiddenEffects xmlns="" xmlns:a14="http://schemas.microsoft.com/office/drawing/2010/main">
+              <a14:hiddenEffects xmlns:a14="http://schemas.microsoft.com/office/drawing/2010/main" xmlns="">
                 <a:effectLst>
                   <a:outerShdw blurRad="63500" dist="38099" dir="2700000" algn="ctr" rotWithShape="0">
                     <a:schemeClr val="bg2">
@@ -28426,7 +28463,7 @@
           <a:effectLst/>
           <a:extLst>
             <a:ext uri="{AF507438-7753-43e0-B8FC-AC1667EBCBE1}">
-              <a14:hiddenEffects xmlns="" xmlns:a14="http://schemas.microsoft.com/office/drawing/2010/main">
+              <a14:hiddenEffects xmlns:a14="http://schemas.microsoft.com/office/drawing/2010/main" xmlns="">
                 <a:effectLst>
                   <a:outerShdw blurRad="63500" dist="38099" dir="2700000" algn="ctr" rotWithShape="0">
                     <a:schemeClr val="bg2">
@@ -28509,7 +28546,7 @@
           <a:effectLst/>
           <a:extLst>
             <a:ext uri="{AF507438-7753-43e0-B8FC-AC1667EBCBE1}">
-              <a14:hiddenEffects xmlns="" xmlns:a14="http://schemas.microsoft.com/office/drawing/2010/main">
+              <a14:hiddenEffects xmlns:a14="http://schemas.microsoft.com/office/drawing/2010/main" xmlns="">
                 <a:effectLst>
                   <a:outerShdw blurRad="63500" dist="38099" dir="2700000" algn="ctr" rotWithShape="0">
                     <a:schemeClr val="bg2">
@@ -28606,7 +28643,7 @@
           <a:effectLst/>
           <a:extLst>
             <a:ext uri="{AF507438-7753-43e0-B8FC-AC1667EBCBE1}">
-              <a14:hiddenEffects xmlns="" xmlns:a14="http://schemas.microsoft.com/office/drawing/2010/main">
+              <a14:hiddenEffects xmlns:a14="http://schemas.microsoft.com/office/drawing/2010/main" xmlns="">
                 <a:effectLst>
                   <a:outerShdw blurRad="63500" dist="38099" dir="2700000" algn="ctr" rotWithShape="0">
                     <a:schemeClr val="bg2">
@@ -29543,7 +29580,7 @@
           <a:effectLst/>
           <a:extLst>
             <a:ext uri="{AF507438-7753-43e0-B8FC-AC1667EBCBE1}">
-              <a14:hiddenEffects xmlns="" xmlns:a14="http://schemas.microsoft.com/office/drawing/2010/main">
+              <a14:hiddenEffects xmlns:a14="http://schemas.microsoft.com/office/drawing/2010/main" xmlns="">
                 <a:effectLst>
                   <a:outerShdw blurRad="63500" dist="38099" dir="2700000" algn="ctr" rotWithShape="0">
                     <a:schemeClr val="bg2">
@@ -29591,7 +29628,7 @@
           <a:effectLst/>
           <a:extLst>
             <a:ext uri="{AF507438-7753-43e0-B8FC-AC1667EBCBE1}">
-              <a14:hiddenEffects xmlns="" xmlns:a14="http://schemas.microsoft.com/office/drawing/2010/main">
+              <a14:hiddenEffects xmlns:a14="http://schemas.microsoft.com/office/drawing/2010/main" xmlns="">
                 <a:effectLst>
                   <a:outerShdw blurRad="63500" dist="38099" dir="2700000" algn="ctr" rotWithShape="0">
                     <a:schemeClr val="bg2">
@@ -29772,7 +29809,7 @@
           <a:effectLst/>
           <a:extLst>
             <a:ext uri="{AF507438-7753-43e0-B8FC-AC1667EBCBE1}">
-              <a14:hiddenEffects xmlns="" xmlns:a14="http://schemas.microsoft.com/office/drawing/2010/main">
+              <a14:hiddenEffects xmlns:a14="http://schemas.microsoft.com/office/drawing/2010/main" xmlns="">
                 <a:effectLst>
                   <a:outerShdw blurRad="63500" dist="38099" dir="2700000" algn="ctr" rotWithShape="0">
                     <a:schemeClr val="bg2">
@@ -29860,7 +29897,7 @@
           <a:effectLst/>
           <a:extLst>
             <a:ext uri="{AF507438-7753-43e0-B8FC-AC1667EBCBE1}">
-              <a14:hiddenEffects xmlns="" xmlns:a14="http://schemas.microsoft.com/office/drawing/2010/main">
+              <a14:hiddenEffects xmlns:a14="http://schemas.microsoft.com/office/drawing/2010/main" xmlns="">
                 <a:effectLst>
                   <a:outerShdw blurRad="63500" dist="38099" dir="2700000" algn="ctr" rotWithShape="0">
                     <a:schemeClr val="bg2">
@@ -29947,7 +29984,7 @@
           <a:effectLst/>
           <a:extLst>
             <a:ext uri="{AF507438-7753-43e0-B8FC-AC1667EBCBE1}">
-              <a14:hiddenEffects xmlns="" xmlns:a14="http://schemas.microsoft.com/office/drawing/2010/main">
+              <a14:hiddenEffects xmlns:a14="http://schemas.microsoft.com/office/drawing/2010/main" xmlns="">
                 <a:effectLst>
                   <a:outerShdw blurRad="63500" dist="38099" dir="2700000" algn="ctr" rotWithShape="0">
                     <a:schemeClr val="bg2">
@@ -30030,7 +30067,7 @@
           <a:effectLst/>
           <a:extLst>
             <a:ext uri="{AF507438-7753-43e0-B8FC-AC1667EBCBE1}">
-              <a14:hiddenEffects xmlns="" xmlns:a14="http://schemas.microsoft.com/office/drawing/2010/main">
+              <a14:hiddenEffects xmlns:a14="http://schemas.microsoft.com/office/drawing/2010/main" xmlns="">
                 <a:effectLst>
                   <a:outerShdw blurRad="63500" dist="38099" dir="2700000" algn="ctr" rotWithShape="0">
                     <a:schemeClr val="bg2">
@@ -30127,7 +30164,7 @@
           <a:effectLst/>
           <a:extLst>
             <a:ext uri="{AF507438-7753-43e0-B8FC-AC1667EBCBE1}">
-              <a14:hiddenEffects xmlns="" xmlns:a14="http://schemas.microsoft.com/office/drawing/2010/main">
+              <a14:hiddenEffects xmlns:a14="http://schemas.microsoft.com/office/drawing/2010/main" xmlns="">
                 <a:effectLst>
                   <a:outerShdw blurRad="63500" dist="38099" dir="2700000" algn="ctr" rotWithShape="0">
                     <a:schemeClr val="bg2">
@@ -30224,7 +30261,7 @@
           <a:effectLst/>
           <a:extLst>
             <a:ext uri="{AF507438-7753-43e0-B8FC-AC1667EBCBE1}">
-              <a14:hiddenEffects xmlns="" xmlns:a14="http://schemas.microsoft.com/office/drawing/2010/main">
+              <a14:hiddenEffects xmlns:a14="http://schemas.microsoft.com/office/drawing/2010/main" xmlns="">
                 <a:effectLst>
                   <a:outerShdw blurRad="63500" dist="38099" dir="2700000" algn="ctr" rotWithShape="0">
                     <a:schemeClr val="bg2">
@@ -30319,7 +30356,7 @@
           <a:effectLst/>
           <a:extLst>
             <a:ext uri="{AF507438-7753-43e0-B8FC-AC1667EBCBE1}">
-              <a14:hiddenEffects xmlns="" xmlns:a14="http://schemas.microsoft.com/office/drawing/2010/main">
+              <a14:hiddenEffects xmlns:a14="http://schemas.microsoft.com/office/drawing/2010/main" xmlns="">
                 <a:effectLst>
                   <a:outerShdw blurRad="63500" dist="38099" dir="2700000" algn="ctr" rotWithShape="0">
                     <a:schemeClr val="bg2">
@@ -30418,7 +30455,7 @@
           <a:effectLst/>
           <a:extLst>
             <a:ext uri="{AF507438-7753-43e0-B8FC-AC1667EBCBE1}">
-              <a14:hiddenEffects xmlns="" xmlns:a14="http://schemas.microsoft.com/office/drawing/2010/main">
+              <a14:hiddenEffects xmlns:a14="http://schemas.microsoft.com/office/drawing/2010/main" xmlns="">
                 <a:effectLst>
                   <a:outerShdw blurRad="63500" dist="38099" dir="2700000" algn="ctr" rotWithShape="0">
                     <a:schemeClr val="bg2">
@@ -30468,7 +30505,7 @@
           <a:effectLst/>
           <a:extLst>
             <a:ext uri="{AF507438-7753-43e0-B8FC-AC1667EBCBE1}">
-              <a14:hiddenEffects xmlns="" xmlns:a14="http://schemas.microsoft.com/office/drawing/2010/main">
+              <a14:hiddenEffects xmlns:a14="http://schemas.microsoft.com/office/drawing/2010/main" xmlns="">
                 <a:effectLst>
                   <a:outerShdw blurRad="63500" dist="38099" dir="2700000" algn="ctr" rotWithShape="0">
                     <a:schemeClr val="bg2">
@@ -30554,7 +30591,7 @@
           <a:effectLst/>
           <a:extLst>
             <a:ext uri="{AF507438-7753-43e0-B8FC-AC1667EBCBE1}">
-              <a14:hiddenEffects xmlns="" xmlns:a14="http://schemas.microsoft.com/office/drawing/2010/main">
+              <a14:hiddenEffects xmlns:a14="http://schemas.microsoft.com/office/drawing/2010/main" xmlns="">
                 <a:effectLst>
                   <a:outerShdw blurRad="63500" dist="38099" dir="2700000" algn="ctr" rotWithShape="0">
                     <a:schemeClr val="bg2">
@@ -30602,7 +30639,7 @@
           <a:effectLst/>
           <a:extLst>
             <a:ext uri="{AF507438-7753-43e0-B8FC-AC1667EBCBE1}">
-              <a14:hiddenEffects xmlns="" xmlns:a14="http://schemas.microsoft.com/office/drawing/2010/main">
+              <a14:hiddenEffects xmlns:a14="http://schemas.microsoft.com/office/drawing/2010/main" xmlns="">
                 <a:effectLst>
                   <a:outerShdw blurRad="63500" dist="38099" dir="2700000" algn="ctr" rotWithShape="0">
                     <a:schemeClr val="bg2">
@@ -30703,7 +30740,7 @@
           <a:effectLst/>
           <a:extLst>
             <a:ext uri="{AF507438-7753-43e0-B8FC-AC1667EBCBE1}">
-              <a14:hiddenEffects xmlns="" xmlns:a14="http://schemas.microsoft.com/office/drawing/2010/main">
+              <a14:hiddenEffects xmlns:a14="http://schemas.microsoft.com/office/drawing/2010/main" xmlns="">
                 <a:effectLst>
                   <a:outerShdw blurRad="63500" dist="38099" dir="2700000" algn="ctr" rotWithShape="0">
                     <a:schemeClr val="bg2">
@@ -30806,7 +30843,7 @@
           <a:effectLst/>
           <a:extLst>
             <a:ext uri="{AF507438-7753-43e0-B8FC-AC1667EBCBE1}">
-              <a14:hiddenEffects xmlns="" xmlns:a14="http://schemas.microsoft.com/office/drawing/2010/main">
+              <a14:hiddenEffects xmlns:a14="http://schemas.microsoft.com/office/drawing/2010/main" xmlns="">
                 <a:effectLst>
                   <a:outerShdw blurRad="63500" dist="38099" dir="2700000" algn="ctr" rotWithShape="0">
                     <a:schemeClr val="bg2">
@@ -30893,7 +30930,7 @@
           <a:effectLst/>
           <a:extLst>
             <a:ext uri="{AF507438-7753-43e0-B8FC-AC1667EBCBE1}">
-              <a14:hiddenEffects xmlns="" xmlns:a14="http://schemas.microsoft.com/office/drawing/2010/main">
+              <a14:hiddenEffects xmlns:a14="http://schemas.microsoft.com/office/drawing/2010/main" xmlns="">
                 <a:effectLst>
                   <a:outerShdw blurRad="63500" dist="38099" dir="2700000" algn="ctr" rotWithShape="0">
                     <a:schemeClr val="bg2">
@@ -30976,7 +31013,7 @@
           <a:effectLst/>
           <a:extLst>
             <a:ext uri="{AF507438-7753-43e0-B8FC-AC1667EBCBE1}">
-              <a14:hiddenEffects xmlns="" xmlns:a14="http://schemas.microsoft.com/office/drawing/2010/main">
+              <a14:hiddenEffects xmlns:a14="http://schemas.microsoft.com/office/drawing/2010/main" xmlns="">
                 <a:effectLst>
                   <a:outerShdw blurRad="63500" dist="38099" dir="2700000" algn="ctr" rotWithShape="0">
                     <a:schemeClr val="bg2">
@@ -31073,7 +31110,7 @@
           <a:effectLst/>
           <a:extLst>
             <a:ext uri="{AF507438-7753-43e0-B8FC-AC1667EBCBE1}">
-              <a14:hiddenEffects xmlns="" xmlns:a14="http://schemas.microsoft.com/office/drawing/2010/main">
+              <a14:hiddenEffects xmlns:a14="http://schemas.microsoft.com/office/drawing/2010/main" xmlns="">
                 <a:effectLst>
                   <a:outerShdw blurRad="63500" dist="38099" dir="2700000" algn="ctr" rotWithShape="0">
                     <a:schemeClr val="bg2">
@@ -31170,7 +31207,7 @@
           <a:effectLst/>
           <a:extLst>
             <a:ext uri="{AF507438-7753-43e0-B8FC-AC1667EBCBE1}">
-              <a14:hiddenEffects xmlns="" xmlns:a14="http://schemas.microsoft.com/office/drawing/2010/main">
+              <a14:hiddenEffects xmlns:a14="http://schemas.microsoft.com/office/drawing/2010/main" xmlns="">
                 <a:effectLst>
                   <a:outerShdw blurRad="63500" dist="38099" dir="2700000" algn="ctr" rotWithShape="0">
                     <a:schemeClr val="bg2">
@@ -31265,7 +31302,7 @@
           <a:effectLst/>
           <a:extLst>
             <a:ext uri="{AF507438-7753-43e0-B8FC-AC1667EBCBE1}">
-              <a14:hiddenEffects xmlns="" xmlns:a14="http://schemas.microsoft.com/office/drawing/2010/main">
+              <a14:hiddenEffects xmlns:a14="http://schemas.microsoft.com/office/drawing/2010/main" xmlns="">
                 <a:effectLst>
                   <a:outerShdw blurRad="63500" dist="38099" dir="2700000" algn="ctr" rotWithShape="0">
                     <a:schemeClr val="bg2">
@@ -31364,7 +31401,7 @@
           <a:effectLst/>
           <a:extLst>
             <a:ext uri="{AF507438-7753-43e0-B8FC-AC1667EBCBE1}">
-              <a14:hiddenEffects xmlns="" xmlns:a14="http://schemas.microsoft.com/office/drawing/2010/main">
+              <a14:hiddenEffects xmlns:a14="http://schemas.microsoft.com/office/drawing/2010/main" xmlns="">
                 <a:effectLst>
                   <a:outerShdw blurRad="63500" dist="38099" dir="2700000" algn="ctr" rotWithShape="0">
                     <a:schemeClr val="bg2">
@@ -31450,7 +31487,7 @@
           <a:effectLst/>
           <a:extLst>
             <a:ext uri="{AF507438-7753-43e0-B8FC-AC1667EBCBE1}">
-              <a14:hiddenEffects xmlns="" xmlns:a14="http://schemas.microsoft.com/office/drawing/2010/main">
+              <a14:hiddenEffects xmlns:a14="http://schemas.microsoft.com/office/drawing/2010/main" xmlns="">
                 <a:effectLst>
                   <a:outerShdw blurRad="63500" dist="38099" dir="2700000" algn="ctr" rotWithShape="0">
                     <a:schemeClr val="bg2">
@@ -31498,7 +31535,7 @@
           <a:effectLst/>
           <a:extLst>
             <a:ext uri="{AF507438-7753-43e0-B8FC-AC1667EBCBE1}">
-              <a14:hiddenEffects xmlns="" xmlns:a14="http://schemas.microsoft.com/office/drawing/2010/main">
+              <a14:hiddenEffects xmlns:a14="http://schemas.microsoft.com/office/drawing/2010/main" xmlns="">
                 <a:effectLst>
                   <a:outerShdw blurRad="63500" dist="38099" dir="2700000" algn="ctr" rotWithShape="0">
                     <a:schemeClr val="bg2">
@@ -31599,7 +31636,7 @@
           <a:effectLst/>
           <a:extLst>
             <a:ext uri="{AF507438-7753-43e0-B8FC-AC1667EBCBE1}">
-              <a14:hiddenEffects xmlns="" xmlns:a14="http://schemas.microsoft.com/office/drawing/2010/main">
+              <a14:hiddenEffects xmlns:a14="http://schemas.microsoft.com/office/drawing/2010/main" xmlns="">
                 <a:effectLst>
                   <a:outerShdw blurRad="63500" dist="38099" dir="2700000" algn="ctr" rotWithShape="0">
                     <a:schemeClr val="bg2">
@@ -31924,7 +31961,7 @@
           <a:effectLst/>
           <a:extLst>
             <a:ext uri="{AF507438-7753-43e0-B8FC-AC1667EBCBE1}">
-              <a14:hiddenEffects xmlns="" xmlns:a14="http://schemas.microsoft.com/office/drawing/2010/main">
+              <a14:hiddenEffects xmlns:a14="http://schemas.microsoft.com/office/drawing/2010/main" xmlns="">
                 <a:effectLst>
                   <a:outerShdw blurRad="63500" dist="38099" dir="2700000" algn="ctr" rotWithShape="0">
                     <a:schemeClr val="bg2">
@@ -32068,7 +32105,7 @@
           <a:effectLst/>
           <a:extLst>
             <a:ext uri="{AF507438-7753-43e0-B8FC-AC1667EBCBE1}">
-              <a14:hiddenEffects xmlns="" xmlns:a14="http://schemas.microsoft.com/office/drawing/2010/main">
+              <a14:hiddenEffects xmlns:a14="http://schemas.microsoft.com/office/drawing/2010/main" xmlns="">
                 <a:effectLst>
                   <a:outerShdw blurRad="63500" dist="38099" dir="2700000" algn="ctr" rotWithShape="0">
                     <a:schemeClr val="bg2">
@@ -32118,7 +32155,7 @@
           <a:effectLst/>
           <a:extLst>
             <a:ext uri="{AF507438-7753-43e0-B8FC-AC1667EBCBE1}">
-              <a14:hiddenEffects xmlns="" xmlns:a14="http://schemas.microsoft.com/office/drawing/2010/main">
+              <a14:hiddenEffects xmlns:a14="http://schemas.microsoft.com/office/drawing/2010/main" xmlns="">
                 <a:effectLst>
                   <a:outerShdw blurRad="63500" dist="38099" dir="2700000" algn="ctr" rotWithShape="0">
                     <a:schemeClr val="bg2">
@@ -32166,7 +32203,7 @@
           <a:effectLst/>
           <a:extLst>
             <a:ext uri="{AF507438-7753-43e0-B8FC-AC1667EBCBE1}">
-              <a14:hiddenEffects xmlns="" xmlns:a14="http://schemas.microsoft.com/office/drawing/2010/main">
+              <a14:hiddenEffects xmlns:a14="http://schemas.microsoft.com/office/drawing/2010/main" xmlns="">
                 <a:effectLst>
                   <a:outerShdw blurRad="63500" dist="38099" dir="2700000" algn="ctr" rotWithShape="0">
                     <a:schemeClr val="bg2">
@@ -32362,7 +32399,7 @@
           <a:effectLst/>
           <a:extLst>
             <a:ext uri="{AF507438-7753-43e0-B8FC-AC1667EBCBE1}">
-              <a14:hiddenEffects xmlns="" xmlns:a14="http://schemas.microsoft.com/office/drawing/2010/main">
+              <a14:hiddenEffects xmlns:a14="http://schemas.microsoft.com/office/drawing/2010/main" xmlns="">
                 <a:effectLst>
                   <a:outerShdw blurRad="63500" dist="38099" dir="2700000" algn="ctr" rotWithShape="0">
                     <a:schemeClr val="bg2">
@@ -33181,7 +33218,7 @@
           <a:effectLst/>
           <a:extLst>
             <a:ext uri="{AF507438-7753-43e0-B8FC-AC1667EBCBE1}">
-              <a14:hiddenEffects xmlns="" xmlns:a14="http://schemas.microsoft.com/office/drawing/2010/main">
+              <a14:hiddenEffects xmlns:a14="http://schemas.microsoft.com/office/drawing/2010/main" xmlns="">
                 <a:effectLst>
                   <a:outerShdw blurRad="63500" dist="38099" dir="2700000" algn="ctr" rotWithShape="0">
                     <a:schemeClr val="bg2">
@@ -33327,7 +33364,7 @@
           <a:effectLst/>
           <a:extLst>
             <a:ext uri="{AF507438-7753-43e0-B8FC-AC1667EBCBE1}">
-              <a14:hiddenEffects xmlns="" xmlns:a14="http://schemas.microsoft.com/office/drawing/2010/main">
+              <a14:hiddenEffects xmlns:a14="http://schemas.microsoft.com/office/drawing/2010/main" xmlns="">
                 <a:effectLst>
                   <a:outerShdw blurRad="63500" dist="38099" dir="2700000" algn="ctr" rotWithShape="0">
                     <a:schemeClr val="bg2">
@@ -33415,7 +33452,7 @@
           <a:effectLst/>
           <a:extLst>
             <a:ext uri="{AF507438-7753-43e0-B8FC-AC1667EBCBE1}">
-              <a14:hiddenEffects xmlns="" xmlns:a14="http://schemas.microsoft.com/office/drawing/2010/main">
+              <a14:hiddenEffects xmlns:a14="http://schemas.microsoft.com/office/drawing/2010/main" xmlns="">
                 <a:effectLst>
                   <a:outerShdw blurRad="63500" dist="38099" dir="2700000" algn="ctr" rotWithShape="0">
                     <a:schemeClr val="bg2">
@@ -33502,7 +33539,7 @@
           <a:effectLst/>
           <a:extLst>
             <a:ext uri="{AF507438-7753-43e0-B8FC-AC1667EBCBE1}">
-              <a14:hiddenEffects xmlns="" xmlns:a14="http://schemas.microsoft.com/office/drawing/2010/main">
+              <a14:hiddenEffects xmlns:a14="http://schemas.microsoft.com/office/drawing/2010/main" xmlns="">
                 <a:effectLst>
                   <a:outerShdw blurRad="63500" dist="38099" dir="2700000" algn="ctr" rotWithShape="0">
                     <a:schemeClr val="bg2">
@@ -33585,7 +33622,7 @@
           <a:effectLst/>
           <a:extLst>
             <a:ext uri="{AF507438-7753-43e0-B8FC-AC1667EBCBE1}">
-              <a14:hiddenEffects xmlns="" xmlns:a14="http://schemas.microsoft.com/office/drawing/2010/main">
+              <a14:hiddenEffects xmlns:a14="http://schemas.microsoft.com/office/drawing/2010/main" xmlns="">
                 <a:effectLst>
                   <a:outerShdw blurRad="63500" dist="38099" dir="2700000" algn="ctr" rotWithShape="0">
                     <a:schemeClr val="bg2">
@@ -33682,7 +33719,7 @@
           <a:effectLst/>
           <a:extLst>
             <a:ext uri="{AF507438-7753-43e0-B8FC-AC1667EBCBE1}">
-              <a14:hiddenEffects xmlns="" xmlns:a14="http://schemas.microsoft.com/office/drawing/2010/main">
+              <a14:hiddenEffects xmlns:a14="http://schemas.microsoft.com/office/drawing/2010/main" xmlns="">
                 <a:effectLst>
                   <a:outerShdw blurRad="63500" dist="38099" dir="2700000" algn="ctr" rotWithShape="0">
                     <a:schemeClr val="bg2">
@@ -33779,7 +33816,7 @@
           <a:effectLst/>
           <a:extLst>
             <a:ext uri="{AF507438-7753-43e0-B8FC-AC1667EBCBE1}">
-              <a14:hiddenEffects xmlns="" xmlns:a14="http://schemas.microsoft.com/office/drawing/2010/main">
+              <a14:hiddenEffects xmlns:a14="http://schemas.microsoft.com/office/drawing/2010/main" xmlns="">
                 <a:effectLst>
                   <a:outerShdw blurRad="63500" dist="38099" dir="2700000" algn="ctr" rotWithShape="0">
                     <a:schemeClr val="bg2">
@@ -33874,7 +33911,7 @@
           <a:effectLst/>
           <a:extLst>
             <a:ext uri="{AF507438-7753-43e0-B8FC-AC1667EBCBE1}">
-              <a14:hiddenEffects xmlns="" xmlns:a14="http://schemas.microsoft.com/office/drawing/2010/main">
+              <a14:hiddenEffects xmlns:a14="http://schemas.microsoft.com/office/drawing/2010/main" xmlns="">
                 <a:effectLst>
                   <a:outerShdw blurRad="63500" dist="38099" dir="2700000" algn="ctr" rotWithShape="0">
                     <a:schemeClr val="bg2">
@@ -33973,7 +34010,7 @@
           <a:effectLst/>
           <a:extLst>
             <a:ext uri="{AF507438-7753-43e0-B8FC-AC1667EBCBE1}">
-              <a14:hiddenEffects xmlns="" xmlns:a14="http://schemas.microsoft.com/office/drawing/2010/main">
+              <a14:hiddenEffects xmlns:a14="http://schemas.microsoft.com/office/drawing/2010/main" xmlns="">
                 <a:effectLst>
                   <a:outerShdw blurRad="63500" dist="38099" dir="2700000" algn="ctr" rotWithShape="0">
                     <a:schemeClr val="bg2">
@@ -34059,7 +34096,7 @@
           <a:effectLst/>
           <a:extLst>
             <a:ext uri="{AF507438-7753-43e0-B8FC-AC1667EBCBE1}">
-              <a14:hiddenEffects xmlns="" xmlns:a14="http://schemas.microsoft.com/office/drawing/2010/main">
+              <a14:hiddenEffects xmlns:a14="http://schemas.microsoft.com/office/drawing/2010/main" xmlns="">
                 <a:effectLst>
                   <a:outerShdw blurRad="63500" dist="38099" dir="2700000" algn="ctr" rotWithShape="0">
                     <a:schemeClr val="bg2">
@@ -34107,7 +34144,7 @@
           <a:effectLst/>
           <a:extLst>
             <a:ext uri="{AF507438-7753-43e0-B8FC-AC1667EBCBE1}">
-              <a14:hiddenEffects xmlns="" xmlns:a14="http://schemas.microsoft.com/office/drawing/2010/main">
+              <a14:hiddenEffects xmlns:a14="http://schemas.microsoft.com/office/drawing/2010/main" xmlns="">
                 <a:effectLst>
                   <a:outerShdw blurRad="63500" dist="38099" dir="2700000" algn="ctr" rotWithShape="0">
                     <a:schemeClr val="bg2">
@@ -34208,7 +34245,7 @@
           <a:effectLst/>
           <a:extLst>
             <a:ext uri="{AF507438-7753-43e0-B8FC-AC1667EBCBE1}">
-              <a14:hiddenEffects xmlns="" xmlns:a14="http://schemas.microsoft.com/office/drawing/2010/main">
+              <a14:hiddenEffects xmlns:a14="http://schemas.microsoft.com/office/drawing/2010/main" xmlns="">
                 <a:effectLst>
                   <a:outerShdw blurRad="63500" dist="38099" dir="2700000" algn="ctr" rotWithShape="0">
                     <a:schemeClr val="bg2">
@@ -34347,7 +34384,7 @@
           <a:effectLst/>
           <a:extLst>
             <a:ext uri="{AF507438-7753-43e0-B8FC-AC1667EBCBE1}">
-              <a14:hiddenEffects xmlns="" xmlns:a14="http://schemas.microsoft.com/office/drawing/2010/main">
+              <a14:hiddenEffects xmlns:a14="http://schemas.microsoft.com/office/drawing/2010/main" xmlns="">
                 <a:effectLst>
                   <a:outerShdw blurRad="63500" dist="38099" dir="2700000" algn="ctr" rotWithShape="0">
                     <a:schemeClr val="bg2">
@@ -34397,7 +34434,7 @@
           <a:effectLst/>
           <a:extLst>
             <a:ext uri="{AF507438-7753-43e0-B8FC-AC1667EBCBE1}">
-              <a14:hiddenEffects xmlns="" xmlns:a14="http://schemas.microsoft.com/office/drawing/2010/main">
+              <a14:hiddenEffects xmlns:a14="http://schemas.microsoft.com/office/drawing/2010/main" xmlns="">
                 <a:effectLst>
                   <a:outerShdw blurRad="63500" dist="38099" dir="2700000" algn="ctr" rotWithShape="0">
                     <a:schemeClr val="bg2">
@@ -34445,7 +34482,7 @@
           <a:effectLst/>
           <a:extLst>
             <a:ext uri="{AF507438-7753-43e0-B8FC-AC1667EBCBE1}">
-              <a14:hiddenEffects xmlns="" xmlns:a14="http://schemas.microsoft.com/office/drawing/2010/main">
+              <a14:hiddenEffects xmlns:a14="http://schemas.microsoft.com/office/drawing/2010/main" xmlns="">
                 <a:effectLst>
                   <a:outerShdw blurRad="63500" dist="38099" dir="2700000" algn="ctr" rotWithShape="0">
                     <a:schemeClr val="bg2">
@@ -35437,7 +35474,7 @@
         <a:effectLst/>
         <a:extLst>
           <a:ext uri="{AF507438-7753-43e0-B8FC-AC1667EBCBE1}">
-            <a14:hiddenEffects xmlns="" xmlns:a14="http://schemas.microsoft.com/office/drawing/2010/main">
+            <a14:hiddenEffects xmlns:a14="http://schemas.microsoft.com/office/drawing/2010/main" xmlns="">
               <a:effectLst>
                 <a:outerShdw blurRad="63500" dist="38099" dir="2700000" algn="ctr" rotWithShape="0">
                   <a:schemeClr val="bg2">
@@ -35514,7 +35551,7 @@
         <a:effectLst/>
         <a:extLst>
           <a:ext uri="{AF507438-7753-43e0-B8FC-AC1667EBCBE1}">
-            <a14:hiddenEffects xmlns="" xmlns:a14="http://schemas.microsoft.com/office/drawing/2010/main">
+            <a14:hiddenEffects xmlns:a14="http://schemas.microsoft.com/office/drawing/2010/main" xmlns="">
               <a:effectLst>
                 <a:outerShdw blurRad="63500" dist="38099" dir="2700000" algn="ctr" rotWithShape="0">
                   <a:schemeClr val="bg2">

</xml_diff>

<commit_message>
section 4 is done
</commit_message>
<xml_diff>
--- a/figs/conlink/concurrent_linking.pptx
+++ b/figs/conlink/concurrent_linking.pptx
@@ -231,7 +231,7 @@
           <a:p>
             <a:fld id="{98CD50F9-C04E-0643-A81F-E269F6C4EDC0}" type="datetimeFigureOut">
               <a:rPr lang="en-US" smtClean="0"/>
-              <a:t>1/27/19</a:t>
+              <a:t>2/15/19</a:t>
             </a:fld>
             <a:endParaRPr lang="en-US"/>
           </a:p>
@@ -410,7 +410,7 @@
             <a:fld id="{17A7BBF0-95DB-485B-8F44-219DC193D725}" type="datetimeFigureOut">
               <a:rPr lang="en-US" smtClean="0"/>
               <a:pPr/>
-              <a:t>1/27/19</a:t>
+              <a:t>2/15/19</a:t>
             </a:fld>
             <a:endParaRPr lang="en-US"/>
           </a:p>
@@ -1313,17 +1313,17 @@
           <a:effectLst/>
           <a:extLst>
             <a:ext uri="{FAA26D3D-D897-4be2-8F04-BA451C77F1D7}">
-              <ma14:placeholderFlag xmlns:ma14="http://schemas.microsoft.com/office/mac/drawingml/2011/main" xmlns="" val="1"/>
+              <ma14:placeholderFlag xmlns="" xmlns:ma14="http://schemas.microsoft.com/office/mac/drawingml/2011/main" val="1"/>
             </a:ext>
             <a:ext uri="{909E8E84-426E-40dd-AFC4-6F175D3DCCD1}">
-              <a14:hiddenFill xmlns:a14="http://schemas.microsoft.com/office/drawing/2010/main" xmlns="">
+              <a14:hiddenFill xmlns="" xmlns:a14="http://schemas.microsoft.com/office/drawing/2010/main">
                 <a:solidFill>
                   <a:schemeClr val="accent1"/>
                 </a:solidFill>
               </a14:hiddenFill>
             </a:ext>
             <a:ext uri="{91240B29-F687-4f45-9708-019B960494DF}">
-              <a14:hiddenLine xmlns:a14="http://schemas.microsoft.com/office/drawing/2010/main" xmlns="" w="9525">
+              <a14:hiddenLine xmlns="" xmlns:a14="http://schemas.microsoft.com/office/drawing/2010/main" w="9525">
                 <a:solidFill>
                   <a:schemeClr val="tx1"/>
                 </a:solidFill>
@@ -1333,7 +1333,7 @@
               </a14:hiddenLine>
             </a:ext>
             <a:ext uri="{AF507438-7753-43e0-B8FC-AC1667EBCBE1}">
-              <a14:hiddenEffects xmlns:a14="http://schemas.microsoft.com/office/drawing/2010/main" xmlns="">
+              <a14:hiddenEffects xmlns="" xmlns:a14="http://schemas.microsoft.com/office/drawing/2010/main">
                 <a:effectLst>
                   <a:outerShdw blurRad="63500" dist="38099" dir="2700000" algn="ctr" rotWithShape="0">
                     <a:schemeClr val="bg2">
@@ -1597,17 +1597,17 @@
           <a:effectLst/>
           <a:extLst>
             <a:ext uri="{FAA26D3D-D897-4be2-8F04-BA451C77F1D7}">
-              <ma14:placeholderFlag xmlns:ma14="http://schemas.microsoft.com/office/mac/drawingml/2011/main" xmlns="" val="1"/>
+              <ma14:placeholderFlag xmlns="" xmlns:ma14="http://schemas.microsoft.com/office/mac/drawingml/2011/main" val="1"/>
             </a:ext>
             <a:ext uri="{909E8E84-426E-40dd-AFC4-6F175D3DCCD1}">
-              <a14:hiddenFill xmlns:a14="http://schemas.microsoft.com/office/drawing/2010/main" xmlns="">
+              <a14:hiddenFill xmlns="" xmlns:a14="http://schemas.microsoft.com/office/drawing/2010/main">
                 <a:solidFill>
                   <a:schemeClr val="accent1"/>
                 </a:solidFill>
               </a14:hiddenFill>
             </a:ext>
             <a:ext uri="{91240B29-F687-4f45-9708-019B960494DF}">
-              <a14:hiddenLine xmlns:a14="http://schemas.microsoft.com/office/drawing/2010/main" xmlns="" w="9525">
+              <a14:hiddenLine xmlns="" xmlns:a14="http://schemas.microsoft.com/office/drawing/2010/main" w="9525">
                 <a:solidFill>
                   <a:schemeClr val="tx1"/>
                 </a:solidFill>
@@ -1617,7 +1617,7 @@
               </a14:hiddenLine>
             </a:ext>
             <a:ext uri="{AF507438-7753-43e0-B8FC-AC1667EBCBE1}">
-              <a14:hiddenEffects xmlns:a14="http://schemas.microsoft.com/office/drawing/2010/main" xmlns="">
+              <a14:hiddenEffects xmlns="" xmlns:a14="http://schemas.microsoft.com/office/drawing/2010/main">
                 <a:effectLst>
                   <a:outerShdw blurRad="63500" dist="38099" dir="2700000" algn="ctr" rotWithShape="0">
                     <a:schemeClr val="bg2">
@@ -1891,17 +1891,17 @@
           <a:effectLst/>
           <a:extLst>
             <a:ext uri="{FAA26D3D-D897-4be2-8F04-BA451C77F1D7}">
-              <ma14:placeholderFlag xmlns:ma14="http://schemas.microsoft.com/office/mac/drawingml/2011/main" xmlns="" val="1"/>
+              <ma14:placeholderFlag xmlns="" xmlns:ma14="http://schemas.microsoft.com/office/mac/drawingml/2011/main" val="1"/>
             </a:ext>
             <a:ext uri="{909E8E84-426E-40dd-AFC4-6F175D3DCCD1}">
-              <a14:hiddenFill xmlns:a14="http://schemas.microsoft.com/office/drawing/2010/main" xmlns="">
+              <a14:hiddenFill xmlns="" xmlns:a14="http://schemas.microsoft.com/office/drawing/2010/main">
                 <a:solidFill>
                   <a:schemeClr val="accent1"/>
                 </a:solidFill>
               </a14:hiddenFill>
             </a:ext>
             <a:ext uri="{91240B29-F687-4f45-9708-019B960494DF}">
-              <a14:hiddenLine xmlns:a14="http://schemas.microsoft.com/office/drawing/2010/main" xmlns="" w="9525">
+              <a14:hiddenLine xmlns="" xmlns:a14="http://schemas.microsoft.com/office/drawing/2010/main" w="9525">
                 <a:solidFill>
                   <a:schemeClr val="tx1"/>
                 </a:solidFill>
@@ -1911,7 +1911,7 @@
               </a14:hiddenLine>
             </a:ext>
             <a:ext uri="{AF507438-7753-43e0-B8FC-AC1667EBCBE1}">
-              <a14:hiddenEffects xmlns:a14="http://schemas.microsoft.com/office/drawing/2010/main" xmlns="">
+              <a14:hiddenEffects xmlns="" xmlns:a14="http://schemas.microsoft.com/office/drawing/2010/main">
                 <a:effectLst>
                   <a:outerShdw blurRad="63500" dist="38099" dir="2700000" algn="ctr" rotWithShape="0">
                     <a:schemeClr val="bg2">
@@ -2175,17 +2175,17 @@
           <a:effectLst/>
           <a:extLst>
             <a:ext uri="{FAA26D3D-D897-4be2-8F04-BA451C77F1D7}">
-              <ma14:placeholderFlag xmlns:ma14="http://schemas.microsoft.com/office/mac/drawingml/2011/main" xmlns="" val="1"/>
+              <ma14:placeholderFlag xmlns="" xmlns:ma14="http://schemas.microsoft.com/office/mac/drawingml/2011/main" val="1"/>
             </a:ext>
             <a:ext uri="{909E8E84-426E-40dd-AFC4-6F175D3DCCD1}">
-              <a14:hiddenFill xmlns:a14="http://schemas.microsoft.com/office/drawing/2010/main" xmlns="">
+              <a14:hiddenFill xmlns="" xmlns:a14="http://schemas.microsoft.com/office/drawing/2010/main">
                 <a:solidFill>
                   <a:schemeClr val="accent1"/>
                 </a:solidFill>
               </a14:hiddenFill>
             </a:ext>
             <a:ext uri="{91240B29-F687-4f45-9708-019B960494DF}">
-              <a14:hiddenLine xmlns:a14="http://schemas.microsoft.com/office/drawing/2010/main" xmlns="" w="9525">
+              <a14:hiddenLine xmlns="" xmlns:a14="http://schemas.microsoft.com/office/drawing/2010/main" w="9525">
                 <a:solidFill>
                   <a:schemeClr val="tx1"/>
                 </a:solidFill>
@@ -2195,7 +2195,7 @@
               </a14:hiddenLine>
             </a:ext>
             <a:ext uri="{AF507438-7753-43e0-B8FC-AC1667EBCBE1}">
-              <a14:hiddenEffects xmlns:a14="http://schemas.microsoft.com/office/drawing/2010/main" xmlns="">
+              <a14:hiddenEffects xmlns="" xmlns:a14="http://schemas.microsoft.com/office/drawing/2010/main">
                 <a:effectLst>
                   <a:outerShdw blurRad="63500" dist="38099" dir="2700000" algn="ctr" rotWithShape="0">
                     <a:schemeClr val="bg2">
@@ -2481,17 +2481,17 @@
           <a:effectLst/>
           <a:extLst>
             <a:ext uri="{FAA26D3D-D897-4be2-8F04-BA451C77F1D7}">
-              <ma14:placeholderFlag xmlns:ma14="http://schemas.microsoft.com/office/mac/drawingml/2011/main" xmlns="" val="1"/>
+              <ma14:placeholderFlag xmlns="" xmlns:ma14="http://schemas.microsoft.com/office/mac/drawingml/2011/main" val="1"/>
             </a:ext>
             <a:ext uri="{909E8E84-426E-40dd-AFC4-6F175D3DCCD1}">
-              <a14:hiddenFill xmlns:a14="http://schemas.microsoft.com/office/drawing/2010/main" xmlns="">
+              <a14:hiddenFill xmlns="" xmlns:a14="http://schemas.microsoft.com/office/drawing/2010/main">
                 <a:solidFill>
                   <a:schemeClr val="accent1"/>
                 </a:solidFill>
               </a14:hiddenFill>
             </a:ext>
             <a:ext uri="{91240B29-F687-4f45-9708-019B960494DF}">
-              <a14:hiddenLine xmlns:a14="http://schemas.microsoft.com/office/drawing/2010/main" xmlns="" w="9525">
+              <a14:hiddenLine xmlns="" xmlns:a14="http://schemas.microsoft.com/office/drawing/2010/main" w="9525">
                 <a:solidFill>
                   <a:schemeClr val="tx1"/>
                 </a:solidFill>
@@ -2501,7 +2501,7 @@
               </a14:hiddenLine>
             </a:ext>
             <a:ext uri="{AF507438-7753-43e0-B8FC-AC1667EBCBE1}">
-              <a14:hiddenEffects xmlns:a14="http://schemas.microsoft.com/office/drawing/2010/main" xmlns="">
+              <a14:hiddenEffects xmlns="" xmlns:a14="http://schemas.microsoft.com/office/drawing/2010/main">
                 <a:effectLst>
                   <a:outerShdw blurRad="63500" dist="38099" dir="2700000" algn="ctr" rotWithShape="0">
                     <a:schemeClr val="bg2">
@@ -2883,17 +2883,17 @@
           <a:effectLst/>
           <a:extLst>
             <a:ext uri="{FAA26D3D-D897-4be2-8F04-BA451C77F1D7}">
-              <ma14:placeholderFlag xmlns:ma14="http://schemas.microsoft.com/office/mac/drawingml/2011/main" xmlns="" val="1"/>
+              <ma14:placeholderFlag xmlns="" xmlns:ma14="http://schemas.microsoft.com/office/mac/drawingml/2011/main" val="1"/>
             </a:ext>
             <a:ext uri="{909E8E84-426E-40dd-AFC4-6F175D3DCCD1}">
-              <a14:hiddenFill xmlns:a14="http://schemas.microsoft.com/office/drawing/2010/main" xmlns="">
+              <a14:hiddenFill xmlns="" xmlns:a14="http://schemas.microsoft.com/office/drawing/2010/main">
                 <a:solidFill>
                   <a:schemeClr val="accent1"/>
                 </a:solidFill>
               </a14:hiddenFill>
             </a:ext>
             <a:ext uri="{91240B29-F687-4f45-9708-019B960494DF}">
-              <a14:hiddenLine xmlns:a14="http://schemas.microsoft.com/office/drawing/2010/main" xmlns="" w="9525">
+              <a14:hiddenLine xmlns="" xmlns:a14="http://schemas.microsoft.com/office/drawing/2010/main" w="9525">
                 <a:solidFill>
                   <a:schemeClr val="tx1"/>
                 </a:solidFill>
@@ -2903,7 +2903,7 @@
               </a14:hiddenLine>
             </a:ext>
             <a:ext uri="{AF507438-7753-43e0-B8FC-AC1667EBCBE1}">
-              <a14:hiddenEffects xmlns:a14="http://schemas.microsoft.com/office/drawing/2010/main" xmlns="">
+              <a14:hiddenEffects xmlns="" xmlns:a14="http://schemas.microsoft.com/office/drawing/2010/main">
                 <a:effectLst>
                   <a:outerShdw blurRad="63500" dist="38099" dir="2700000" algn="ctr" rotWithShape="0">
                     <a:schemeClr val="bg2">
@@ -3419,17 +3419,17 @@
           <a:effectLst/>
           <a:extLst>
             <a:ext uri="{FAA26D3D-D897-4be2-8F04-BA451C77F1D7}">
-              <ma14:placeholderFlag xmlns:ma14="http://schemas.microsoft.com/office/mac/drawingml/2011/main" xmlns="" val="1"/>
+              <ma14:placeholderFlag xmlns="" xmlns:ma14="http://schemas.microsoft.com/office/mac/drawingml/2011/main" val="1"/>
             </a:ext>
             <a:ext uri="{909E8E84-426E-40dd-AFC4-6F175D3DCCD1}">
-              <a14:hiddenFill xmlns:a14="http://schemas.microsoft.com/office/drawing/2010/main" xmlns="">
+              <a14:hiddenFill xmlns="" xmlns:a14="http://schemas.microsoft.com/office/drawing/2010/main">
                 <a:solidFill>
                   <a:schemeClr val="accent1"/>
                 </a:solidFill>
               </a14:hiddenFill>
             </a:ext>
             <a:ext uri="{91240B29-F687-4f45-9708-019B960494DF}">
-              <a14:hiddenLine xmlns:a14="http://schemas.microsoft.com/office/drawing/2010/main" xmlns="" w="9525">
+              <a14:hiddenLine xmlns="" xmlns:a14="http://schemas.microsoft.com/office/drawing/2010/main" w="9525">
                 <a:solidFill>
                   <a:schemeClr val="tx1"/>
                 </a:solidFill>
@@ -3439,7 +3439,7 @@
               </a14:hiddenLine>
             </a:ext>
             <a:ext uri="{AF507438-7753-43e0-B8FC-AC1667EBCBE1}">
-              <a14:hiddenEffects xmlns:a14="http://schemas.microsoft.com/office/drawing/2010/main" xmlns="">
+              <a14:hiddenEffects xmlns="" xmlns:a14="http://schemas.microsoft.com/office/drawing/2010/main">
                 <a:effectLst>
                   <a:outerShdw blurRad="63500" dist="38099" dir="2700000" algn="ctr" rotWithShape="0">
                     <a:schemeClr val="bg2">
@@ -3651,17 +3651,17 @@
           <a:effectLst/>
           <a:extLst>
             <a:ext uri="{FAA26D3D-D897-4be2-8F04-BA451C77F1D7}">
-              <ma14:placeholderFlag xmlns:ma14="http://schemas.microsoft.com/office/mac/drawingml/2011/main" xmlns="" val="1"/>
+              <ma14:placeholderFlag xmlns="" xmlns:ma14="http://schemas.microsoft.com/office/mac/drawingml/2011/main" val="1"/>
             </a:ext>
             <a:ext uri="{909E8E84-426E-40dd-AFC4-6F175D3DCCD1}">
-              <a14:hiddenFill xmlns:a14="http://schemas.microsoft.com/office/drawing/2010/main" xmlns="">
+              <a14:hiddenFill xmlns="" xmlns:a14="http://schemas.microsoft.com/office/drawing/2010/main">
                 <a:solidFill>
                   <a:schemeClr val="accent1"/>
                 </a:solidFill>
               </a14:hiddenFill>
             </a:ext>
             <a:ext uri="{91240B29-F687-4f45-9708-019B960494DF}">
-              <a14:hiddenLine xmlns:a14="http://schemas.microsoft.com/office/drawing/2010/main" xmlns="" w="9525">
+              <a14:hiddenLine xmlns="" xmlns:a14="http://schemas.microsoft.com/office/drawing/2010/main" w="9525">
                 <a:solidFill>
                   <a:schemeClr val="tx1"/>
                 </a:solidFill>
@@ -3671,7 +3671,7 @@
               </a14:hiddenLine>
             </a:ext>
             <a:ext uri="{AF507438-7753-43e0-B8FC-AC1667EBCBE1}">
-              <a14:hiddenEffects xmlns:a14="http://schemas.microsoft.com/office/drawing/2010/main" xmlns="">
+              <a14:hiddenEffects xmlns="" xmlns:a14="http://schemas.microsoft.com/office/drawing/2010/main">
                 <a:effectLst>
                   <a:outerShdw blurRad="63500" dist="38099" dir="2700000" algn="ctr" rotWithShape="0">
                     <a:schemeClr val="bg2">
@@ -3860,17 +3860,17 @@
           <a:effectLst/>
           <a:extLst>
             <a:ext uri="{FAA26D3D-D897-4be2-8F04-BA451C77F1D7}">
-              <ma14:placeholderFlag xmlns:ma14="http://schemas.microsoft.com/office/mac/drawingml/2011/main" xmlns="" val="1"/>
+              <ma14:placeholderFlag xmlns="" xmlns:ma14="http://schemas.microsoft.com/office/mac/drawingml/2011/main" val="1"/>
             </a:ext>
             <a:ext uri="{909E8E84-426E-40dd-AFC4-6F175D3DCCD1}">
-              <a14:hiddenFill xmlns:a14="http://schemas.microsoft.com/office/drawing/2010/main" xmlns="">
+              <a14:hiddenFill xmlns="" xmlns:a14="http://schemas.microsoft.com/office/drawing/2010/main">
                 <a:solidFill>
                   <a:schemeClr val="accent1"/>
                 </a:solidFill>
               </a14:hiddenFill>
             </a:ext>
             <a:ext uri="{91240B29-F687-4f45-9708-019B960494DF}">
-              <a14:hiddenLine xmlns:a14="http://schemas.microsoft.com/office/drawing/2010/main" xmlns="" w="9525">
+              <a14:hiddenLine xmlns="" xmlns:a14="http://schemas.microsoft.com/office/drawing/2010/main" w="9525">
                 <a:solidFill>
                   <a:schemeClr val="tx1"/>
                 </a:solidFill>
@@ -3880,7 +3880,7 @@
               </a14:hiddenLine>
             </a:ext>
             <a:ext uri="{AF507438-7753-43e0-B8FC-AC1667EBCBE1}">
-              <a14:hiddenEffects xmlns:a14="http://schemas.microsoft.com/office/drawing/2010/main" xmlns="">
+              <a14:hiddenEffects xmlns="" xmlns:a14="http://schemas.microsoft.com/office/drawing/2010/main">
                 <a:effectLst>
                   <a:outerShdw blurRad="63500" dist="38099" dir="2700000" algn="ctr" rotWithShape="0">
                     <a:schemeClr val="bg2">
@@ -4251,17 +4251,17 @@
           <a:effectLst/>
           <a:extLst>
             <a:ext uri="{FAA26D3D-D897-4be2-8F04-BA451C77F1D7}">
-              <ma14:placeholderFlag xmlns:ma14="http://schemas.microsoft.com/office/mac/drawingml/2011/main" xmlns="" val="1"/>
+              <ma14:placeholderFlag xmlns="" xmlns:ma14="http://schemas.microsoft.com/office/mac/drawingml/2011/main" val="1"/>
             </a:ext>
             <a:ext uri="{909E8E84-426E-40dd-AFC4-6F175D3DCCD1}">
-              <a14:hiddenFill xmlns:a14="http://schemas.microsoft.com/office/drawing/2010/main" xmlns="">
+              <a14:hiddenFill xmlns="" xmlns:a14="http://schemas.microsoft.com/office/drawing/2010/main">
                 <a:solidFill>
                   <a:schemeClr val="accent1"/>
                 </a:solidFill>
               </a14:hiddenFill>
             </a:ext>
             <a:ext uri="{91240B29-F687-4f45-9708-019B960494DF}">
-              <a14:hiddenLine xmlns:a14="http://schemas.microsoft.com/office/drawing/2010/main" xmlns="" w="9525">
+              <a14:hiddenLine xmlns="" xmlns:a14="http://schemas.microsoft.com/office/drawing/2010/main" w="9525">
                 <a:solidFill>
                   <a:schemeClr val="tx1"/>
                 </a:solidFill>
@@ -4271,7 +4271,7 @@
               </a14:hiddenLine>
             </a:ext>
             <a:ext uri="{AF507438-7753-43e0-B8FC-AC1667EBCBE1}">
-              <a14:hiddenEffects xmlns:a14="http://schemas.microsoft.com/office/drawing/2010/main" xmlns="">
+              <a14:hiddenEffects xmlns="" xmlns:a14="http://schemas.microsoft.com/office/drawing/2010/main">
                 <a:effectLst>
                   <a:outerShdw blurRad="63500" dist="38099" dir="2700000" algn="ctr" rotWithShape="0">
                     <a:schemeClr val="bg2">
@@ -4619,17 +4619,17 @@
           <a:effectLst/>
           <a:extLst>
             <a:ext uri="{FAA26D3D-D897-4be2-8F04-BA451C77F1D7}">
-              <ma14:placeholderFlag xmlns:ma14="http://schemas.microsoft.com/office/mac/drawingml/2011/main" xmlns="" val="1"/>
+              <ma14:placeholderFlag xmlns="" xmlns:ma14="http://schemas.microsoft.com/office/mac/drawingml/2011/main" val="1"/>
             </a:ext>
             <a:ext uri="{909E8E84-426E-40dd-AFC4-6F175D3DCCD1}">
-              <a14:hiddenFill xmlns:a14="http://schemas.microsoft.com/office/drawing/2010/main" xmlns="">
+              <a14:hiddenFill xmlns="" xmlns:a14="http://schemas.microsoft.com/office/drawing/2010/main">
                 <a:solidFill>
                   <a:schemeClr val="accent1"/>
                 </a:solidFill>
               </a14:hiddenFill>
             </a:ext>
             <a:ext uri="{91240B29-F687-4f45-9708-019B960494DF}">
-              <a14:hiddenLine xmlns:a14="http://schemas.microsoft.com/office/drawing/2010/main" xmlns="" w="9525">
+              <a14:hiddenLine xmlns="" xmlns:a14="http://schemas.microsoft.com/office/drawing/2010/main" w="9525">
                 <a:solidFill>
                   <a:schemeClr val="tx1"/>
                 </a:solidFill>
@@ -4639,7 +4639,7 @@
               </a14:hiddenLine>
             </a:ext>
             <a:ext uri="{AF507438-7753-43e0-B8FC-AC1667EBCBE1}">
-              <a14:hiddenEffects xmlns:a14="http://schemas.microsoft.com/office/drawing/2010/main" xmlns="">
+              <a14:hiddenEffects xmlns="" xmlns:a14="http://schemas.microsoft.com/office/drawing/2010/main">
                 <a:effectLst>
                   <a:outerShdw blurRad="63500" dist="38099" dir="2700000" algn="ctr" rotWithShape="0">
                     <a:schemeClr val="bg2">
@@ -4766,17 +4766,17 @@
           <a:effectLst/>
           <a:extLst>
             <a:ext uri="{FAA26D3D-D897-4be2-8F04-BA451C77F1D7}">
-              <ma14:placeholderFlag xmlns:ma14="http://schemas.microsoft.com/office/mac/drawingml/2011/main" xmlns="" val="1"/>
+              <ma14:placeholderFlag xmlns="" xmlns:ma14="http://schemas.microsoft.com/office/mac/drawingml/2011/main" val="1"/>
             </a:ext>
             <a:ext uri="{909E8E84-426E-40dd-AFC4-6F175D3DCCD1}">
-              <a14:hiddenFill xmlns:a14="http://schemas.microsoft.com/office/drawing/2010/main" xmlns="">
+              <a14:hiddenFill xmlns="" xmlns:a14="http://schemas.microsoft.com/office/drawing/2010/main">
                 <a:solidFill>
                   <a:schemeClr val="accent1"/>
                 </a:solidFill>
               </a14:hiddenFill>
             </a:ext>
             <a:ext uri="{91240B29-F687-4f45-9708-019B960494DF}">
-              <a14:hiddenLine xmlns:a14="http://schemas.microsoft.com/office/drawing/2010/main" xmlns="" w="9525">
+              <a14:hiddenLine xmlns="" xmlns:a14="http://schemas.microsoft.com/office/drawing/2010/main" w="9525">
                 <a:solidFill>
                   <a:schemeClr val="tx1"/>
                 </a:solidFill>
@@ -4786,7 +4786,7 @@
               </a14:hiddenLine>
             </a:ext>
             <a:ext uri="{AF507438-7753-43e0-B8FC-AC1667EBCBE1}">
-              <a14:hiddenEffects xmlns:a14="http://schemas.microsoft.com/office/drawing/2010/main" xmlns="">
+              <a14:hiddenEffects xmlns="" xmlns:a14="http://schemas.microsoft.com/office/drawing/2010/main">
                 <a:effectLst>
                   <a:outerShdw blurRad="63500" dist="38099" dir="2700000" algn="ctr" rotWithShape="0">
                     <a:schemeClr val="bg2">
@@ -4839,17 +4839,17 @@
           <a:effectLst/>
           <a:extLst>
             <a:ext uri="{FAA26D3D-D897-4be2-8F04-BA451C77F1D7}">
-              <ma14:placeholderFlag xmlns:ma14="http://schemas.microsoft.com/office/mac/drawingml/2011/main" xmlns="" val="1"/>
+              <ma14:placeholderFlag xmlns="" xmlns:ma14="http://schemas.microsoft.com/office/mac/drawingml/2011/main" val="1"/>
             </a:ext>
             <a:ext uri="{909E8E84-426E-40dd-AFC4-6F175D3DCCD1}">
-              <a14:hiddenFill xmlns:a14="http://schemas.microsoft.com/office/drawing/2010/main" xmlns="">
+              <a14:hiddenFill xmlns="" xmlns:a14="http://schemas.microsoft.com/office/drawing/2010/main">
                 <a:solidFill>
                   <a:schemeClr val="accent1"/>
                 </a:solidFill>
               </a14:hiddenFill>
             </a:ext>
             <a:ext uri="{91240B29-F687-4f45-9708-019B960494DF}">
-              <a14:hiddenLine xmlns:a14="http://schemas.microsoft.com/office/drawing/2010/main" xmlns="" w="9525">
+              <a14:hiddenLine xmlns="" xmlns:a14="http://schemas.microsoft.com/office/drawing/2010/main" w="9525">
                 <a:solidFill>
                   <a:schemeClr val="tx1"/>
                 </a:solidFill>
@@ -4859,7 +4859,7 @@
               </a14:hiddenLine>
             </a:ext>
             <a:ext uri="{AF507438-7753-43e0-B8FC-AC1667EBCBE1}">
-              <a14:hiddenEffects xmlns:a14="http://schemas.microsoft.com/office/drawing/2010/main" xmlns="">
+              <a14:hiddenEffects xmlns="" xmlns:a14="http://schemas.microsoft.com/office/drawing/2010/main">
                 <a:effectLst>
                   <a:outerShdw blurRad="63500" dist="38099" dir="2700000" algn="ctr" rotWithShape="0">
                     <a:schemeClr val="bg2">
@@ -4940,17 +4940,17 @@
           <a:effectLst/>
           <a:extLst>
             <a:ext uri="{FAA26D3D-D897-4be2-8F04-BA451C77F1D7}">
-              <ma14:placeholderFlag xmlns:ma14="http://schemas.microsoft.com/office/mac/drawingml/2011/main" xmlns="" val="1"/>
+              <ma14:placeholderFlag xmlns="" xmlns:ma14="http://schemas.microsoft.com/office/mac/drawingml/2011/main" val="1"/>
             </a:ext>
             <a:ext uri="{909E8E84-426E-40dd-AFC4-6F175D3DCCD1}">
-              <a14:hiddenFill xmlns:a14="http://schemas.microsoft.com/office/drawing/2010/main" xmlns="">
+              <a14:hiddenFill xmlns="" xmlns:a14="http://schemas.microsoft.com/office/drawing/2010/main">
                 <a:solidFill>
                   <a:schemeClr val="accent1"/>
                 </a:solidFill>
               </a14:hiddenFill>
             </a:ext>
             <a:ext uri="{91240B29-F687-4f45-9708-019B960494DF}">
-              <a14:hiddenLine xmlns:a14="http://schemas.microsoft.com/office/drawing/2010/main" xmlns="" w="9525">
+              <a14:hiddenLine xmlns="" xmlns:a14="http://schemas.microsoft.com/office/drawing/2010/main" w="9525">
                 <a:solidFill>
                   <a:schemeClr val="tx1"/>
                 </a:solidFill>
@@ -4960,7 +4960,7 @@
               </a14:hiddenLine>
             </a:ext>
             <a:ext uri="{AF507438-7753-43e0-B8FC-AC1667EBCBE1}">
-              <a14:hiddenEffects xmlns:a14="http://schemas.microsoft.com/office/drawing/2010/main" xmlns="">
+              <a14:hiddenEffects xmlns="" xmlns:a14="http://schemas.microsoft.com/office/drawing/2010/main">
                 <a:effectLst>
                   <a:outerShdw blurRad="63500" dist="38099" dir="2700000" algn="ctr" rotWithShape="0">
                     <a:schemeClr val="bg2">
@@ -5030,17 +5030,17 @@
           <a:effectLst/>
           <a:extLst>
             <a:ext uri="{FAA26D3D-D897-4be2-8F04-BA451C77F1D7}">
-              <ma14:placeholderFlag xmlns:ma14="http://schemas.microsoft.com/office/mac/drawingml/2011/main" xmlns="" val="1"/>
+              <ma14:placeholderFlag xmlns="" xmlns:ma14="http://schemas.microsoft.com/office/mac/drawingml/2011/main" val="1"/>
             </a:ext>
             <a:ext uri="{909E8E84-426E-40dd-AFC4-6F175D3DCCD1}">
-              <a14:hiddenFill xmlns:a14="http://schemas.microsoft.com/office/drawing/2010/main" xmlns="">
+              <a14:hiddenFill xmlns="" xmlns:a14="http://schemas.microsoft.com/office/drawing/2010/main">
                 <a:solidFill>
                   <a:schemeClr val="accent1"/>
                 </a:solidFill>
               </a14:hiddenFill>
             </a:ext>
             <a:ext uri="{91240B29-F687-4f45-9708-019B960494DF}">
-              <a14:hiddenLine xmlns:a14="http://schemas.microsoft.com/office/drawing/2010/main" xmlns="" w="9525">
+              <a14:hiddenLine xmlns="" xmlns:a14="http://schemas.microsoft.com/office/drawing/2010/main" w="9525">
                 <a:solidFill>
                   <a:schemeClr val="tx1"/>
                 </a:solidFill>
@@ -5050,7 +5050,7 @@
               </a14:hiddenLine>
             </a:ext>
             <a:ext uri="{AF507438-7753-43e0-B8FC-AC1667EBCBE1}">
-              <a14:hiddenEffects xmlns:a14="http://schemas.microsoft.com/office/drawing/2010/main" xmlns="">
+              <a14:hiddenEffects xmlns="" xmlns:a14="http://schemas.microsoft.com/office/drawing/2010/main">
                 <a:effectLst>
                   <a:outerShdw blurRad="63500" dist="38099" dir="2700000" algn="ctr" rotWithShape="0">
                     <a:schemeClr val="bg2">
@@ -5126,17 +5126,17 @@
           <a:effectLst/>
           <a:extLst>
             <a:ext uri="{FAA26D3D-D897-4be2-8F04-BA451C77F1D7}">
-              <ma14:placeholderFlag xmlns:ma14="http://schemas.microsoft.com/office/mac/drawingml/2011/main" xmlns="" val="1"/>
+              <ma14:placeholderFlag xmlns="" xmlns:ma14="http://schemas.microsoft.com/office/mac/drawingml/2011/main" val="1"/>
             </a:ext>
             <a:ext uri="{909E8E84-426E-40dd-AFC4-6F175D3DCCD1}">
-              <a14:hiddenFill xmlns:a14="http://schemas.microsoft.com/office/drawing/2010/main" xmlns="">
+              <a14:hiddenFill xmlns="" xmlns:a14="http://schemas.microsoft.com/office/drawing/2010/main">
                 <a:solidFill>
                   <a:schemeClr val="accent1"/>
                 </a:solidFill>
               </a14:hiddenFill>
             </a:ext>
             <a:ext uri="{91240B29-F687-4f45-9708-019B960494DF}">
-              <a14:hiddenLine xmlns:a14="http://schemas.microsoft.com/office/drawing/2010/main" xmlns="" w="9525">
+              <a14:hiddenLine xmlns="" xmlns:a14="http://schemas.microsoft.com/office/drawing/2010/main" w="9525">
                 <a:solidFill>
                   <a:schemeClr val="tx1"/>
                 </a:solidFill>
@@ -5146,7 +5146,7 @@
               </a14:hiddenLine>
             </a:ext>
             <a:ext uri="{AF507438-7753-43e0-B8FC-AC1667EBCBE1}">
-              <a14:hiddenEffects xmlns:a14="http://schemas.microsoft.com/office/drawing/2010/main" xmlns="">
+              <a14:hiddenEffects xmlns="" xmlns:a14="http://schemas.microsoft.com/office/drawing/2010/main">
                 <a:effectLst>
                   <a:outerShdw blurRad="63500" dist="38099" dir="2700000" algn="ctr" rotWithShape="0">
                     <a:schemeClr val="bg2">
@@ -11039,7 +11039,7 @@
           <a:effectLst/>
           <a:extLst>
             <a:ext uri="{AF507438-7753-43e0-B8FC-AC1667EBCBE1}">
-              <a14:hiddenEffects xmlns:a14="http://schemas.microsoft.com/office/drawing/2010/main" xmlns="">
+              <a14:hiddenEffects xmlns="" xmlns:a14="http://schemas.microsoft.com/office/drawing/2010/main">
                 <a:effectLst>
                   <a:outerShdw blurRad="63500" dist="38099" dir="2700000" algn="ctr" rotWithShape="0">
                     <a:schemeClr val="bg2">
@@ -11119,8 +11119,12 @@
           <a:lstStyle/>
           <a:p>
             <a:r>
+              <a:rPr lang="en-US"/>
+              <a:t>Multicore-Linking </a:t>
+            </a:r>
+            <a:r>
               <a:rPr lang="en-US" dirty="0"/>
-              <a:t>Multicore Linking Framework</a:t>
+              <a:t>Framework</a:t>
             </a:r>
           </a:p>
         </p:txBody>
@@ -11158,7 +11162,7 @@
           <a:effectLst/>
           <a:extLst>
             <a:ext uri="{AF507438-7753-43e0-B8FC-AC1667EBCBE1}">
-              <a14:hiddenEffects xmlns:a14="http://schemas.microsoft.com/office/drawing/2010/main" xmlns="">
+              <a14:hiddenEffects xmlns="" xmlns:a14="http://schemas.microsoft.com/office/drawing/2010/main">
                 <a:effectLst>
                   <a:outerShdw blurRad="63500" dist="38099" dir="2700000" algn="ctr" rotWithShape="0">
                     <a:schemeClr val="bg2">
@@ -14669,8 +14673,8 @@
           </p:sp>
         </mc:Fallback>
       </mc:AlternateContent>
-      <mc:AlternateContent xmlns:mc="http://schemas.openxmlformats.org/markup-compatibility/2006" xmlns:a14="http://schemas.microsoft.com/office/drawing/2010/main">
-        <mc:Choice Requires="a14">
+      <mc:AlternateContent xmlns:mc="http://schemas.openxmlformats.org/markup-compatibility/2006">
+        <mc:Choice xmlns:a14="http://schemas.microsoft.com/office/drawing/2010/main" Requires="a14">
           <p:sp>
             <p:nvSpPr>
               <p:cNvPr id="22" name="Rectangle 21">
@@ -14737,13 +14741,13 @@
                   <a:rPr lang="en-US" sz="1600" dirty="0">
                     <a:latin typeface="Helvetica" pitchFamily="2" charset="0"/>
                   </a:rPr>
-                  <a:t>(context switching incl.)</a:t>
+                  <a:t>(context switching primitives are included)</a:t>
                 </a:r>
               </a:p>
             </p:txBody>
           </p:sp>
         </mc:Choice>
-        <mc:Fallback xmlns="">
+        <mc:Fallback>
           <p:sp>
             <p:nvSpPr>
               <p:cNvPr id="22" name="Rectangle 21">
@@ -14788,8 +14792,8 @@
           </p:sp>
         </mc:Fallback>
       </mc:AlternateContent>
-      <mc:AlternateContent xmlns:mc="http://schemas.openxmlformats.org/markup-compatibility/2006" xmlns:a14="http://schemas.microsoft.com/office/drawing/2010/main">
-        <mc:Choice Requires="a14">
+      <mc:AlternateContent xmlns:mc="http://schemas.openxmlformats.org/markup-compatibility/2006">
+        <mc:Choice xmlns:a14="http://schemas.microsoft.com/office/drawing/2010/main" Requires="a14">
           <p:sp>
             <p:nvSpPr>
               <p:cNvPr id="23" name="Rectangle 22">
@@ -14846,13 +14850,13 @@
                   <a:rPr lang="en-US" sz="1600" dirty="0">
                     <a:latin typeface="Helvetica" pitchFamily="2" charset="0"/>
                   </a:rPr>
-                  <a:t>(Scheduling has a identity behavior)</a:t>
+                  <a:t>(scheduling has a identity behavior)</a:t>
                 </a:r>
               </a:p>
             </p:txBody>
           </p:sp>
         </mc:Choice>
-        <mc:Fallback xmlns="">
+        <mc:Fallback>
           <p:sp>
             <p:nvSpPr>
               <p:cNvPr id="23" name="Rectangle 22">
@@ -15039,7 +15043,7 @@
           <a:effectLst/>
           <a:extLst>
             <a:ext uri="{AF507438-7753-43e0-B8FC-AC1667EBCBE1}">
-              <a14:hiddenEffects xmlns:a14="http://schemas.microsoft.com/office/drawing/2010/main" xmlns="">
+              <a14:hiddenEffects xmlns="" xmlns:a14="http://schemas.microsoft.com/office/drawing/2010/main">
                 <a:effectLst>
                   <a:outerShdw blurRad="63500" dist="38099" dir="2700000" algn="ctr" rotWithShape="0">
                     <a:schemeClr val="bg2">
@@ -15123,7 +15127,7 @@
           <a:effectLst/>
           <a:extLst>
             <a:ext uri="{AF507438-7753-43e0-B8FC-AC1667EBCBE1}">
-              <a14:hiddenEffects xmlns:a14="http://schemas.microsoft.com/office/drawing/2010/main" xmlns="">
+              <a14:hiddenEffects xmlns="" xmlns:a14="http://schemas.microsoft.com/office/drawing/2010/main">
                 <a:effectLst>
                   <a:outerShdw blurRad="63500" dist="38099" dir="2700000" algn="ctr" rotWithShape="0">
                     <a:schemeClr val="bg2">
@@ -15457,7 +15461,7 @@
           <a:effectLst/>
           <a:extLst>
             <a:ext uri="{AF507438-7753-43e0-B8FC-AC1667EBCBE1}">
-              <a14:hiddenEffects xmlns:a14="http://schemas.microsoft.com/office/drawing/2010/main" xmlns="">
+              <a14:hiddenEffects xmlns="" xmlns:a14="http://schemas.microsoft.com/office/drawing/2010/main">
                 <a:effectLst>
                   <a:outerShdw blurRad="63500" dist="38099" dir="2700000" algn="ctr" rotWithShape="0">
                     <a:schemeClr val="bg2">
@@ -15508,7 +15512,7 @@
           <a:effectLst/>
           <a:extLst>
             <a:ext uri="{AF507438-7753-43e0-B8FC-AC1667EBCBE1}">
-              <a14:hiddenEffects xmlns:a14="http://schemas.microsoft.com/office/drawing/2010/main" xmlns="">
+              <a14:hiddenEffects xmlns="" xmlns:a14="http://schemas.microsoft.com/office/drawing/2010/main">
                 <a:effectLst>
                   <a:outerShdw blurRad="63500" dist="38099" dir="2700000" algn="ctr" rotWithShape="0">
                     <a:schemeClr val="bg2">
@@ -15554,7 +15558,7 @@
           <a:effectLst/>
           <a:extLst>
             <a:ext uri="{AF507438-7753-43e0-B8FC-AC1667EBCBE1}">
-              <a14:hiddenEffects xmlns:a14="http://schemas.microsoft.com/office/drawing/2010/main" xmlns="">
+              <a14:hiddenEffects xmlns="" xmlns:a14="http://schemas.microsoft.com/office/drawing/2010/main">
                 <a:effectLst>
                   <a:outerShdw blurRad="63500" dist="38099" dir="2700000" algn="ctr" rotWithShape="0">
                     <a:schemeClr val="bg2">
@@ -15635,7 +15639,7 @@
           <a:p>
             <a:r>
               <a:rPr lang="en-US" dirty="0"/>
-              <a:t>Multithreaded Linking Framework</a:t>
+              <a:t>Multithreaded-Linking Framework</a:t>
             </a:r>
           </a:p>
         </p:txBody>
@@ -15832,7 +15836,7 @@
           <a:effectLst/>
           <a:extLst>
             <a:ext uri="{AF507438-7753-43e0-B8FC-AC1667EBCBE1}">
-              <a14:hiddenEffects xmlns:a14="http://schemas.microsoft.com/office/drawing/2010/main" xmlns="">
+              <a14:hiddenEffects xmlns="" xmlns:a14="http://schemas.microsoft.com/office/drawing/2010/main">
                 <a:effectLst>
                   <a:outerShdw blurRad="63500" dist="38099" dir="2700000" algn="ctr" rotWithShape="0">
                     <a:schemeClr val="bg2">
@@ -15917,7 +15921,7 @@
           <a:effectLst/>
           <a:extLst>
             <a:ext uri="{AF507438-7753-43e0-B8FC-AC1667EBCBE1}">
-              <a14:hiddenEffects xmlns:a14="http://schemas.microsoft.com/office/drawing/2010/main" xmlns="">
+              <a14:hiddenEffects xmlns="" xmlns:a14="http://schemas.microsoft.com/office/drawing/2010/main">
                 <a:effectLst>
                   <a:outerShdw blurRad="63500" dist="38099" dir="2700000" algn="ctr" rotWithShape="0">
                     <a:schemeClr val="bg2">
@@ -15998,7 +16002,7 @@
           <a:effectLst/>
           <a:extLst>
             <a:ext uri="{AF507438-7753-43e0-B8FC-AC1667EBCBE1}">
-              <a14:hiddenEffects xmlns:a14="http://schemas.microsoft.com/office/drawing/2010/main" xmlns="">
+              <a14:hiddenEffects xmlns="" xmlns:a14="http://schemas.microsoft.com/office/drawing/2010/main">
                 <a:effectLst>
                   <a:outerShdw blurRad="63500" dist="38099" dir="2700000" algn="ctr" rotWithShape="0">
                     <a:schemeClr val="bg2">
@@ -16095,7 +16099,7 @@
           <a:effectLst/>
           <a:extLst>
             <a:ext uri="{AF507438-7753-43e0-B8FC-AC1667EBCBE1}">
-              <a14:hiddenEffects xmlns:a14="http://schemas.microsoft.com/office/drawing/2010/main" xmlns="">
+              <a14:hiddenEffects xmlns="" xmlns:a14="http://schemas.microsoft.com/office/drawing/2010/main">
                 <a:effectLst>
                   <a:outerShdw blurRad="63500" dist="38099" dir="2700000" algn="ctr" rotWithShape="0">
                     <a:schemeClr val="bg2">
@@ -16192,7 +16196,7 @@
           <a:effectLst/>
           <a:extLst>
             <a:ext uri="{AF507438-7753-43e0-B8FC-AC1667EBCBE1}">
-              <a14:hiddenEffects xmlns:a14="http://schemas.microsoft.com/office/drawing/2010/main" xmlns="">
+              <a14:hiddenEffects xmlns="" xmlns:a14="http://schemas.microsoft.com/office/drawing/2010/main">
                 <a:effectLst>
                   <a:outerShdw blurRad="63500" dist="38099" dir="2700000" algn="ctr" rotWithShape="0">
                     <a:schemeClr val="bg2">
@@ -16287,7 +16291,7 @@
           <a:effectLst/>
           <a:extLst>
             <a:ext uri="{AF507438-7753-43e0-B8FC-AC1667EBCBE1}">
-              <a14:hiddenEffects xmlns:a14="http://schemas.microsoft.com/office/drawing/2010/main" xmlns="">
+              <a14:hiddenEffects xmlns="" xmlns:a14="http://schemas.microsoft.com/office/drawing/2010/main">
                 <a:effectLst>
                   <a:outerShdw blurRad="63500" dist="38099" dir="2700000" algn="ctr" rotWithShape="0">
                     <a:schemeClr val="bg2">
@@ -16386,7 +16390,7 @@
           <a:effectLst/>
           <a:extLst>
             <a:ext uri="{AF507438-7753-43e0-B8FC-AC1667EBCBE1}">
-              <a14:hiddenEffects xmlns:a14="http://schemas.microsoft.com/office/drawing/2010/main" xmlns="">
+              <a14:hiddenEffects xmlns="" xmlns:a14="http://schemas.microsoft.com/office/drawing/2010/main">
                 <a:effectLst>
                   <a:outerShdw blurRad="63500" dist="38099" dir="2700000" algn="ctr" rotWithShape="0">
                     <a:schemeClr val="bg2">
@@ -16436,7 +16440,7 @@
           <a:effectLst/>
           <a:extLst>
             <a:ext uri="{AF507438-7753-43e0-B8FC-AC1667EBCBE1}">
-              <a14:hiddenEffects xmlns:a14="http://schemas.microsoft.com/office/drawing/2010/main" xmlns="">
+              <a14:hiddenEffects xmlns="" xmlns:a14="http://schemas.microsoft.com/office/drawing/2010/main">
                 <a:effectLst>
                   <a:outerShdw blurRad="63500" dist="38099" dir="2700000" algn="ctr" rotWithShape="0">
                     <a:schemeClr val="bg2">
@@ -16520,7 +16524,7 @@
           <a:effectLst/>
           <a:extLst>
             <a:ext uri="{AF507438-7753-43e0-B8FC-AC1667EBCBE1}">
-              <a14:hiddenEffects xmlns:a14="http://schemas.microsoft.com/office/drawing/2010/main" xmlns="">
+              <a14:hiddenEffects xmlns="" xmlns:a14="http://schemas.microsoft.com/office/drawing/2010/main">
                 <a:effectLst>
                   <a:outerShdw blurRad="63500" dist="38099" dir="2700000" algn="ctr" rotWithShape="0">
                     <a:schemeClr val="bg2">
@@ -16570,7 +16574,7 @@
           <a:effectLst/>
           <a:extLst>
             <a:ext uri="{AF507438-7753-43e0-B8FC-AC1667EBCBE1}">
-              <a14:hiddenEffects xmlns:a14="http://schemas.microsoft.com/office/drawing/2010/main" xmlns="">
+              <a14:hiddenEffects xmlns="" xmlns:a14="http://schemas.microsoft.com/office/drawing/2010/main">
                 <a:effectLst>
                   <a:outerShdw blurRad="63500" dist="38099" dir="2700000" algn="ctr" rotWithShape="0">
                     <a:schemeClr val="bg2">
@@ -16618,7 +16622,7 @@
           <a:effectLst/>
           <a:extLst>
             <a:ext uri="{AF507438-7753-43e0-B8FC-AC1667EBCBE1}">
-              <a14:hiddenEffects xmlns:a14="http://schemas.microsoft.com/office/drawing/2010/main" xmlns="">
+              <a14:hiddenEffects xmlns="" xmlns:a14="http://schemas.microsoft.com/office/drawing/2010/main">
                 <a:effectLst>
                   <a:outerShdw blurRad="63500" dist="38099" dir="2700000" algn="ctr" rotWithShape="0">
                     <a:schemeClr val="bg2">
@@ -16713,7 +16717,7 @@
           <a:effectLst/>
           <a:extLst>
             <a:ext uri="{AF507438-7753-43e0-B8FC-AC1667EBCBE1}">
-              <a14:hiddenEffects xmlns:a14="http://schemas.microsoft.com/office/drawing/2010/main" xmlns="">
+              <a14:hiddenEffects xmlns="" xmlns:a14="http://schemas.microsoft.com/office/drawing/2010/main">
                 <a:effectLst>
                   <a:outerShdw blurRad="63500" dist="38099" dir="2700000" algn="ctr" rotWithShape="0">
                     <a:schemeClr val="bg2">
@@ -16808,7 +16812,7 @@
           <a:effectLst/>
           <a:extLst>
             <a:ext uri="{AF507438-7753-43e0-B8FC-AC1667EBCBE1}">
-              <a14:hiddenEffects xmlns:a14="http://schemas.microsoft.com/office/drawing/2010/main" xmlns="">
+              <a14:hiddenEffects xmlns="" xmlns:a14="http://schemas.microsoft.com/office/drawing/2010/main">
                 <a:effectLst>
                   <a:outerShdw blurRad="63500" dist="38099" dir="2700000" algn="ctr" rotWithShape="0">
                     <a:schemeClr val="bg2">
@@ -16905,7 +16909,7 @@
           <a:effectLst/>
           <a:extLst>
             <a:ext uri="{AF507438-7753-43e0-B8FC-AC1667EBCBE1}">
-              <a14:hiddenEffects xmlns:a14="http://schemas.microsoft.com/office/drawing/2010/main" xmlns="">
+              <a14:hiddenEffects xmlns="" xmlns:a14="http://schemas.microsoft.com/office/drawing/2010/main">
                 <a:effectLst>
                   <a:outerShdw blurRad="63500" dist="38099" dir="2700000" algn="ctr" rotWithShape="0">
                     <a:schemeClr val="bg2">
@@ -17000,7 +17004,7 @@
           <a:effectLst/>
           <a:extLst>
             <a:ext uri="{AF507438-7753-43e0-B8FC-AC1667EBCBE1}">
-              <a14:hiddenEffects xmlns:a14="http://schemas.microsoft.com/office/drawing/2010/main" xmlns="">
+              <a14:hiddenEffects xmlns="" xmlns:a14="http://schemas.microsoft.com/office/drawing/2010/main">
                 <a:effectLst>
                   <a:outerShdw blurRad="63500" dist="38099" dir="2700000" algn="ctr" rotWithShape="0">
                     <a:schemeClr val="bg2">
@@ -17885,7 +17889,7 @@
           <a:effectLst/>
           <a:extLst>
             <a:ext uri="{AF507438-7753-43e0-B8FC-AC1667EBCBE1}">
-              <a14:hiddenEffects xmlns:a14="http://schemas.microsoft.com/office/drawing/2010/main" xmlns="">
+              <a14:hiddenEffects xmlns="" xmlns:a14="http://schemas.microsoft.com/office/drawing/2010/main">
                 <a:effectLst>
                   <a:outerShdw blurRad="63500" dist="38099" dir="2700000" algn="ctr" rotWithShape="0">
                     <a:schemeClr val="bg2">
@@ -18160,7 +18164,7 @@
           <a:effectLst/>
           <a:extLst>
             <a:ext uri="{AF507438-7753-43e0-B8FC-AC1667EBCBE1}">
-              <a14:hiddenEffects xmlns:a14="http://schemas.microsoft.com/office/drawing/2010/main" xmlns="">
+              <a14:hiddenEffects xmlns="" xmlns:a14="http://schemas.microsoft.com/office/drawing/2010/main">
                 <a:effectLst>
                   <a:outerShdw blurRad="63500" dist="38099" dir="2700000" algn="ctr" rotWithShape="0">
                     <a:schemeClr val="bg2">
@@ -18245,7 +18249,7 @@
           <a:effectLst/>
           <a:extLst>
             <a:ext uri="{AF507438-7753-43e0-B8FC-AC1667EBCBE1}">
-              <a14:hiddenEffects xmlns:a14="http://schemas.microsoft.com/office/drawing/2010/main" xmlns="">
+              <a14:hiddenEffects xmlns="" xmlns:a14="http://schemas.microsoft.com/office/drawing/2010/main">
                 <a:effectLst>
                   <a:outerShdw blurRad="63500" dist="38099" dir="2700000" algn="ctr" rotWithShape="0">
                     <a:schemeClr val="bg2">
@@ -18326,7 +18330,7 @@
           <a:effectLst/>
           <a:extLst>
             <a:ext uri="{AF507438-7753-43e0-B8FC-AC1667EBCBE1}">
-              <a14:hiddenEffects xmlns:a14="http://schemas.microsoft.com/office/drawing/2010/main" xmlns="">
+              <a14:hiddenEffects xmlns="" xmlns:a14="http://schemas.microsoft.com/office/drawing/2010/main">
                 <a:effectLst>
                   <a:outerShdw blurRad="63500" dist="38099" dir="2700000" algn="ctr" rotWithShape="0">
                     <a:schemeClr val="bg2">
@@ -18423,7 +18427,7 @@
           <a:effectLst/>
           <a:extLst>
             <a:ext uri="{AF507438-7753-43e0-B8FC-AC1667EBCBE1}">
-              <a14:hiddenEffects xmlns:a14="http://schemas.microsoft.com/office/drawing/2010/main" xmlns="">
+              <a14:hiddenEffects xmlns="" xmlns:a14="http://schemas.microsoft.com/office/drawing/2010/main">
                 <a:effectLst>
                   <a:outerShdw blurRad="63500" dist="38099" dir="2700000" algn="ctr" rotWithShape="0">
                     <a:schemeClr val="bg2">
@@ -18520,7 +18524,7 @@
           <a:effectLst/>
           <a:extLst>
             <a:ext uri="{AF507438-7753-43e0-B8FC-AC1667EBCBE1}">
-              <a14:hiddenEffects xmlns:a14="http://schemas.microsoft.com/office/drawing/2010/main" xmlns="">
+              <a14:hiddenEffects xmlns="" xmlns:a14="http://schemas.microsoft.com/office/drawing/2010/main">
                 <a:effectLst>
                   <a:outerShdw blurRad="63500" dist="38099" dir="2700000" algn="ctr" rotWithShape="0">
                     <a:schemeClr val="bg2">
@@ -18615,7 +18619,7 @@
           <a:effectLst/>
           <a:extLst>
             <a:ext uri="{AF507438-7753-43e0-B8FC-AC1667EBCBE1}">
-              <a14:hiddenEffects xmlns:a14="http://schemas.microsoft.com/office/drawing/2010/main" xmlns="">
+              <a14:hiddenEffects xmlns="" xmlns:a14="http://schemas.microsoft.com/office/drawing/2010/main">
                 <a:effectLst>
                   <a:outerShdw blurRad="63500" dist="38099" dir="2700000" algn="ctr" rotWithShape="0">
                     <a:schemeClr val="bg2">
@@ -18714,7 +18718,7 @@
           <a:effectLst/>
           <a:extLst>
             <a:ext uri="{AF507438-7753-43e0-B8FC-AC1667EBCBE1}">
-              <a14:hiddenEffects xmlns:a14="http://schemas.microsoft.com/office/drawing/2010/main" xmlns="">
+              <a14:hiddenEffects xmlns="" xmlns:a14="http://schemas.microsoft.com/office/drawing/2010/main">
                 <a:effectLst>
                   <a:outerShdw blurRad="63500" dist="38099" dir="2700000" algn="ctr" rotWithShape="0">
                     <a:schemeClr val="bg2">
@@ -18764,7 +18768,7 @@
           <a:effectLst/>
           <a:extLst>
             <a:ext uri="{AF507438-7753-43e0-B8FC-AC1667EBCBE1}">
-              <a14:hiddenEffects xmlns:a14="http://schemas.microsoft.com/office/drawing/2010/main" xmlns="">
+              <a14:hiddenEffects xmlns="" xmlns:a14="http://schemas.microsoft.com/office/drawing/2010/main">
                 <a:effectLst>
                   <a:outerShdw blurRad="63500" dist="38099" dir="2700000" algn="ctr" rotWithShape="0">
                     <a:schemeClr val="bg2">
@@ -18848,7 +18852,7 @@
           <a:effectLst/>
           <a:extLst>
             <a:ext uri="{AF507438-7753-43e0-B8FC-AC1667EBCBE1}">
-              <a14:hiddenEffects xmlns:a14="http://schemas.microsoft.com/office/drawing/2010/main" xmlns="">
+              <a14:hiddenEffects xmlns="" xmlns:a14="http://schemas.microsoft.com/office/drawing/2010/main">
                 <a:effectLst>
                   <a:outerShdw blurRad="63500" dist="38099" dir="2700000" algn="ctr" rotWithShape="0">
                     <a:schemeClr val="bg2">
@@ -18898,7 +18902,7 @@
           <a:effectLst/>
           <a:extLst>
             <a:ext uri="{AF507438-7753-43e0-B8FC-AC1667EBCBE1}">
-              <a14:hiddenEffects xmlns:a14="http://schemas.microsoft.com/office/drawing/2010/main" xmlns="">
+              <a14:hiddenEffects xmlns="" xmlns:a14="http://schemas.microsoft.com/office/drawing/2010/main">
                 <a:effectLst>
                   <a:outerShdw blurRad="63500" dist="38099" dir="2700000" algn="ctr" rotWithShape="0">
                     <a:schemeClr val="bg2">
@@ -18946,7 +18950,7 @@
           <a:effectLst/>
           <a:extLst>
             <a:ext uri="{AF507438-7753-43e0-B8FC-AC1667EBCBE1}">
-              <a14:hiddenEffects xmlns:a14="http://schemas.microsoft.com/office/drawing/2010/main" xmlns="">
+              <a14:hiddenEffects xmlns="" xmlns:a14="http://schemas.microsoft.com/office/drawing/2010/main">
                 <a:effectLst>
                   <a:outerShdw blurRad="63500" dist="38099" dir="2700000" algn="ctr" rotWithShape="0">
                     <a:schemeClr val="bg2">
@@ -19041,7 +19045,7 @@
           <a:effectLst/>
           <a:extLst>
             <a:ext uri="{AF507438-7753-43e0-B8FC-AC1667EBCBE1}">
-              <a14:hiddenEffects xmlns:a14="http://schemas.microsoft.com/office/drawing/2010/main" xmlns="">
+              <a14:hiddenEffects xmlns="" xmlns:a14="http://schemas.microsoft.com/office/drawing/2010/main">
                 <a:effectLst>
                   <a:outerShdw blurRad="63500" dist="38099" dir="2700000" algn="ctr" rotWithShape="0">
                     <a:schemeClr val="bg2">
@@ -19136,7 +19140,7 @@
           <a:effectLst/>
           <a:extLst>
             <a:ext uri="{AF507438-7753-43e0-B8FC-AC1667EBCBE1}">
-              <a14:hiddenEffects xmlns:a14="http://schemas.microsoft.com/office/drawing/2010/main" xmlns="">
+              <a14:hiddenEffects xmlns="" xmlns:a14="http://schemas.microsoft.com/office/drawing/2010/main">
                 <a:effectLst>
                   <a:outerShdw blurRad="63500" dist="38099" dir="2700000" algn="ctr" rotWithShape="0">
                     <a:schemeClr val="bg2">
@@ -19233,7 +19237,7 @@
           <a:effectLst/>
           <a:extLst>
             <a:ext uri="{AF507438-7753-43e0-B8FC-AC1667EBCBE1}">
-              <a14:hiddenEffects xmlns:a14="http://schemas.microsoft.com/office/drawing/2010/main" xmlns="">
+              <a14:hiddenEffects xmlns="" xmlns:a14="http://schemas.microsoft.com/office/drawing/2010/main">
                 <a:effectLst>
                   <a:outerShdw blurRad="63500" dist="38099" dir="2700000" algn="ctr" rotWithShape="0">
                     <a:schemeClr val="bg2">
@@ -19328,7 +19332,7 @@
           <a:effectLst/>
           <a:extLst>
             <a:ext uri="{AF507438-7753-43e0-B8FC-AC1667EBCBE1}">
-              <a14:hiddenEffects xmlns:a14="http://schemas.microsoft.com/office/drawing/2010/main" xmlns="">
+              <a14:hiddenEffects xmlns="" xmlns:a14="http://schemas.microsoft.com/office/drawing/2010/main">
                 <a:effectLst>
                   <a:outerShdw blurRad="63500" dist="38099" dir="2700000" algn="ctr" rotWithShape="0">
                     <a:schemeClr val="bg2">
@@ -19483,7 +19487,7 @@
           <a:effectLst/>
           <a:extLst>
             <a:ext uri="{AF507438-7753-43e0-B8FC-AC1667EBCBE1}">
-              <a14:hiddenEffects xmlns:a14="http://schemas.microsoft.com/office/drawing/2010/main" xmlns="">
+              <a14:hiddenEffects xmlns="" xmlns:a14="http://schemas.microsoft.com/office/drawing/2010/main">
                 <a:effectLst>
                   <a:outerShdw blurRad="63500" dist="38099" dir="2700000" algn="ctr" rotWithShape="0">
                     <a:schemeClr val="bg2">
@@ -20003,7 +20007,7 @@
           <a:effectLst/>
           <a:extLst>
             <a:ext uri="{AF507438-7753-43e0-B8FC-AC1667EBCBE1}">
-              <a14:hiddenEffects xmlns:a14="http://schemas.microsoft.com/office/drawing/2010/main" xmlns="">
+              <a14:hiddenEffects xmlns="" xmlns:a14="http://schemas.microsoft.com/office/drawing/2010/main">
                 <a:effectLst>
                   <a:outerShdw blurRad="63500" dist="38099" dir="2700000" algn="ctr" rotWithShape="0">
                     <a:schemeClr val="bg2">
@@ -20053,7 +20057,7 @@
           <a:effectLst/>
           <a:extLst>
             <a:ext uri="{AF507438-7753-43e0-B8FC-AC1667EBCBE1}">
-              <a14:hiddenEffects xmlns:a14="http://schemas.microsoft.com/office/drawing/2010/main" xmlns="">
+              <a14:hiddenEffects xmlns="" xmlns:a14="http://schemas.microsoft.com/office/drawing/2010/main">
                 <a:effectLst>
                   <a:outerShdw blurRad="63500" dist="38099" dir="2700000" algn="ctr" rotWithShape="0">
                     <a:schemeClr val="bg2">
@@ -20178,7 +20182,7 @@
           <a:effectLst/>
           <a:extLst>
             <a:ext uri="{AF507438-7753-43e0-B8FC-AC1667EBCBE1}">
-              <a14:hiddenEffects xmlns:a14="http://schemas.microsoft.com/office/drawing/2010/main" xmlns="">
+              <a14:hiddenEffects xmlns="" xmlns:a14="http://schemas.microsoft.com/office/drawing/2010/main">
                 <a:effectLst>
                   <a:outerShdw blurRad="63500" dist="38099" dir="2700000" algn="ctr" rotWithShape="0">
                     <a:schemeClr val="bg2">
@@ -20224,7 +20228,7 @@
           <a:effectLst/>
           <a:extLst>
             <a:ext uri="{AF507438-7753-43e0-B8FC-AC1667EBCBE1}">
-              <a14:hiddenEffects xmlns:a14="http://schemas.microsoft.com/office/drawing/2010/main" xmlns="">
+              <a14:hiddenEffects xmlns="" xmlns:a14="http://schemas.microsoft.com/office/drawing/2010/main">
                 <a:effectLst>
                   <a:outerShdw blurRad="63500" dist="38099" dir="2700000" algn="ctr" rotWithShape="0">
                     <a:schemeClr val="bg2">
@@ -20321,7 +20325,7 @@
           <a:effectLst/>
           <a:extLst>
             <a:ext uri="{AF507438-7753-43e0-B8FC-AC1667EBCBE1}">
-              <a14:hiddenEffects xmlns:a14="http://schemas.microsoft.com/office/drawing/2010/main" xmlns="">
+              <a14:hiddenEffects xmlns="" xmlns:a14="http://schemas.microsoft.com/office/drawing/2010/main">
                 <a:effectLst>
                   <a:outerShdw blurRad="63500" dist="38099" dir="2700000" algn="ctr" rotWithShape="0">
                     <a:schemeClr val="bg2">
@@ -20418,7 +20422,7 @@
           <a:effectLst/>
           <a:extLst>
             <a:ext uri="{AF507438-7753-43e0-B8FC-AC1667EBCBE1}">
-              <a14:hiddenEffects xmlns:a14="http://schemas.microsoft.com/office/drawing/2010/main" xmlns="">
+              <a14:hiddenEffects xmlns="" xmlns:a14="http://schemas.microsoft.com/office/drawing/2010/main">
                 <a:effectLst>
                   <a:outerShdw blurRad="63500" dist="38099" dir="2700000" algn="ctr" rotWithShape="0">
                     <a:schemeClr val="bg2">
@@ -20513,7 +20517,7 @@
           <a:effectLst/>
           <a:extLst>
             <a:ext uri="{AF507438-7753-43e0-B8FC-AC1667EBCBE1}">
-              <a14:hiddenEffects xmlns:a14="http://schemas.microsoft.com/office/drawing/2010/main" xmlns="">
+              <a14:hiddenEffects xmlns="" xmlns:a14="http://schemas.microsoft.com/office/drawing/2010/main">
                 <a:effectLst>
                   <a:outerShdw blurRad="63500" dist="38099" dir="2700000" algn="ctr" rotWithShape="0">
                     <a:schemeClr val="bg2">
@@ -20610,7 +20614,7 @@
           <a:effectLst/>
           <a:extLst>
             <a:ext uri="{AF507438-7753-43e0-B8FC-AC1667EBCBE1}">
-              <a14:hiddenEffects xmlns:a14="http://schemas.microsoft.com/office/drawing/2010/main" xmlns="">
+              <a14:hiddenEffects xmlns="" xmlns:a14="http://schemas.microsoft.com/office/drawing/2010/main">
                 <a:effectLst>
                   <a:outerShdw blurRad="63500" dist="38099" dir="2700000" algn="ctr" rotWithShape="0">
                     <a:schemeClr val="bg2">
@@ -20733,7 +20737,7 @@
             <a:effectLst/>
             <a:extLst>
               <a:ext uri="{AF507438-7753-43e0-B8FC-AC1667EBCBE1}">
-                <a14:hiddenEffects xmlns:a14="http://schemas.microsoft.com/office/drawing/2010/main" xmlns="">
+                <a14:hiddenEffects xmlns="" xmlns:a14="http://schemas.microsoft.com/office/drawing/2010/main">
                   <a:effectLst>
                     <a:outerShdw blurRad="63500" dist="38099" dir="2700000" algn="ctr" rotWithShape="0">
                       <a:schemeClr val="bg2">
@@ -20938,7 +20942,7 @@
           <a:effectLst/>
           <a:extLst>
             <a:ext uri="{AF507438-7753-43e0-B8FC-AC1667EBCBE1}">
-              <a14:hiddenEffects xmlns:a14="http://schemas.microsoft.com/office/drawing/2010/main" xmlns="">
+              <a14:hiddenEffects xmlns="" xmlns:a14="http://schemas.microsoft.com/office/drawing/2010/main">
                 <a:effectLst>
                   <a:outerShdw blurRad="63500" dist="38099" dir="2700000" algn="ctr" rotWithShape="0">
                     <a:schemeClr val="bg2">
@@ -21044,7 +21048,7 @@
             <a:effectLst/>
             <a:extLst>
               <a:ext uri="{AF507438-7753-43e0-B8FC-AC1667EBCBE1}">
-                <a14:hiddenEffects xmlns:a14="http://schemas.microsoft.com/office/drawing/2010/main" xmlns="">
+                <a14:hiddenEffects xmlns="" xmlns:a14="http://schemas.microsoft.com/office/drawing/2010/main">
                   <a:effectLst>
                     <a:outerShdw blurRad="63500" dist="38099" dir="2700000" algn="ctr" rotWithShape="0">
                       <a:schemeClr val="bg2">
@@ -21185,7 +21189,7 @@
             <a:effectLst/>
             <a:extLst>
               <a:ext uri="{AF507438-7753-43e0-B8FC-AC1667EBCBE1}">
-                <a14:hiddenEffects xmlns:a14="http://schemas.microsoft.com/office/drawing/2010/main" xmlns="">
+                <a14:hiddenEffects xmlns="" xmlns:a14="http://schemas.microsoft.com/office/drawing/2010/main">
                   <a:effectLst>
                     <a:outerShdw blurRad="63500" dist="38099" dir="2700000" algn="ctr" rotWithShape="0">
                       <a:schemeClr val="bg2">
@@ -21291,7 +21295,7 @@
               <a:effectLst/>
               <a:extLst>
                 <a:ext uri="{AF507438-7753-43e0-B8FC-AC1667EBCBE1}">
-                  <a14:hiddenEffects xmlns:a14="http://schemas.microsoft.com/office/drawing/2010/main" xmlns="">
+                  <a14:hiddenEffects xmlns="" xmlns:a14="http://schemas.microsoft.com/office/drawing/2010/main">
                     <a:effectLst>
                       <a:outerShdw blurRad="63500" dist="38099" dir="2700000" algn="ctr" rotWithShape="0">
                         <a:schemeClr val="bg2">
@@ -21419,7 +21423,7 @@
           <a:effectLst/>
           <a:extLst>
             <a:ext uri="{AF507438-7753-43e0-B8FC-AC1667EBCBE1}">
-              <a14:hiddenEffects xmlns:a14="http://schemas.microsoft.com/office/drawing/2010/main" xmlns="">
+              <a14:hiddenEffects xmlns="" xmlns:a14="http://schemas.microsoft.com/office/drawing/2010/main">
                 <a:effectLst>
                   <a:outerShdw blurRad="63500" dist="38099" dir="2700000" algn="ctr" rotWithShape="0">
                     <a:schemeClr val="bg2">
@@ -22049,7 +22053,7 @@
           <a:effectLst/>
           <a:extLst>
             <a:ext uri="{AF507438-7753-43e0-B8FC-AC1667EBCBE1}">
-              <a14:hiddenEffects xmlns:a14="http://schemas.microsoft.com/office/drawing/2010/main" xmlns="">
+              <a14:hiddenEffects xmlns="" xmlns:a14="http://schemas.microsoft.com/office/drawing/2010/main">
                 <a:effectLst>
                   <a:outerShdw blurRad="63500" dist="38099" dir="2700000" algn="ctr" rotWithShape="0">
                     <a:schemeClr val="bg2">
@@ -22099,7 +22103,7 @@
           <a:effectLst/>
           <a:extLst>
             <a:ext uri="{AF507438-7753-43e0-B8FC-AC1667EBCBE1}">
-              <a14:hiddenEffects xmlns:a14="http://schemas.microsoft.com/office/drawing/2010/main" xmlns="">
+              <a14:hiddenEffects xmlns="" xmlns:a14="http://schemas.microsoft.com/office/drawing/2010/main">
                 <a:effectLst>
                   <a:outerShdw blurRad="63500" dist="38099" dir="2700000" algn="ctr" rotWithShape="0">
                     <a:schemeClr val="bg2">
@@ -22149,7 +22153,7 @@
           <a:effectLst/>
           <a:extLst>
             <a:ext uri="{AF507438-7753-43e0-B8FC-AC1667EBCBE1}">
-              <a14:hiddenEffects xmlns:a14="http://schemas.microsoft.com/office/drawing/2010/main" xmlns="">
+              <a14:hiddenEffects xmlns="" xmlns:a14="http://schemas.microsoft.com/office/drawing/2010/main">
                 <a:effectLst>
                   <a:outerShdw blurRad="63500" dist="38099" dir="2700000" algn="ctr" rotWithShape="0">
                     <a:schemeClr val="bg2">
@@ -22199,7 +22203,7 @@
           <a:effectLst/>
           <a:extLst>
             <a:ext uri="{AF507438-7753-43e0-B8FC-AC1667EBCBE1}">
-              <a14:hiddenEffects xmlns:a14="http://schemas.microsoft.com/office/drawing/2010/main" xmlns="">
+              <a14:hiddenEffects xmlns="" xmlns:a14="http://schemas.microsoft.com/office/drawing/2010/main">
                 <a:effectLst>
                   <a:outerShdw blurRad="63500" dist="38099" dir="2700000" algn="ctr" rotWithShape="0">
                     <a:schemeClr val="bg2">
@@ -22249,7 +22253,7 @@
           <a:effectLst/>
           <a:extLst>
             <a:ext uri="{AF507438-7753-43e0-B8FC-AC1667EBCBE1}">
-              <a14:hiddenEffects xmlns:a14="http://schemas.microsoft.com/office/drawing/2010/main" xmlns="">
+              <a14:hiddenEffects xmlns="" xmlns:a14="http://schemas.microsoft.com/office/drawing/2010/main">
                 <a:effectLst>
                   <a:outerShdw blurRad="63500" dist="38099" dir="2700000" algn="ctr" rotWithShape="0">
                     <a:schemeClr val="bg2">
@@ -22371,7 +22375,7 @@
           <a:effectLst/>
           <a:extLst>
             <a:ext uri="{AF507438-7753-43e0-B8FC-AC1667EBCBE1}">
-              <a14:hiddenEffects xmlns:a14="http://schemas.microsoft.com/office/drawing/2010/main" xmlns="">
+              <a14:hiddenEffects xmlns="" xmlns:a14="http://schemas.microsoft.com/office/drawing/2010/main">
                 <a:effectLst>
                   <a:outerShdw blurRad="63500" dist="38099" dir="2700000" algn="ctr" rotWithShape="0">
                     <a:schemeClr val="bg2">
@@ -22466,7 +22470,7 @@
           <a:effectLst/>
           <a:extLst>
             <a:ext uri="{AF507438-7753-43e0-B8FC-AC1667EBCBE1}">
-              <a14:hiddenEffects xmlns:a14="http://schemas.microsoft.com/office/drawing/2010/main" xmlns="">
+              <a14:hiddenEffects xmlns="" xmlns:a14="http://schemas.microsoft.com/office/drawing/2010/main">
                 <a:effectLst>
                   <a:outerShdw blurRad="63500" dist="38099" dir="2700000" algn="ctr" rotWithShape="0">
                     <a:schemeClr val="bg2">
@@ -22561,7 +22565,7 @@
           <a:effectLst/>
           <a:extLst>
             <a:ext uri="{AF507438-7753-43e0-B8FC-AC1667EBCBE1}">
-              <a14:hiddenEffects xmlns:a14="http://schemas.microsoft.com/office/drawing/2010/main" xmlns="">
+              <a14:hiddenEffects xmlns="" xmlns:a14="http://schemas.microsoft.com/office/drawing/2010/main">
                 <a:effectLst>
                   <a:outerShdw blurRad="63500" dist="38099" dir="2700000" algn="ctr" rotWithShape="0">
                     <a:schemeClr val="bg2">
@@ -22658,7 +22662,7 @@
           <a:effectLst/>
           <a:extLst>
             <a:ext uri="{AF507438-7753-43e0-B8FC-AC1667EBCBE1}">
-              <a14:hiddenEffects xmlns:a14="http://schemas.microsoft.com/office/drawing/2010/main" xmlns="">
+              <a14:hiddenEffects xmlns="" xmlns:a14="http://schemas.microsoft.com/office/drawing/2010/main">
                 <a:effectLst>
                   <a:outerShdw blurRad="63500" dist="38099" dir="2700000" algn="ctr" rotWithShape="0">
                     <a:schemeClr val="bg2">
@@ -22755,7 +22759,7 @@
           <a:effectLst/>
           <a:extLst>
             <a:ext uri="{AF507438-7753-43e0-B8FC-AC1667EBCBE1}">
-              <a14:hiddenEffects xmlns:a14="http://schemas.microsoft.com/office/drawing/2010/main" xmlns="">
+              <a14:hiddenEffects xmlns="" xmlns:a14="http://schemas.microsoft.com/office/drawing/2010/main">
                 <a:effectLst>
                   <a:outerShdw blurRad="63500" dist="38099" dir="2700000" algn="ctr" rotWithShape="0">
                     <a:schemeClr val="bg2">
@@ -22850,7 +22854,7 @@
           <a:effectLst/>
           <a:extLst>
             <a:ext uri="{AF507438-7753-43e0-B8FC-AC1667EBCBE1}">
-              <a14:hiddenEffects xmlns:a14="http://schemas.microsoft.com/office/drawing/2010/main" xmlns="">
+              <a14:hiddenEffects xmlns="" xmlns:a14="http://schemas.microsoft.com/office/drawing/2010/main">
                 <a:effectLst>
                   <a:outerShdw blurRad="63500" dist="38099" dir="2700000" algn="ctr" rotWithShape="0">
                     <a:schemeClr val="bg2">
@@ -23056,7 +23060,7 @@
           <a:effectLst/>
           <a:extLst>
             <a:ext uri="{AF507438-7753-43e0-B8FC-AC1667EBCBE1}">
-              <a14:hiddenEffects xmlns:a14="http://schemas.microsoft.com/office/drawing/2010/main" xmlns="">
+              <a14:hiddenEffects xmlns="" xmlns:a14="http://schemas.microsoft.com/office/drawing/2010/main">
                 <a:effectLst>
                   <a:outerShdw blurRad="63500" dist="38099" dir="2700000" algn="ctr" rotWithShape="0">
                     <a:schemeClr val="bg2">
@@ -23153,7 +23157,7 @@
           <a:effectLst/>
           <a:extLst>
             <a:ext uri="{AF507438-7753-43e0-B8FC-AC1667EBCBE1}">
-              <a14:hiddenEffects xmlns:a14="http://schemas.microsoft.com/office/drawing/2010/main" xmlns="">
+              <a14:hiddenEffects xmlns="" xmlns:a14="http://schemas.microsoft.com/office/drawing/2010/main">
                 <a:effectLst>
                   <a:outerShdw blurRad="63500" dist="38099" dir="2700000" algn="ctr" rotWithShape="0">
                     <a:schemeClr val="bg2">
@@ -23248,7 +23252,7 @@
           <a:effectLst/>
           <a:extLst>
             <a:ext uri="{AF507438-7753-43e0-B8FC-AC1667EBCBE1}">
-              <a14:hiddenEffects xmlns:a14="http://schemas.microsoft.com/office/drawing/2010/main" xmlns="">
+              <a14:hiddenEffects xmlns="" xmlns:a14="http://schemas.microsoft.com/office/drawing/2010/main">
                 <a:effectLst>
                   <a:outerShdw blurRad="63500" dist="38099" dir="2700000" algn="ctr" rotWithShape="0">
                     <a:schemeClr val="bg2">
@@ -23332,7 +23336,7 @@
           <a:effectLst/>
           <a:extLst>
             <a:ext uri="{AF507438-7753-43e0-B8FC-AC1667EBCBE1}">
-              <a14:hiddenEffects xmlns:a14="http://schemas.microsoft.com/office/drawing/2010/main" xmlns="">
+              <a14:hiddenEffects xmlns="" xmlns:a14="http://schemas.microsoft.com/office/drawing/2010/main">
                 <a:effectLst>
                   <a:outerShdw blurRad="63500" dist="38099" dir="2700000" algn="ctr" rotWithShape="0">
                     <a:schemeClr val="bg2">
@@ -23418,7 +23422,7 @@
           <a:effectLst/>
           <a:extLst>
             <a:ext uri="{AF507438-7753-43e0-B8FC-AC1667EBCBE1}">
-              <a14:hiddenEffects xmlns:a14="http://schemas.microsoft.com/office/drawing/2010/main" xmlns="">
+              <a14:hiddenEffects xmlns="" xmlns:a14="http://schemas.microsoft.com/office/drawing/2010/main">
                 <a:effectLst>
                   <a:outerShdw blurRad="63500" dist="38099" dir="2700000" algn="ctr" rotWithShape="0">
                     <a:schemeClr val="bg2">
@@ -23519,7 +23523,7 @@
           <a:effectLst/>
           <a:extLst>
             <a:ext uri="{AF507438-7753-43e0-B8FC-AC1667EBCBE1}">
-              <a14:hiddenEffects xmlns:a14="http://schemas.microsoft.com/office/drawing/2010/main" xmlns="">
+              <a14:hiddenEffects xmlns="" xmlns:a14="http://schemas.microsoft.com/office/drawing/2010/main">
                 <a:effectLst>
                   <a:outerShdw blurRad="63500" dist="38099" dir="2700000" algn="ctr" rotWithShape="0">
                     <a:schemeClr val="bg2">
@@ -23605,7 +23609,7 @@
           <a:effectLst/>
           <a:extLst>
             <a:ext uri="{AF507438-7753-43e0-B8FC-AC1667EBCBE1}">
-              <a14:hiddenEffects xmlns:a14="http://schemas.microsoft.com/office/drawing/2010/main" xmlns="">
+              <a14:hiddenEffects xmlns="" xmlns:a14="http://schemas.microsoft.com/office/drawing/2010/main">
                 <a:effectLst>
                   <a:outerShdw blurRad="63500" dist="38099" dir="2700000" algn="ctr" rotWithShape="0">
                     <a:schemeClr val="bg2">
@@ -23694,7 +23698,7 @@
           <a:effectLst/>
           <a:extLst>
             <a:ext uri="{AF507438-7753-43e0-B8FC-AC1667EBCBE1}">
-              <a14:hiddenEffects xmlns:a14="http://schemas.microsoft.com/office/drawing/2010/main" xmlns="">
+              <a14:hiddenEffects xmlns="" xmlns:a14="http://schemas.microsoft.com/office/drawing/2010/main">
                 <a:effectLst>
                   <a:outerShdw blurRad="63500" dist="38099" dir="2700000" algn="ctr" rotWithShape="0">
                     <a:schemeClr val="bg2">
@@ -23745,7 +23749,7 @@
           <a:effectLst/>
           <a:extLst>
             <a:ext uri="{AF507438-7753-43e0-B8FC-AC1667EBCBE1}">
-              <a14:hiddenEffects xmlns:a14="http://schemas.microsoft.com/office/drawing/2010/main" xmlns="">
+              <a14:hiddenEffects xmlns="" xmlns:a14="http://schemas.microsoft.com/office/drawing/2010/main">
                 <a:effectLst>
                   <a:outerShdw blurRad="63500" dist="38099" dir="2700000" algn="ctr" rotWithShape="0">
                     <a:schemeClr val="bg2">
@@ -25037,7 +25041,7 @@
           <a:effectLst/>
           <a:extLst>
             <a:ext uri="{AF507438-7753-43e0-B8FC-AC1667EBCBE1}">
-              <a14:hiddenEffects xmlns:a14="http://schemas.microsoft.com/office/drawing/2010/main" xmlns="">
+              <a14:hiddenEffects xmlns="" xmlns:a14="http://schemas.microsoft.com/office/drawing/2010/main">
                 <a:effectLst>
                   <a:outerShdw blurRad="63500" dist="38099" dir="2700000" algn="ctr" rotWithShape="0">
                     <a:schemeClr val="bg2">
@@ -25187,7 +25191,7 @@
           <a:effectLst/>
           <a:extLst>
             <a:ext uri="{AF507438-7753-43e0-B8FC-AC1667EBCBE1}">
-              <a14:hiddenEffects xmlns:a14="http://schemas.microsoft.com/office/drawing/2010/main" xmlns="">
+              <a14:hiddenEffects xmlns="" xmlns:a14="http://schemas.microsoft.com/office/drawing/2010/main">
                 <a:effectLst>
                   <a:outerShdw blurRad="63500" dist="38099" dir="2700000" algn="ctr" rotWithShape="0">
                     <a:schemeClr val="bg2">
@@ -25275,7 +25279,7 @@
           <a:effectLst/>
           <a:extLst>
             <a:ext uri="{AF507438-7753-43e0-B8FC-AC1667EBCBE1}">
-              <a14:hiddenEffects xmlns:a14="http://schemas.microsoft.com/office/drawing/2010/main" xmlns="">
+              <a14:hiddenEffects xmlns="" xmlns:a14="http://schemas.microsoft.com/office/drawing/2010/main">
                 <a:effectLst>
                   <a:outerShdw blurRad="63500" dist="38099" dir="2700000" algn="ctr" rotWithShape="0">
                     <a:schemeClr val="bg2">
@@ -25321,7 +25325,7 @@
           <a:effectLst/>
           <a:extLst>
             <a:ext uri="{AF507438-7753-43e0-B8FC-AC1667EBCBE1}">
-              <a14:hiddenEffects xmlns:a14="http://schemas.microsoft.com/office/drawing/2010/main" xmlns="">
+              <a14:hiddenEffects xmlns="" xmlns:a14="http://schemas.microsoft.com/office/drawing/2010/main">
                 <a:effectLst>
                   <a:outerShdw blurRad="63500" dist="38099" dir="2700000" algn="ctr" rotWithShape="0">
                     <a:schemeClr val="bg2">
@@ -25418,7 +25422,7 @@
           <a:effectLst/>
           <a:extLst>
             <a:ext uri="{AF507438-7753-43e0-B8FC-AC1667EBCBE1}">
-              <a14:hiddenEffects xmlns:a14="http://schemas.microsoft.com/office/drawing/2010/main" xmlns="">
+              <a14:hiddenEffects xmlns="" xmlns:a14="http://schemas.microsoft.com/office/drawing/2010/main">
                 <a:effectLst>
                   <a:outerShdw blurRad="63500" dist="38099" dir="2700000" algn="ctr" rotWithShape="0">
                     <a:schemeClr val="bg2">
@@ -25533,7 +25537,7 @@
             <a:effectLst/>
             <a:extLst>
               <a:ext uri="{AF507438-7753-43e0-B8FC-AC1667EBCBE1}">
-                <a14:hiddenEffects xmlns:a14="http://schemas.microsoft.com/office/drawing/2010/main" xmlns="">
+                <a14:hiddenEffects xmlns="" xmlns:a14="http://schemas.microsoft.com/office/drawing/2010/main">
                   <a:effectLst>
                     <a:outerShdw blurRad="63500" dist="38099" dir="2700000" algn="ctr" rotWithShape="0">
                       <a:schemeClr val="bg2">
@@ -25620,7 +25624,7 @@
             <a:effectLst/>
             <a:extLst>
               <a:ext uri="{AF507438-7753-43e0-B8FC-AC1667EBCBE1}">
-                <a14:hiddenEffects xmlns:a14="http://schemas.microsoft.com/office/drawing/2010/main" xmlns="">
+                <a14:hiddenEffects xmlns="" xmlns:a14="http://schemas.microsoft.com/office/drawing/2010/main">
                   <a:effectLst>
                     <a:outerShdw blurRad="63500" dist="38099" dir="2700000" algn="ctr" rotWithShape="0">
                       <a:schemeClr val="bg2">
@@ -25727,7 +25731,7 @@
               <a:effectLst/>
               <a:extLst>
                 <a:ext uri="{AF507438-7753-43e0-B8FC-AC1667EBCBE1}">
-                  <a14:hiddenEffects xmlns:a14="http://schemas.microsoft.com/office/drawing/2010/main" xmlns="">
+                  <a14:hiddenEffects xmlns="" xmlns:a14="http://schemas.microsoft.com/office/drawing/2010/main">
                     <a:effectLst>
                       <a:outerShdw blurRad="63500" dist="38099" dir="2700000" algn="ctr" rotWithShape="0">
                         <a:schemeClr val="bg2">
@@ -25848,7 +25852,7 @@
             <a:effectLst/>
             <a:extLst>
               <a:ext uri="{AF507438-7753-43e0-B8FC-AC1667EBCBE1}">
-                <a14:hiddenEffects xmlns:a14="http://schemas.microsoft.com/office/drawing/2010/main" xmlns="">
+                <a14:hiddenEffects xmlns="" xmlns:a14="http://schemas.microsoft.com/office/drawing/2010/main">
                   <a:effectLst>
                     <a:outerShdw blurRad="63500" dist="38099" dir="2700000" algn="ctr" rotWithShape="0">
                       <a:schemeClr val="bg2">
@@ -25955,7 +25959,7 @@
             <a:effectLst/>
             <a:extLst>
               <a:ext uri="{AF507438-7753-43e0-B8FC-AC1667EBCBE1}">
-                <a14:hiddenEffects xmlns:a14="http://schemas.microsoft.com/office/drawing/2010/main" xmlns="">
+                <a14:hiddenEffects xmlns="" xmlns:a14="http://schemas.microsoft.com/office/drawing/2010/main">
                   <a:effectLst>
                     <a:outerShdw blurRad="63500" dist="38099" dir="2700000" algn="ctr" rotWithShape="0">
                       <a:schemeClr val="bg2">
@@ -26101,7 +26105,7 @@
           <a:effectLst/>
           <a:extLst>
             <a:ext uri="{AF507438-7753-43e0-B8FC-AC1667EBCBE1}">
-              <a14:hiddenEffects xmlns:a14="http://schemas.microsoft.com/office/drawing/2010/main" xmlns="">
+              <a14:hiddenEffects xmlns="" xmlns:a14="http://schemas.microsoft.com/office/drawing/2010/main">
                 <a:effectLst>
                   <a:outerShdw blurRad="63500" dist="38099" dir="2700000" algn="ctr" rotWithShape="0">
                     <a:schemeClr val="bg2">
@@ -26184,7 +26188,7 @@
           <a:effectLst/>
           <a:extLst>
             <a:ext uri="{AF507438-7753-43e0-B8FC-AC1667EBCBE1}">
-              <a14:hiddenEffects xmlns:a14="http://schemas.microsoft.com/office/drawing/2010/main" xmlns="">
+              <a14:hiddenEffects xmlns="" xmlns:a14="http://schemas.microsoft.com/office/drawing/2010/main">
                 <a:effectLst>
                   <a:outerShdw blurRad="63500" dist="38099" dir="2700000" algn="ctr" rotWithShape="0">
                     <a:schemeClr val="bg2">
@@ -26281,7 +26285,7 @@
           <a:effectLst/>
           <a:extLst>
             <a:ext uri="{AF507438-7753-43e0-B8FC-AC1667EBCBE1}">
-              <a14:hiddenEffects xmlns:a14="http://schemas.microsoft.com/office/drawing/2010/main" xmlns="">
+              <a14:hiddenEffects xmlns="" xmlns:a14="http://schemas.microsoft.com/office/drawing/2010/main">
                 <a:effectLst>
                   <a:outerShdw blurRad="63500" dist="38099" dir="2700000" algn="ctr" rotWithShape="0">
                     <a:schemeClr val="bg2">
@@ -26384,7 +26388,7 @@
           <a:effectLst/>
           <a:extLst>
             <a:ext uri="{AF507438-7753-43e0-B8FC-AC1667EBCBE1}">
-              <a14:hiddenEffects xmlns:a14="http://schemas.microsoft.com/office/drawing/2010/main" xmlns="">
+              <a14:hiddenEffects xmlns="" xmlns:a14="http://schemas.microsoft.com/office/drawing/2010/main">
                 <a:effectLst>
                   <a:outerShdw blurRad="63500" dist="38099" dir="2700000" algn="ctr" rotWithShape="0">
                     <a:schemeClr val="bg2">
@@ -26472,7 +26476,7 @@
           <a:effectLst/>
           <a:extLst>
             <a:ext uri="{AF507438-7753-43e0-B8FC-AC1667EBCBE1}">
-              <a14:hiddenEffects xmlns:a14="http://schemas.microsoft.com/office/drawing/2010/main" xmlns="">
+              <a14:hiddenEffects xmlns="" xmlns:a14="http://schemas.microsoft.com/office/drawing/2010/main">
                 <a:effectLst>
                   <a:outerShdw blurRad="63500" dist="38099" dir="2700000" algn="ctr" rotWithShape="0">
                     <a:schemeClr val="bg2">
@@ -26518,7 +26522,7 @@
           <a:effectLst/>
           <a:extLst>
             <a:ext uri="{AF507438-7753-43e0-B8FC-AC1667EBCBE1}">
-              <a14:hiddenEffects xmlns:a14="http://schemas.microsoft.com/office/drawing/2010/main" xmlns="">
+              <a14:hiddenEffects xmlns="" xmlns:a14="http://schemas.microsoft.com/office/drawing/2010/main">
                 <a:effectLst>
                   <a:outerShdw blurRad="63500" dist="38099" dir="2700000" algn="ctr" rotWithShape="0">
                     <a:schemeClr val="bg2">
@@ -26615,7 +26619,7 @@
           <a:effectLst/>
           <a:extLst>
             <a:ext uri="{AF507438-7753-43e0-B8FC-AC1667EBCBE1}">
-              <a14:hiddenEffects xmlns:a14="http://schemas.microsoft.com/office/drawing/2010/main" xmlns="">
+              <a14:hiddenEffects xmlns="" xmlns:a14="http://schemas.microsoft.com/office/drawing/2010/main">
                 <a:effectLst>
                   <a:outerShdw blurRad="63500" dist="38099" dir="2700000" algn="ctr" rotWithShape="0">
                     <a:schemeClr val="bg2">
@@ -26714,7 +26718,7 @@
           <a:effectLst/>
           <a:extLst>
             <a:ext uri="{AF507438-7753-43e0-B8FC-AC1667EBCBE1}">
-              <a14:hiddenEffects xmlns:a14="http://schemas.microsoft.com/office/drawing/2010/main" xmlns="">
+              <a14:hiddenEffects xmlns="" xmlns:a14="http://schemas.microsoft.com/office/drawing/2010/main">
                 <a:effectLst>
                   <a:outerShdw blurRad="63500" dist="38099" dir="2700000" algn="ctr" rotWithShape="0">
                     <a:schemeClr val="bg2">
@@ -26797,7 +26801,7 @@
           <a:effectLst/>
           <a:extLst>
             <a:ext uri="{AF507438-7753-43e0-B8FC-AC1667EBCBE1}">
-              <a14:hiddenEffects xmlns:a14="http://schemas.microsoft.com/office/drawing/2010/main" xmlns="">
+              <a14:hiddenEffects xmlns="" xmlns:a14="http://schemas.microsoft.com/office/drawing/2010/main">
                 <a:effectLst>
                   <a:outerShdw blurRad="63500" dist="38099" dir="2700000" algn="ctr" rotWithShape="0">
                     <a:schemeClr val="bg2">
@@ -26894,7 +26898,7 @@
           <a:effectLst/>
           <a:extLst>
             <a:ext uri="{AF507438-7753-43e0-B8FC-AC1667EBCBE1}">
-              <a14:hiddenEffects xmlns:a14="http://schemas.microsoft.com/office/drawing/2010/main" xmlns="">
+              <a14:hiddenEffects xmlns="" xmlns:a14="http://schemas.microsoft.com/office/drawing/2010/main">
                 <a:effectLst>
                   <a:outerShdw blurRad="63500" dist="38099" dir="2700000" algn="ctr" rotWithShape="0">
                     <a:schemeClr val="bg2">
@@ -26995,7 +26999,7 @@
           <a:effectLst/>
           <a:extLst>
             <a:ext uri="{AF507438-7753-43e0-B8FC-AC1667EBCBE1}">
-              <a14:hiddenEffects xmlns:a14="http://schemas.microsoft.com/office/drawing/2010/main" xmlns="">
+              <a14:hiddenEffects xmlns="" xmlns:a14="http://schemas.microsoft.com/office/drawing/2010/main">
                 <a:effectLst>
                   <a:outerShdw blurRad="63500" dist="38099" dir="2700000" algn="ctr" rotWithShape="0">
                     <a:schemeClr val="bg2">
@@ -27081,7 +27085,7 @@
           <a:effectLst/>
           <a:extLst>
             <a:ext uri="{AF507438-7753-43e0-B8FC-AC1667EBCBE1}">
-              <a14:hiddenEffects xmlns:a14="http://schemas.microsoft.com/office/drawing/2010/main" xmlns="">
+              <a14:hiddenEffects xmlns="" xmlns:a14="http://schemas.microsoft.com/office/drawing/2010/main">
                 <a:effectLst>
                   <a:outerShdw blurRad="63500" dist="38099" dir="2700000" algn="ctr" rotWithShape="0">
                     <a:schemeClr val="bg2">
@@ -27180,7 +27184,7 @@
           <a:effectLst/>
           <a:extLst>
             <a:ext uri="{AF507438-7753-43e0-B8FC-AC1667EBCBE1}">
-              <a14:hiddenEffects xmlns:a14="http://schemas.microsoft.com/office/drawing/2010/main" xmlns="">
+              <a14:hiddenEffects xmlns="" xmlns:a14="http://schemas.microsoft.com/office/drawing/2010/main">
                 <a:effectLst>
                   <a:outerShdw blurRad="63500" dist="38099" dir="2700000" algn="ctr" rotWithShape="0">
                     <a:schemeClr val="bg2">
@@ -28133,7 +28137,7 @@
           <a:effectLst/>
           <a:extLst>
             <a:ext uri="{AF507438-7753-43e0-B8FC-AC1667EBCBE1}">
-              <a14:hiddenEffects xmlns:a14="http://schemas.microsoft.com/office/drawing/2010/main" xmlns="">
+              <a14:hiddenEffects xmlns="" xmlns:a14="http://schemas.microsoft.com/office/drawing/2010/main">
                 <a:effectLst>
                   <a:outerShdw blurRad="63500" dist="38099" dir="2700000" algn="ctr" rotWithShape="0">
                     <a:schemeClr val="bg2">
@@ -28221,7 +28225,7 @@
           <a:effectLst/>
           <a:extLst>
             <a:ext uri="{AF507438-7753-43e0-B8FC-AC1667EBCBE1}">
-              <a14:hiddenEffects xmlns:a14="http://schemas.microsoft.com/office/drawing/2010/main" xmlns="">
+              <a14:hiddenEffects xmlns="" xmlns:a14="http://schemas.microsoft.com/office/drawing/2010/main">
                 <a:effectLst>
                   <a:outerShdw blurRad="63500" dist="38099" dir="2700000" algn="ctr" rotWithShape="0">
                     <a:schemeClr val="bg2">
@@ -28267,7 +28271,7 @@
           <a:effectLst/>
           <a:extLst>
             <a:ext uri="{AF507438-7753-43e0-B8FC-AC1667EBCBE1}">
-              <a14:hiddenEffects xmlns:a14="http://schemas.microsoft.com/office/drawing/2010/main" xmlns="">
+              <a14:hiddenEffects xmlns="" xmlns:a14="http://schemas.microsoft.com/office/drawing/2010/main">
                 <a:effectLst>
                   <a:outerShdw blurRad="63500" dist="38099" dir="2700000" algn="ctr" rotWithShape="0">
                     <a:schemeClr val="bg2">
@@ -28364,7 +28368,7 @@
           <a:effectLst/>
           <a:extLst>
             <a:ext uri="{AF507438-7753-43e0-B8FC-AC1667EBCBE1}">
-              <a14:hiddenEffects xmlns:a14="http://schemas.microsoft.com/office/drawing/2010/main" xmlns="">
+              <a14:hiddenEffects xmlns="" xmlns:a14="http://schemas.microsoft.com/office/drawing/2010/main">
                 <a:effectLst>
                   <a:outerShdw blurRad="63500" dist="38099" dir="2700000" algn="ctr" rotWithShape="0">
                     <a:schemeClr val="bg2">
@@ -28463,7 +28467,7 @@
           <a:effectLst/>
           <a:extLst>
             <a:ext uri="{AF507438-7753-43e0-B8FC-AC1667EBCBE1}">
-              <a14:hiddenEffects xmlns:a14="http://schemas.microsoft.com/office/drawing/2010/main" xmlns="">
+              <a14:hiddenEffects xmlns="" xmlns:a14="http://schemas.microsoft.com/office/drawing/2010/main">
                 <a:effectLst>
                   <a:outerShdw blurRad="63500" dist="38099" dir="2700000" algn="ctr" rotWithShape="0">
                     <a:schemeClr val="bg2">
@@ -28546,7 +28550,7 @@
           <a:effectLst/>
           <a:extLst>
             <a:ext uri="{AF507438-7753-43e0-B8FC-AC1667EBCBE1}">
-              <a14:hiddenEffects xmlns:a14="http://schemas.microsoft.com/office/drawing/2010/main" xmlns="">
+              <a14:hiddenEffects xmlns="" xmlns:a14="http://schemas.microsoft.com/office/drawing/2010/main">
                 <a:effectLst>
                   <a:outerShdw blurRad="63500" dist="38099" dir="2700000" algn="ctr" rotWithShape="0">
                     <a:schemeClr val="bg2">
@@ -28643,7 +28647,7 @@
           <a:effectLst/>
           <a:extLst>
             <a:ext uri="{AF507438-7753-43e0-B8FC-AC1667EBCBE1}">
-              <a14:hiddenEffects xmlns:a14="http://schemas.microsoft.com/office/drawing/2010/main" xmlns="">
+              <a14:hiddenEffects xmlns="" xmlns:a14="http://schemas.microsoft.com/office/drawing/2010/main">
                 <a:effectLst>
                   <a:outerShdw blurRad="63500" dist="38099" dir="2700000" algn="ctr" rotWithShape="0">
                     <a:schemeClr val="bg2">
@@ -29580,7 +29584,7 @@
           <a:effectLst/>
           <a:extLst>
             <a:ext uri="{AF507438-7753-43e0-B8FC-AC1667EBCBE1}">
-              <a14:hiddenEffects xmlns:a14="http://schemas.microsoft.com/office/drawing/2010/main" xmlns="">
+              <a14:hiddenEffects xmlns="" xmlns:a14="http://schemas.microsoft.com/office/drawing/2010/main">
                 <a:effectLst>
                   <a:outerShdw blurRad="63500" dist="38099" dir="2700000" algn="ctr" rotWithShape="0">
                     <a:schemeClr val="bg2">
@@ -29628,7 +29632,7 @@
           <a:effectLst/>
           <a:extLst>
             <a:ext uri="{AF507438-7753-43e0-B8FC-AC1667EBCBE1}">
-              <a14:hiddenEffects xmlns:a14="http://schemas.microsoft.com/office/drawing/2010/main" xmlns="">
+              <a14:hiddenEffects xmlns="" xmlns:a14="http://schemas.microsoft.com/office/drawing/2010/main">
                 <a:effectLst>
                   <a:outerShdw blurRad="63500" dist="38099" dir="2700000" algn="ctr" rotWithShape="0">
                     <a:schemeClr val="bg2">
@@ -29809,7 +29813,7 @@
           <a:effectLst/>
           <a:extLst>
             <a:ext uri="{AF507438-7753-43e0-B8FC-AC1667EBCBE1}">
-              <a14:hiddenEffects xmlns:a14="http://schemas.microsoft.com/office/drawing/2010/main" xmlns="">
+              <a14:hiddenEffects xmlns="" xmlns:a14="http://schemas.microsoft.com/office/drawing/2010/main">
                 <a:effectLst>
                   <a:outerShdw blurRad="63500" dist="38099" dir="2700000" algn="ctr" rotWithShape="0">
                     <a:schemeClr val="bg2">
@@ -29897,7 +29901,7 @@
           <a:effectLst/>
           <a:extLst>
             <a:ext uri="{AF507438-7753-43e0-B8FC-AC1667EBCBE1}">
-              <a14:hiddenEffects xmlns:a14="http://schemas.microsoft.com/office/drawing/2010/main" xmlns="">
+              <a14:hiddenEffects xmlns="" xmlns:a14="http://schemas.microsoft.com/office/drawing/2010/main">
                 <a:effectLst>
                   <a:outerShdw blurRad="63500" dist="38099" dir="2700000" algn="ctr" rotWithShape="0">
                     <a:schemeClr val="bg2">
@@ -29984,7 +29988,7 @@
           <a:effectLst/>
           <a:extLst>
             <a:ext uri="{AF507438-7753-43e0-B8FC-AC1667EBCBE1}">
-              <a14:hiddenEffects xmlns:a14="http://schemas.microsoft.com/office/drawing/2010/main" xmlns="">
+              <a14:hiddenEffects xmlns="" xmlns:a14="http://schemas.microsoft.com/office/drawing/2010/main">
                 <a:effectLst>
                   <a:outerShdw blurRad="63500" dist="38099" dir="2700000" algn="ctr" rotWithShape="0">
                     <a:schemeClr val="bg2">
@@ -30067,7 +30071,7 @@
           <a:effectLst/>
           <a:extLst>
             <a:ext uri="{AF507438-7753-43e0-B8FC-AC1667EBCBE1}">
-              <a14:hiddenEffects xmlns:a14="http://schemas.microsoft.com/office/drawing/2010/main" xmlns="">
+              <a14:hiddenEffects xmlns="" xmlns:a14="http://schemas.microsoft.com/office/drawing/2010/main">
                 <a:effectLst>
                   <a:outerShdw blurRad="63500" dist="38099" dir="2700000" algn="ctr" rotWithShape="0">
                     <a:schemeClr val="bg2">
@@ -30164,7 +30168,7 @@
           <a:effectLst/>
           <a:extLst>
             <a:ext uri="{AF507438-7753-43e0-B8FC-AC1667EBCBE1}">
-              <a14:hiddenEffects xmlns:a14="http://schemas.microsoft.com/office/drawing/2010/main" xmlns="">
+              <a14:hiddenEffects xmlns="" xmlns:a14="http://schemas.microsoft.com/office/drawing/2010/main">
                 <a:effectLst>
                   <a:outerShdw blurRad="63500" dist="38099" dir="2700000" algn="ctr" rotWithShape="0">
                     <a:schemeClr val="bg2">
@@ -30261,7 +30265,7 @@
           <a:effectLst/>
           <a:extLst>
             <a:ext uri="{AF507438-7753-43e0-B8FC-AC1667EBCBE1}">
-              <a14:hiddenEffects xmlns:a14="http://schemas.microsoft.com/office/drawing/2010/main" xmlns="">
+              <a14:hiddenEffects xmlns="" xmlns:a14="http://schemas.microsoft.com/office/drawing/2010/main">
                 <a:effectLst>
                   <a:outerShdw blurRad="63500" dist="38099" dir="2700000" algn="ctr" rotWithShape="0">
                     <a:schemeClr val="bg2">
@@ -30356,7 +30360,7 @@
           <a:effectLst/>
           <a:extLst>
             <a:ext uri="{AF507438-7753-43e0-B8FC-AC1667EBCBE1}">
-              <a14:hiddenEffects xmlns:a14="http://schemas.microsoft.com/office/drawing/2010/main" xmlns="">
+              <a14:hiddenEffects xmlns="" xmlns:a14="http://schemas.microsoft.com/office/drawing/2010/main">
                 <a:effectLst>
                   <a:outerShdw blurRad="63500" dist="38099" dir="2700000" algn="ctr" rotWithShape="0">
                     <a:schemeClr val="bg2">
@@ -30455,7 +30459,7 @@
           <a:effectLst/>
           <a:extLst>
             <a:ext uri="{AF507438-7753-43e0-B8FC-AC1667EBCBE1}">
-              <a14:hiddenEffects xmlns:a14="http://schemas.microsoft.com/office/drawing/2010/main" xmlns="">
+              <a14:hiddenEffects xmlns="" xmlns:a14="http://schemas.microsoft.com/office/drawing/2010/main">
                 <a:effectLst>
                   <a:outerShdw blurRad="63500" dist="38099" dir="2700000" algn="ctr" rotWithShape="0">
                     <a:schemeClr val="bg2">
@@ -30505,7 +30509,7 @@
           <a:effectLst/>
           <a:extLst>
             <a:ext uri="{AF507438-7753-43e0-B8FC-AC1667EBCBE1}">
-              <a14:hiddenEffects xmlns:a14="http://schemas.microsoft.com/office/drawing/2010/main" xmlns="">
+              <a14:hiddenEffects xmlns="" xmlns:a14="http://schemas.microsoft.com/office/drawing/2010/main">
                 <a:effectLst>
                   <a:outerShdw blurRad="63500" dist="38099" dir="2700000" algn="ctr" rotWithShape="0">
                     <a:schemeClr val="bg2">
@@ -30591,7 +30595,7 @@
           <a:effectLst/>
           <a:extLst>
             <a:ext uri="{AF507438-7753-43e0-B8FC-AC1667EBCBE1}">
-              <a14:hiddenEffects xmlns:a14="http://schemas.microsoft.com/office/drawing/2010/main" xmlns="">
+              <a14:hiddenEffects xmlns="" xmlns:a14="http://schemas.microsoft.com/office/drawing/2010/main">
                 <a:effectLst>
                   <a:outerShdw blurRad="63500" dist="38099" dir="2700000" algn="ctr" rotWithShape="0">
                     <a:schemeClr val="bg2">
@@ -30639,7 +30643,7 @@
           <a:effectLst/>
           <a:extLst>
             <a:ext uri="{AF507438-7753-43e0-B8FC-AC1667EBCBE1}">
-              <a14:hiddenEffects xmlns:a14="http://schemas.microsoft.com/office/drawing/2010/main" xmlns="">
+              <a14:hiddenEffects xmlns="" xmlns:a14="http://schemas.microsoft.com/office/drawing/2010/main">
                 <a:effectLst>
                   <a:outerShdw blurRad="63500" dist="38099" dir="2700000" algn="ctr" rotWithShape="0">
                     <a:schemeClr val="bg2">
@@ -30740,7 +30744,7 @@
           <a:effectLst/>
           <a:extLst>
             <a:ext uri="{AF507438-7753-43e0-B8FC-AC1667EBCBE1}">
-              <a14:hiddenEffects xmlns:a14="http://schemas.microsoft.com/office/drawing/2010/main" xmlns="">
+              <a14:hiddenEffects xmlns="" xmlns:a14="http://schemas.microsoft.com/office/drawing/2010/main">
                 <a:effectLst>
                   <a:outerShdw blurRad="63500" dist="38099" dir="2700000" algn="ctr" rotWithShape="0">
                     <a:schemeClr val="bg2">
@@ -30843,7 +30847,7 @@
           <a:effectLst/>
           <a:extLst>
             <a:ext uri="{AF507438-7753-43e0-B8FC-AC1667EBCBE1}">
-              <a14:hiddenEffects xmlns:a14="http://schemas.microsoft.com/office/drawing/2010/main" xmlns="">
+              <a14:hiddenEffects xmlns="" xmlns:a14="http://schemas.microsoft.com/office/drawing/2010/main">
                 <a:effectLst>
                   <a:outerShdw blurRad="63500" dist="38099" dir="2700000" algn="ctr" rotWithShape="0">
                     <a:schemeClr val="bg2">
@@ -30930,7 +30934,7 @@
           <a:effectLst/>
           <a:extLst>
             <a:ext uri="{AF507438-7753-43e0-B8FC-AC1667EBCBE1}">
-              <a14:hiddenEffects xmlns:a14="http://schemas.microsoft.com/office/drawing/2010/main" xmlns="">
+              <a14:hiddenEffects xmlns="" xmlns:a14="http://schemas.microsoft.com/office/drawing/2010/main">
                 <a:effectLst>
                   <a:outerShdw blurRad="63500" dist="38099" dir="2700000" algn="ctr" rotWithShape="0">
                     <a:schemeClr val="bg2">
@@ -31013,7 +31017,7 @@
           <a:effectLst/>
           <a:extLst>
             <a:ext uri="{AF507438-7753-43e0-B8FC-AC1667EBCBE1}">
-              <a14:hiddenEffects xmlns:a14="http://schemas.microsoft.com/office/drawing/2010/main" xmlns="">
+              <a14:hiddenEffects xmlns="" xmlns:a14="http://schemas.microsoft.com/office/drawing/2010/main">
                 <a:effectLst>
                   <a:outerShdw blurRad="63500" dist="38099" dir="2700000" algn="ctr" rotWithShape="0">
                     <a:schemeClr val="bg2">
@@ -31110,7 +31114,7 @@
           <a:effectLst/>
           <a:extLst>
             <a:ext uri="{AF507438-7753-43e0-B8FC-AC1667EBCBE1}">
-              <a14:hiddenEffects xmlns:a14="http://schemas.microsoft.com/office/drawing/2010/main" xmlns="">
+              <a14:hiddenEffects xmlns="" xmlns:a14="http://schemas.microsoft.com/office/drawing/2010/main">
                 <a:effectLst>
                   <a:outerShdw blurRad="63500" dist="38099" dir="2700000" algn="ctr" rotWithShape="0">
                     <a:schemeClr val="bg2">
@@ -31207,7 +31211,7 @@
           <a:effectLst/>
           <a:extLst>
             <a:ext uri="{AF507438-7753-43e0-B8FC-AC1667EBCBE1}">
-              <a14:hiddenEffects xmlns:a14="http://schemas.microsoft.com/office/drawing/2010/main" xmlns="">
+              <a14:hiddenEffects xmlns="" xmlns:a14="http://schemas.microsoft.com/office/drawing/2010/main">
                 <a:effectLst>
                   <a:outerShdw blurRad="63500" dist="38099" dir="2700000" algn="ctr" rotWithShape="0">
                     <a:schemeClr val="bg2">
@@ -31302,7 +31306,7 @@
           <a:effectLst/>
           <a:extLst>
             <a:ext uri="{AF507438-7753-43e0-B8FC-AC1667EBCBE1}">
-              <a14:hiddenEffects xmlns:a14="http://schemas.microsoft.com/office/drawing/2010/main" xmlns="">
+              <a14:hiddenEffects xmlns="" xmlns:a14="http://schemas.microsoft.com/office/drawing/2010/main">
                 <a:effectLst>
                   <a:outerShdw blurRad="63500" dist="38099" dir="2700000" algn="ctr" rotWithShape="0">
                     <a:schemeClr val="bg2">
@@ -31401,7 +31405,7 @@
           <a:effectLst/>
           <a:extLst>
             <a:ext uri="{AF507438-7753-43e0-B8FC-AC1667EBCBE1}">
-              <a14:hiddenEffects xmlns:a14="http://schemas.microsoft.com/office/drawing/2010/main" xmlns="">
+              <a14:hiddenEffects xmlns="" xmlns:a14="http://schemas.microsoft.com/office/drawing/2010/main">
                 <a:effectLst>
                   <a:outerShdw blurRad="63500" dist="38099" dir="2700000" algn="ctr" rotWithShape="0">
                     <a:schemeClr val="bg2">
@@ -31487,7 +31491,7 @@
           <a:effectLst/>
           <a:extLst>
             <a:ext uri="{AF507438-7753-43e0-B8FC-AC1667EBCBE1}">
-              <a14:hiddenEffects xmlns:a14="http://schemas.microsoft.com/office/drawing/2010/main" xmlns="">
+              <a14:hiddenEffects xmlns="" xmlns:a14="http://schemas.microsoft.com/office/drawing/2010/main">
                 <a:effectLst>
                   <a:outerShdw blurRad="63500" dist="38099" dir="2700000" algn="ctr" rotWithShape="0">
                     <a:schemeClr val="bg2">
@@ -31535,7 +31539,7 @@
           <a:effectLst/>
           <a:extLst>
             <a:ext uri="{AF507438-7753-43e0-B8FC-AC1667EBCBE1}">
-              <a14:hiddenEffects xmlns:a14="http://schemas.microsoft.com/office/drawing/2010/main" xmlns="">
+              <a14:hiddenEffects xmlns="" xmlns:a14="http://schemas.microsoft.com/office/drawing/2010/main">
                 <a:effectLst>
                   <a:outerShdw blurRad="63500" dist="38099" dir="2700000" algn="ctr" rotWithShape="0">
                     <a:schemeClr val="bg2">
@@ -31636,7 +31640,7 @@
           <a:effectLst/>
           <a:extLst>
             <a:ext uri="{AF507438-7753-43e0-B8FC-AC1667EBCBE1}">
-              <a14:hiddenEffects xmlns:a14="http://schemas.microsoft.com/office/drawing/2010/main" xmlns="">
+              <a14:hiddenEffects xmlns="" xmlns:a14="http://schemas.microsoft.com/office/drawing/2010/main">
                 <a:effectLst>
                   <a:outerShdw blurRad="63500" dist="38099" dir="2700000" algn="ctr" rotWithShape="0">
                     <a:schemeClr val="bg2">
@@ -31961,7 +31965,7 @@
           <a:effectLst/>
           <a:extLst>
             <a:ext uri="{AF507438-7753-43e0-B8FC-AC1667EBCBE1}">
-              <a14:hiddenEffects xmlns:a14="http://schemas.microsoft.com/office/drawing/2010/main" xmlns="">
+              <a14:hiddenEffects xmlns="" xmlns:a14="http://schemas.microsoft.com/office/drawing/2010/main">
                 <a:effectLst>
                   <a:outerShdw blurRad="63500" dist="38099" dir="2700000" algn="ctr" rotWithShape="0">
                     <a:schemeClr val="bg2">
@@ -32105,7 +32109,7 @@
           <a:effectLst/>
           <a:extLst>
             <a:ext uri="{AF507438-7753-43e0-B8FC-AC1667EBCBE1}">
-              <a14:hiddenEffects xmlns:a14="http://schemas.microsoft.com/office/drawing/2010/main" xmlns="">
+              <a14:hiddenEffects xmlns="" xmlns:a14="http://schemas.microsoft.com/office/drawing/2010/main">
                 <a:effectLst>
                   <a:outerShdw blurRad="63500" dist="38099" dir="2700000" algn="ctr" rotWithShape="0">
                     <a:schemeClr val="bg2">
@@ -32155,7 +32159,7 @@
           <a:effectLst/>
           <a:extLst>
             <a:ext uri="{AF507438-7753-43e0-B8FC-AC1667EBCBE1}">
-              <a14:hiddenEffects xmlns:a14="http://schemas.microsoft.com/office/drawing/2010/main" xmlns="">
+              <a14:hiddenEffects xmlns="" xmlns:a14="http://schemas.microsoft.com/office/drawing/2010/main">
                 <a:effectLst>
                   <a:outerShdw blurRad="63500" dist="38099" dir="2700000" algn="ctr" rotWithShape="0">
                     <a:schemeClr val="bg2">
@@ -32203,7 +32207,7 @@
           <a:effectLst/>
           <a:extLst>
             <a:ext uri="{AF507438-7753-43e0-B8FC-AC1667EBCBE1}">
-              <a14:hiddenEffects xmlns:a14="http://schemas.microsoft.com/office/drawing/2010/main" xmlns="">
+              <a14:hiddenEffects xmlns="" xmlns:a14="http://schemas.microsoft.com/office/drawing/2010/main">
                 <a:effectLst>
                   <a:outerShdw blurRad="63500" dist="38099" dir="2700000" algn="ctr" rotWithShape="0">
                     <a:schemeClr val="bg2">
@@ -32399,7 +32403,7 @@
           <a:effectLst/>
           <a:extLst>
             <a:ext uri="{AF507438-7753-43e0-B8FC-AC1667EBCBE1}">
-              <a14:hiddenEffects xmlns:a14="http://schemas.microsoft.com/office/drawing/2010/main" xmlns="">
+              <a14:hiddenEffects xmlns="" xmlns:a14="http://schemas.microsoft.com/office/drawing/2010/main">
                 <a:effectLst>
                   <a:outerShdw blurRad="63500" dist="38099" dir="2700000" algn="ctr" rotWithShape="0">
                     <a:schemeClr val="bg2">
@@ -33218,7 +33222,7 @@
           <a:effectLst/>
           <a:extLst>
             <a:ext uri="{AF507438-7753-43e0-B8FC-AC1667EBCBE1}">
-              <a14:hiddenEffects xmlns:a14="http://schemas.microsoft.com/office/drawing/2010/main" xmlns="">
+              <a14:hiddenEffects xmlns="" xmlns:a14="http://schemas.microsoft.com/office/drawing/2010/main">
                 <a:effectLst>
                   <a:outerShdw blurRad="63500" dist="38099" dir="2700000" algn="ctr" rotWithShape="0">
                     <a:schemeClr val="bg2">
@@ -33364,7 +33368,7 @@
           <a:effectLst/>
           <a:extLst>
             <a:ext uri="{AF507438-7753-43e0-B8FC-AC1667EBCBE1}">
-              <a14:hiddenEffects xmlns:a14="http://schemas.microsoft.com/office/drawing/2010/main" xmlns="">
+              <a14:hiddenEffects xmlns="" xmlns:a14="http://schemas.microsoft.com/office/drawing/2010/main">
                 <a:effectLst>
                   <a:outerShdw blurRad="63500" dist="38099" dir="2700000" algn="ctr" rotWithShape="0">
                     <a:schemeClr val="bg2">
@@ -33452,7 +33456,7 @@
           <a:effectLst/>
           <a:extLst>
             <a:ext uri="{AF507438-7753-43e0-B8FC-AC1667EBCBE1}">
-              <a14:hiddenEffects xmlns:a14="http://schemas.microsoft.com/office/drawing/2010/main" xmlns="">
+              <a14:hiddenEffects xmlns="" xmlns:a14="http://schemas.microsoft.com/office/drawing/2010/main">
                 <a:effectLst>
                   <a:outerShdw blurRad="63500" dist="38099" dir="2700000" algn="ctr" rotWithShape="0">
                     <a:schemeClr val="bg2">
@@ -33539,7 +33543,7 @@
           <a:effectLst/>
           <a:extLst>
             <a:ext uri="{AF507438-7753-43e0-B8FC-AC1667EBCBE1}">
-              <a14:hiddenEffects xmlns:a14="http://schemas.microsoft.com/office/drawing/2010/main" xmlns="">
+              <a14:hiddenEffects xmlns="" xmlns:a14="http://schemas.microsoft.com/office/drawing/2010/main">
                 <a:effectLst>
                   <a:outerShdw blurRad="63500" dist="38099" dir="2700000" algn="ctr" rotWithShape="0">
                     <a:schemeClr val="bg2">
@@ -33622,7 +33626,7 @@
           <a:effectLst/>
           <a:extLst>
             <a:ext uri="{AF507438-7753-43e0-B8FC-AC1667EBCBE1}">
-              <a14:hiddenEffects xmlns:a14="http://schemas.microsoft.com/office/drawing/2010/main" xmlns="">
+              <a14:hiddenEffects xmlns="" xmlns:a14="http://schemas.microsoft.com/office/drawing/2010/main">
                 <a:effectLst>
                   <a:outerShdw blurRad="63500" dist="38099" dir="2700000" algn="ctr" rotWithShape="0">
                     <a:schemeClr val="bg2">
@@ -33719,7 +33723,7 @@
           <a:effectLst/>
           <a:extLst>
             <a:ext uri="{AF507438-7753-43e0-B8FC-AC1667EBCBE1}">
-              <a14:hiddenEffects xmlns:a14="http://schemas.microsoft.com/office/drawing/2010/main" xmlns="">
+              <a14:hiddenEffects xmlns="" xmlns:a14="http://schemas.microsoft.com/office/drawing/2010/main">
                 <a:effectLst>
                   <a:outerShdw blurRad="63500" dist="38099" dir="2700000" algn="ctr" rotWithShape="0">
                     <a:schemeClr val="bg2">
@@ -33816,7 +33820,7 @@
           <a:effectLst/>
           <a:extLst>
             <a:ext uri="{AF507438-7753-43e0-B8FC-AC1667EBCBE1}">
-              <a14:hiddenEffects xmlns:a14="http://schemas.microsoft.com/office/drawing/2010/main" xmlns="">
+              <a14:hiddenEffects xmlns="" xmlns:a14="http://schemas.microsoft.com/office/drawing/2010/main">
                 <a:effectLst>
                   <a:outerShdw blurRad="63500" dist="38099" dir="2700000" algn="ctr" rotWithShape="0">
                     <a:schemeClr val="bg2">
@@ -33911,7 +33915,7 @@
           <a:effectLst/>
           <a:extLst>
             <a:ext uri="{AF507438-7753-43e0-B8FC-AC1667EBCBE1}">
-              <a14:hiddenEffects xmlns:a14="http://schemas.microsoft.com/office/drawing/2010/main" xmlns="">
+              <a14:hiddenEffects xmlns="" xmlns:a14="http://schemas.microsoft.com/office/drawing/2010/main">
                 <a:effectLst>
                   <a:outerShdw blurRad="63500" dist="38099" dir="2700000" algn="ctr" rotWithShape="0">
                     <a:schemeClr val="bg2">
@@ -34010,7 +34014,7 @@
           <a:effectLst/>
           <a:extLst>
             <a:ext uri="{AF507438-7753-43e0-B8FC-AC1667EBCBE1}">
-              <a14:hiddenEffects xmlns:a14="http://schemas.microsoft.com/office/drawing/2010/main" xmlns="">
+              <a14:hiddenEffects xmlns="" xmlns:a14="http://schemas.microsoft.com/office/drawing/2010/main">
                 <a:effectLst>
                   <a:outerShdw blurRad="63500" dist="38099" dir="2700000" algn="ctr" rotWithShape="0">
                     <a:schemeClr val="bg2">
@@ -34096,7 +34100,7 @@
           <a:effectLst/>
           <a:extLst>
             <a:ext uri="{AF507438-7753-43e0-B8FC-AC1667EBCBE1}">
-              <a14:hiddenEffects xmlns:a14="http://schemas.microsoft.com/office/drawing/2010/main" xmlns="">
+              <a14:hiddenEffects xmlns="" xmlns:a14="http://schemas.microsoft.com/office/drawing/2010/main">
                 <a:effectLst>
                   <a:outerShdw blurRad="63500" dist="38099" dir="2700000" algn="ctr" rotWithShape="0">
                     <a:schemeClr val="bg2">
@@ -34144,7 +34148,7 @@
           <a:effectLst/>
           <a:extLst>
             <a:ext uri="{AF507438-7753-43e0-B8FC-AC1667EBCBE1}">
-              <a14:hiddenEffects xmlns:a14="http://schemas.microsoft.com/office/drawing/2010/main" xmlns="">
+              <a14:hiddenEffects xmlns="" xmlns:a14="http://schemas.microsoft.com/office/drawing/2010/main">
                 <a:effectLst>
                   <a:outerShdw blurRad="63500" dist="38099" dir="2700000" algn="ctr" rotWithShape="0">
                     <a:schemeClr val="bg2">
@@ -34245,7 +34249,7 @@
           <a:effectLst/>
           <a:extLst>
             <a:ext uri="{AF507438-7753-43e0-B8FC-AC1667EBCBE1}">
-              <a14:hiddenEffects xmlns:a14="http://schemas.microsoft.com/office/drawing/2010/main" xmlns="">
+              <a14:hiddenEffects xmlns="" xmlns:a14="http://schemas.microsoft.com/office/drawing/2010/main">
                 <a:effectLst>
                   <a:outerShdw blurRad="63500" dist="38099" dir="2700000" algn="ctr" rotWithShape="0">
                     <a:schemeClr val="bg2">
@@ -34384,7 +34388,7 @@
           <a:effectLst/>
           <a:extLst>
             <a:ext uri="{AF507438-7753-43e0-B8FC-AC1667EBCBE1}">
-              <a14:hiddenEffects xmlns:a14="http://schemas.microsoft.com/office/drawing/2010/main" xmlns="">
+              <a14:hiddenEffects xmlns="" xmlns:a14="http://schemas.microsoft.com/office/drawing/2010/main">
                 <a:effectLst>
                   <a:outerShdw blurRad="63500" dist="38099" dir="2700000" algn="ctr" rotWithShape="0">
                     <a:schemeClr val="bg2">
@@ -34434,7 +34438,7 @@
           <a:effectLst/>
           <a:extLst>
             <a:ext uri="{AF507438-7753-43e0-B8FC-AC1667EBCBE1}">
-              <a14:hiddenEffects xmlns:a14="http://schemas.microsoft.com/office/drawing/2010/main" xmlns="">
+              <a14:hiddenEffects xmlns="" xmlns:a14="http://schemas.microsoft.com/office/drawing/2010/main">
                 <a:effectLst>
                   <a:outerShdw blurRad="63500" dist="38099" dir="2700000" algn="ctr" rotWithShape="0">
                     <a:schemeClr val="bg2">
@@ -34482,7 +34486,7 @@
           <a:effectLst/>
           <a:extLst>
             <a:ext uri="{AF507438-7753-43e0-B8FC-AC1667EBCBE1}">
-              <a14:hiddenEffects xmlns:a14="http://schemas.microsoft.com/office/drawing/2010/main" xmlns="">
+              <a14:hiddenEffects xmlns="" xmlns:a14="http://schemas.microsoft.com/office/drawing/2010/main">
                 <a:effectLst>
                   <a:outerShdw blurRad="63500" dist="38099" dir="2700000" algn="ctr" rotWithShape="0">
                     <a:schemeClr val="bg2">
@@ -35474,7 +35478,7 @@
         <a:effectLst/>
         <a:extLst>
           <a:ext uri="{AF507438-7753-43e0-B8FC-AC1667EBCBE1}">
-            <a14:hiddenEffects xmlns:a14="http://schemas.microsoft.com/office/drawing/2010/main" xmlns="">
+            <a14:hiddenEffects xmlns="" xmlns:a14="http://schemas.microsoft.com/office/drawing/2010/main">
               <a:effectLst>
                 <a:outerShdw blurRad="63500" dist="38099" dir="2700000" algn="ctr" rotWithShape="0">
                   <a:schemeClr val="bg2">
@@ -35551,7 +35555,7 @@
         <a:effectLst/>
         <a:extLst>
           <a:ext uri="{AF507438-7753-43e0-B8FC-AC1667EBCBE1}">
-            <a14:hiddenEffects xmlns:a14="http://schemas.microsoft.com/office/drawing/2010/main" xmlns="">
+            <a14:hiddenEffects xmlns="" xmlns:a14="http://schemas.microsoft.com/office/drawing/2010/main">
               <a:effectLst>
                 <a:outerShdw blurRad="63500" dist="38099" dir="2700000" algn="ctr" rotWithShape="0">
                   <a:schemeClr val="bg2">

</xml_diff>